<commit_message>
Etapa de resultados preliminares - Apresentação
</commit_message>
<xml_diff>
--- a/Apresentação TCC - Vinícius Andrade Lopes.pptx
+++ b/Apresentação TCC - Vinícius Andrade Lopes.pptx
@@ -11,6 +11,7 @@
     <p:sldId id="260" r:id="rId5"/>
     <p:sldId id="261" r:id="rId6"/>
     <p:sldId id="262" r:id="rId7"/>
+    <p:sldId id="263" r:id="rId8"/>
   </p:sldIdLst>
   <p:sldSz cx="12192000" cy="6858000"/>
   <p:notesSz cx="6858000" cy="9144000"/>
@@ -447,7 +448,7 @@
           <a:p>
             <a:fld id="{542FF06D-87BF-405F-9790-318F41D0CF65}" type="slidenum">
               <a:rPr lang="pt-BR" smtClean="0"/>
-              <a:t>‹#›</a:t>
+              <a:t>‹nº›</a:t>
             </a:fld>
             <a:endParaRPr lang="pt-BR"/>
           </a:p>
@@ -655,7 +656,7 @@
           <a:p>
             <a:fld id="{542FF06D-87BF-405F-9790-318F41D0CF65}" type="slidenum">
               <a:rPr lang="pt-BR" smtClean="0"/>
-              <a:t>‹#›</a:t>
+              <a:t>‹nº›</a:t>
             </a:fld>
             <a:endParaRPr lang="pt-BR"/>
           </a:p>
@@ -853,7 +854,7 @@
           <a:p>
             <a:fld id="{542FF06D-87BF-405F-9790-318F41D0CF65}" type="slidenum">
               <a:rPr lang="pt-BR" smtClean="0"/>
-              <a:t>‹#›</a:t>
+              <a:t>‹nº›</a:t>
             </a:fld>
             <a:endParaRPr lang="pt-BR"/>
           </a:p>
@@ -1128,7 +1129,7 @@
           <a:p>
             <a:fld id="{542FF06D-87BF-405F-9790-318F41D0CF65}" type="slidenum">
               <a:rPr lang="pt-BR" smtClean="0"/>
-              <a:t>‹#›</a:t>
+              <a:t>‹nº›</a:t>
             </a:fld>
             <a:endParaRPr lang="pt-BR"/>
           </a:p>
@@ -1393,7 +1394,7 @@
           <a:p>
             <a:fld id="{542FF06D-87BF-405F-9790-318F41D0CF65}" type="slidenum">
               <a:rPr lang="pt-BR" smtClean="0"/>
-              <a:t>‹#›</a:t>
+              <a:t>‹nº›</a:t>
             </a:fld>
             <a:endParaRPr lang="pt-BR"/>
           </a:p>
@@ -1805,7 +1806,7 @@
           <a:p>
             <a:fld id="{542FF06D-87BF-405F-9790-318F41D0CF65}" type="slidenum">
               <a:rPr lang="pt-BR" smtClean="0"/>
-              <a:t>‹#›</a:t>
+              <a:t>‹nº›</a:t>
             </a:fld>
             <a:endParaRPr lang="pt-BR"/>
           </a:p>
@@ -1946,7 +1947,7 @@
           <a:p>
             <a:fld id="{542FF06D-87BF-405F-9790-318F41D0CF65}" type="slidenum">
               <a:rPr lang="pt-BR" smtClean="0"/>
-              <a:t>‹#›</a:t>
+              <a:t>‹nº›</a:t>
             </a:fld>
             <a:endParaRPr lang="pt-BR"/>
           </a:p>
@@ -2059,7 +2060,7 @@
           <a:p>
             <a:fld id="{542FF06D-87BF-405F-9790-318F41D0CF65}" type="slidenum">
               <a:rPr lang="pt-BR" smtClean="0"/>
-              <a:t>‹#›</a:t>
+              <a:t>‹nº›</a:t>
             </a:fld>
             <a:endParaRPr lang="pt-BR"/>
           </a:p>
@@ -2370,7 +2371,7 @@
           <a:p>
             <a:fld id="{542FF06D-87BF-405F-9790-318F41D0CF65}" type="slidenum">
               <a:rPr lang="pt-BR" smtClean="0"/>
-              <a:t>‹#›</a:t>
+              <a:t>‹nº›</a:t>
             </a:fld>
             <a:endParaRPr lang="pt-BR"/>
           </a:p>
@@ -2658,7 +2659,7 @@
           <a:p>
             <a:fld id="{542FF06D-87BF-405F-9790-318F41D0CF65}" type="slidenum">
               <a:rPr lang="pt-BR" smtClean="0"/>
-              <a:t>‹#›</a:t>
+              <a:t>‹nº›</a:t>
             </a:fld>
             <a:endParaRPr lang="pt-BR"/>
           </a:p>
@@ -2944,7 +2945,7 @@
           <a:p>
             <a:fld id="{542FF06D-87BF-405F-9790-318F41D0CF65}" type="slidenum">
               <a:rPr lang="pt-BR" smtClean="0"/>
-              <a:t>‹#›</a:t>
+              <a:t>‹nº›</a:t>
             </a:fld>
             <a:endParaRPr lang="pt-BR"/>
           </a:p>
@@ -3441,7 +3442,7 @@
             </a:r>
           </a:p>
           <a:p>
-            <a:pPr marL="914400" lvl="1" indent="-457200" algn="just">
+            <a:pPr marL="666750" lvl="1" indent="-293688" algn="just">
               <a:buFont typeface="+mj-lt"/>
               <a:buAutoNum type="alphaLcPeriod"/>
             </a:pPr>
@@ -3458,7 +3459,7 @@
             </a:r>
           </a:p>
           <a:p>
-            <a:pPr marL="914400" lvl="1" indent="-457200" algn="just">
+            <a:pPr marL="666750" lvl="1" indent="-293688" algn="just">
               <a:buFont typeface="+mj-lt"/>
               <a:buAutoNum type="alphaLcPeriod"/>
             </a:pPr>
@@ -3475,7 +3476,7 @@
             </a:r>
           </a:p>
           <a:p>
-            <a:pPr marL="914400" lvl="1" indent="-457200" algn="just">
+            <a:pPr marL="666750" lvl="1" indent="-293688" algn="just">
               <a:buFont typeface="+mj-lt"/>
               <a:buAutoNum type="alphaLcPeriod"/>
             </a:pPr>
@@ -3492,7 +3493,7 @@
             </a:r>
           </a:p>
           <a:p>
-            <a:pPr marL="914400" lvl="1" indent="-457200" algn="just">
+            <a:pPr marL="666750" lvl="1" indent="-293688" algn="just">
               <a:buFont typeface="+mj-lt"/>
               <a:buAutoNum type="alphaLcPeriod"/>
             </a:pPr>
@@ -3680,7 +3681,7 @@
         <p:spPr>
           <a:xfrm>
             <a:off x="0" y="359450"/>
-            <a:ext cx="5643012" cy="905773"/>
+            <a:ext cx="5961600" cy="905773"/>
           </a:xfrm>
           <a:prstGeom prst="homePlate">
             <a:avLst/>
@@ -3712,7 +3713,7 @@
           <a:p>
             <a:pPr algn="ctr"/>
             <a:r>
-              <a:rPr lang="pt-BR" sz="4400" dirty="0">
+              <a:rPr lang="pt-BR" sz="4000" dirty="0">
                 <a:solidFill>
                   <a:schemeClr val="bg1"/>
                 </a:solidFill>
@@ -3806,7 +3807,7 @@
             </a:r>
           </a:p>
           <a:p>
-            <a:pPr lvl="1" algn="just"/>
+            <a:pPr marL="666750" lvl="1" algn="just"/>
             <a:r>
               <a:rPr lang="pt-BR" sz="1800" dirty="0">
                 <a:solidFill>
@@ -3819,7 +3820,7 @@
             </a:r>
           </a:p>
           <a:p>
-            <a:pPr lvl="1" algn="just"/>
+            <a:pPr marL="666750" lvl="1" algn="just"/>
             <a:r>
               <a:rPr lang="pt-BR" sz="1800" dirty="0">
                 <a:solidFill>
@@ -3832,7 +3833,7 @@
             </a:r>
           </a:p>
           <a:p>
-            <a:pPr lvl="1" algn="just"/>
+            <a:pPr marL="666750" lvl="1" algn="just"/>
             <a:r>
               <a:rPr lang="pt-BR" sz="1800" dirty="0">
                 <a:solidFill>
@@ -3845,7 +3846,7 @@
             </a:r>
           </a:p>
           <a:p>
-            <a:pPr lvl="1" algn="just"/>
+            <a:pPr marL="666750" lvl="1" algn="just"/>
             <a:r>
               <a:rPr lang="pt-BR" sz="1800" dirty="0">
                 <a:solidFill>
@@ -3858,7 +3859,7 @@
             </a:r>
           </a:p>
           <a:p>
-            <a:pPr lvl="1" algn="just"/>
+            <a:pPr marL="666750" lvl="1" algn="just"/>
             <a:r>
               <a:rPr lang="pt-BR" sz="1800" dirty="0">
                 <a:solidFill>
@@ -3935,7 +3936,7 @@
         <p:spPr>
           <a:xfrm>
             <a:off x="0" y="383391"/>
-            <a:ext cx="5643012" cy="905773"/>
+            <a:ext cx="5961600" cy="905773"/>
           </a:xfrm>
           <a:prstGeom prst="homePlate">
             <a:avLst/>
@@ -3967,7 +3968,7 @@
           <a:p>
             <a:pPr algn="ctr"/>
             <a:r>
-              <a:rPr lang="pt-BR" sz="4400" dirty="0">
+              <a:rPr lang="pt-BR" sz="4000" dirty="0">
                 <a:solidFill>
                   <a:schemeClr val="bg1"/>
                 </a:solidFill>
@@ -4298,7 +4299,7 @@
               <a:buNone/>
             </a:pPr>
             <a:r>
-              <a:rPr lang="pt-BR" sz="1600" b="1" dirty="0">
+              <a:rPr lang="pt-BR" sz="1600" dirty="0">
                 <a:solidFill>
                   <a:schemeClr val="bg2">
                     <a:lumMod val="25000"/>
@@ -4310,7 +4311,7 @@
               <a:t>O desenvolvimento dos scripts foram realizados utilizando a plataforma Google </a:t>
             </a:r>
             <a:r>
-              <a:rPr lang="pt-BR" sz="1600" b="1" dirty="0" err="1">
+              <a:rPr lang="pt-BR" sz="1600" dirty="0" err="1">
                 <a:solidFill>
                   <a:schemeClr val="bg2">
                     <a:lumMod val="25000"/>
@@ -4322,7 +4323,7 @@
               <a:t>Colab</a:t>
             </a:r>
             <a:r>
-              <a:rPr lang="pt-BR" sz="1600" b="1" dirty="0">
+              <a:rPr lang="pt-BR" sz="1600" dirty="0">
                 <a:solidFill>
                   <a:schemeClr val="bg2">
                     <a:lumMod val="25000"/>
@@ -4334,7 +4335,7 @@
               <a:t>, onde é possível criar </a:t>
             </a:r>
             <a:r>
-              <a:rPr lang="pt-BR" sz="1600" b="1" dirty="0" err="1">
+              <a:rPr lang="pt-BR" sz="1600" dirty="0" err="1">
                 <a:solidFill>
                   <a:schemeClr val="bg2">
                     <a:lumMod val="25000"/>
@@ -4346,7 +4347,7 @@
               <a:t>Jupyter</a:t>
             </a:r>
             <a:r>
-              <a:rPr lang="pt-BR" sz="1600" b="1" dirty="0">
+              <a:rPr lang="pt-BR" sz="1600" dirty="0">
                 <a:solidFill>
                   <a:schemeClr val="bg2">
                     <a:lumMod val="25000"/>
@@ -4358,7 +4359,7 @@
               <a:t> Notebooks em </a:t>
             </a:r>
             <a:r>
-              <a:rPr lang="pt-BR" sz="1600" b="1" dirty="0" err="1">
+              <a:rPr lang="pt-BR" sz="1600" dirty="0" err="1">
                 <a:solidFill>
                   <a:schemeClr val="bg2">
                     <a:lumMod val="25000"/>
@@ -4370,7 +4371,7 @@
               <a:t>python</a:t>
             </a:r>
             <a:r>
-              <a:rPr lang="pt-BR" sz="1600" b="1" dirty="0">
+              <a:rPr lang="pt-BR" sz="1600" dirty="0">
                 <a:solidFill>
                   <a:schemeClr val="bg2">
                     <a:lumMod val="25000"/>
@@ -4399,7 +4400,7 @@
         <p:spPr>
           <a:xfrm>
             <a:off x="-1" y="383391"/>
-            <a:ext cx="5962261" cy="905773"/>
+            <a:ext cx="5961600" cy="905773"/>
           </a:xfrm>
           <a:prstGeom prst="homePlate">
             <a:avLst/>
@@ -4431,7 +4432,7 @@
           <a:p>
             <a:pPr algn="ctr"/>
             <a:r>
-              <a:rPr lang="pt-BR" sz="4400" dirty="0">
+              <a:rPr lang="pt-BR" sz="4000" dirty="0">
                 <a:solidFill>
                   <a:schemeClr val="bg1"/>
                 </a:solidFill>
@@ -4643,7 +4644,7 @@
           <a:p>
             <a:pPr algn="ctr"/>
             <a:r>
-              <a:rPr lang="pt-BR" sz="4400" dirty="0">
+              <a:rPr lang="pt-BR" sz="4000" dirty="0">
                 <a:solidFill>
                   <a:schemeClr val="bg1"/>
                 </a:solidFill>
@@ -4776,7 +4777,7 @@
               <a:buChar char="•"/>
             </a:pPr>
             <a:r>
-              <a:rPr lang="pt-BR" sz="1600" b="1" dirty="0">
+              <a:rPr lang="pt-BR" sz="1600" dirty="0">
                 <a:solidFill>
                   <a:schemeClr val="bg2">
                     <a:lumMod val="10000"/>
@@ -4788,7 +4789,7 @@
               <a:t>Para a extração de informações dos livros, foi utilizado arquivos no formato .</a:t>
             </a:r>
             <a:r>
-              <a:rPr lang="pt-BR" sz="1600" b="1" dirty="0" err="1">
+              <a:rPr lang="pt-BR" sz="1600" dirty="0" err="1">
                 <a:solidFill>
                   <a:schemeClr val="bg2">
                     <a:lumMod val="10000"/>
@@ -4800,7 +4801,7 @@
               <a:t>txt</a:t>
             </a:r>
             <a:r>
-              <a:rPr lang="pt-BR" sz="1600" b="1" dirty="0">
+              <a:rPr lang="pt-BR" sz="1600" dirty="0">
                 <a:solidFill>
                   <a:schemeClr val="bg2">
                     <a:lumMod val="10000"/>
@@ -4823,7 +4824,7 @@
               <a:buFont typeface="Arial" panose="020B0604020202020204" pitchFamily="34" charset="0"/>
               <a:buChar char="•"/>
             </a:pPr>
-            <a:endParaRPr lang="pt-BR" sz="1600" b="1" dirty="0">
+            <a:endParaRPr lang="pt-BR" sz="1600" dirty="0">
               <a:solidFill>
                 <a:schemeClr val="bg2">
                   <a:lumMod val="10000"/>
@@ -4845,7 +4846,7 @@
               <a:buChar char="•"/>
             </a:pPr>
             <a:r>
-              <a:rPr lang="pt-BR" sz="1600" b="1" dirty="0">
+              <a:rPr lang="pt-BR" sz="1600" dirty="0">
                 <a:solidFill>
                   <a:schemeClr val="bg2">
                     <a:lumMod val="10000"/>
@@ -4857,7 +4858,7 @@
               <a:t>Para a extração de informações dos filmes, foi utilizado </a:t>
             </a:r>
             <a:r>
-              <a:rPr lang="pt-BR" sz="1600" b="1" dirty="0" err="1">
+              <a:rPr lang="pt-BR" sz="1600" dirty="0" err="1">
                 <a:solidFill>
                   <a:schemeClr val="bg2">
                     <a:lumMod val="10000"/>
@@ -4869,7 +4870,7 @@
               <a:t>datasets</a:t>
             </a:r>
             <a:r>
-              <a:rPr lang="pt-BR" sz="1600" b="1" dirty="0">
+              <a:rPr lang="pt-BR" sz="1600" dirty="0">
                 <a:solidFill>
                   <a:schemeClr val="bg2">
                     <a:lumMod val="10000"/>
@@ -4892,7 +4893,7 @@
               <a:buFont typeface="Arial" panose="020B0604020202020204" pitchFamily="34" charset="0"/>
               <a:buChar char="•"/>
             </a:pPr>
-            <a:endParaRPr lang="pt-BR" sz="1600" b="1" dirty="0">
+            <a:endParaRPr lang="pt-BR" sz="1600" dirty="0">
               <a:solidFill>
                 <a:schemeClr val="bg2">
                   <a:lumMod val="10000"/>
@@ -4912,7 +4913,7 @@
               </a:spcBef>
             </a:pPr>
             <a:r>
-              <a:rPr lang="pt-BR" sz="1600" b="1" dirty="0">
+              <a:rPr lang="pt-BR" sz="1600" dirty="0">
                 <a:solidFill>
                   <a:schemeClr val="bg2">
                     <a:lumMod val="10000"/>
@@ -5168,8 +5169,8 @@
         </p:nvSpPr>
         <p:spPr>
           <a:xfrm>
-            <a:off x="6229742" y="836277"/>
-            <a:ext cx="5643012" cy="2561269"/>
+            <a:off x="7259541" y="2148365"/>
+            <a:ext cx="3148717" cy="2561269"/>
           </a:xfrm>
           <a:prstGeom prst="rect">
             <a:avLst/>
@@ -5177,7 +5178,7 @@
         </p:spPr>
         <p:txBody>
           <a:bodyPr vert="horz" lIns="91440" tIns="45720" rIns="91440" bIns="45720" rtlCol="0">
-            <a:normAutofit/>
+            <a:normAutofit fontScale="92500" lnSpcReduction="20000"/>
           </a:bodyPr>
           <a:lstStyle>
             <a:lvl1pPr marL="228600" indent="-228600" algn="l" defTabSz="914400" rtl="0" eaLnBrk="1" latinLnBrk="0" hangingPunct="1">
@@ -5374,11 +5375,449 @@
             </a:endParaRPr>
           </a:p>
           <a:p>
-            <a:pPr marL="0" indent="0" algn="just">
-              <a:buFont typeface="Arial" panose="020B0604020202020204" pitchFamily="34" charset="0"/>
-              <a:buNone/>
+            <a:pPr marL="177800" indent="-177800" algn="just">
+              <a:buFont typeface="+mj-lt"/>
+              <a:buAutoNum type="arabicPeriod"/>
             </a:pPr>
-            <a:endParaRPr lang="pt-BR" sz="1600" b="1" dirty="0">
+            <a:r>
+              <a:rPr lang="pt-BR" sz="1600" dirty="0">
+                <a:solidFill>
+                  <a:schemeClr val="bg2">
+                    <a:lumMod val="25000"/>
+                  </a:schemeClr>
+                </a:solidFill>
+                <a:ea typeface="Calibri" panose="020F0502020204030204" pitchFamily="34" charset="0"/>
+                <a:cs typeface="Arial" panose="020B0604020202020204" pitchFamily="34" charset="0"/>
+              </a:rPr>
+              <a:t>The </a:t>
+            </a:r>
+            <a:r>
+              <a:rPr lang="pt-BR" sz="1600" dirty="0" err="1">
+                <a:solidFill>
+                  <a:schemeClr val="bg2">
+                    <a:lumMod val="25000"/>
+                  </a:schemeClr>
+                </a:solidFill>
+                <a:ea typeface="Calibri" panose="020F0502020204030204" pitchFamily="34" charset="0"/>
+                <a:cs typeface="Arial" panose="020B0604020202020204" pitchFamily="34" charset="0"/>
+              </a:rPr>
+              <a:t>Philosopher's</a:t>
+            </a:r>
+            <a:r>
+              <a:rPr lang="pt-BR" sz="1600" dirty="0">
+                <a:solidFill>
+                  <a:schemeClr val="bg2">
+                    <a:lumMod val="25000"/>
+                  </a:schemeClr>
+                </a:solidFill>
+                <a:ea typeface="Calibri" panose="020F0502020204030204" pitchFamily="34" charset="0"/>
+                <a:cs typeface="Arial" panose="020B0604020202020204" pitchFamily="34" charset="0"/>
+              </a:rPr>
+              <a:t> Stone</a:t>
+            </a:r>
+          </a:p>
+          <a:p>
+            <a:pPr marL="177800" indent="-177800" algn="just">
+              <a:buFont typeface="+mj-lt"/>
+              <a:buAutoNum type="arabicPeriod"/>
+            </a:pPr>
+            <a:r>
+              <a:rPr lang="pt-BR" sz="1600" dirty="0">
+                <a:solidFill>
+                  <a:schemeClr val="bg2">
+                    <a:lumMod val="25000"/>
+                  </a:schemeClr>
+                </a:solidFill>
+                <a:ea typeface="Calibri" panose="020F0502020204030204" pitchFamily="34" charset="0"/>
+                <a:cs typeface="Arial" panose="020B0604020202020204" pitchFamily="34" charset="0"/>
+              </a:rPr>
+              <a:t>The Chamber </a:t>
+            </a:r>
+            <a:r>
+              <a:rPr lang="pt-BR" sz="1600" dirty="0" err="1">
+                <a:solidFill>
+                  <a:schemeClr val="bg2">
+                    <a:lumMod val="25000"/>
+                  </a:schemeClr>
+                </a:solidFill>
+                <a:ea typeface="Calibri" panose="020F0502020204030204" pitchFamily="34" charset="0"/>
+                <a:cs typeface="Arial" panose="020B0604020202020204" pitchFamily="34" charset="0"/>
+              </a:rPr>
+              <a:t>of</a:t>
+            </a:r>
+            <a:r>
+              <a:rPr lang="pt-BR" sz="1600" dirty="0">
+                <a:solidFill>
+                  <a:schemeClr val="bg2">
+                    <a:lumMod val="25000"/>
+                  </a:schemeClr>
+                </a:solidFill>
+                <a:ea typeface="Calibri" panose="020F0502020204030204" pitchFamily="34" charset="0"/>
+                <a:cs typeface="Arial" panose="020B0604020202020204" pitchFamily="34" charset="0"/>
+              </a:rPr>
+              <a:t> </a:t>
+            </a:r>
+            <a:r>
+              <a:rPr lang="pt-BR" sz="1600" dirty="0" err="1">
+                <a:solidFill>
+                  <a:schemeClr val="bg2">
+                    <a:lumMod val="25000"/>
+                  </a:schemeClr>
+                </a:solidFill>
+                <a:ea typeface="Calibri" panose="020F0502020204030204" pitchFamily="34" charset="0"/>
+                <a:cs typeface="Arial" panose="020B0604020202020204" pitchFamily="34" charset="0"/>
+              </a:rPr>
+              <a:t>Secrets</a:t>
+            </a:r>
+            <a:endParaRPr lang="pt-BR" sz="1600" dirty="0">
+              <a:solidFill>
+                <a:schemeClr val="bg2">
+                  <a:lumMod val="25000"/>
+                </a:schemeClr>
+              </a:solidFill>
+              <a:ea typeface="Calibri" panose="020F0502020204030204" pitchFamily="34" charset="0"/>
+              <a:cs typeface="Arial" panose="020B0604020202020204" pitchFamily="34" charset="0"/>
+            </a:endParaRPr>
+          </a:p>
+          <a:p>
+            <a:pPr marL="177800" indent="-177800" algn="just">
+              <a:buFont typeface="+mj-lt"/>
+              <a:buAutoNum type="arabicPeriod"/>
+            </a:pPr>
+            <a:r>
+              <a:rPr lang="pt-BR" sz="1600" dirty="0">
+                <a:solidFill>
+                  <a:schemeClr val="bg2">
+                    <a:lumMod val="25000"/>
+                  </a:schemeClr>
+                </a:solidFill>
+                <a:ea typeface="Calibri" panose="020F0502020204030204" pitchFamily="34" charset="0"/>
+                <a:cs typeface="Arial" panose="020B0604020202020204" pitchFamily="34" charset="0"/>
+              </a:rPr>
+              <a:t>The </a:t>
+            </a:r>
+            <a:r>
+              <a:rPr lang="pt-BR" sz="1600" dirty="0" err="1">
+                <a:solidFill>
+                  <a:schemeClr val="bg2">
+                    <a:lumMod val="25000"/>
+                  </a:schemeClr>
+                </a:solidFill>
+                <a:ea typeface="Calibri" panose="020F0502020204030204" pitchFamily="34" charset="0"/>
+                <a:cs typeface="Arial" panose="020B0604020202020204" pitchFamily="34" charset="0"/>
+              </a:rPr>
+              <a:t>Prisoner</a:t>
+            </a:r>
+            <a:r>
+              <a:rPr lang="pt-BR" sz="1600" dirty="0">
+                <a:solidFill>
+                  <a:schemeClr val="bg2">
+                    <a:lumMod val="25000"/>
+                  </a:schemeClr>
+                </a:solidFill>
+                <a:ea typeface="Calibri" panose="020F0502020204030204" pitchFamily="34" charset="0"/>
+                <a:cs typeface="Arial" panose="020B0604020202020204" pitchFamily="34" charset="0"/>
+              </a:rPr>
+              <a:t> </a:t>
+            </a:r>
+            <a:r>
+              <a:rPr lang="pt-BR" sz="1600" dirty="0" err="1">
+                <a:solidFill>
+                  <a:schemeClr val="bg2">
+                    <a:lumMod val="25000"/>
+                  </a:schemeClr>
+                </a:solidFill>
+                <a:ea typeface="Calibri" panose="020F0502020204030204" pitchFamily="34" charset="0"/>
+                <a:cs typeface="Arial" panose="020B0604020202020204" pitchFamily="34" charset="0"/>
+              </a:rPr>
+              <a:t>of</a:t>
+            </a:r>
+            <a:r>
+              <a:rPr lang="pt-BR" sz="1600" dirty="0">
+                <a:solidFill>
+                  <a:schemeClr val="bg2">
+                    <a:lumMod val="25000"/>
+                  </a:schemeClr>
+                </a:solidFill>
+                <a:ea typeface="Calibri" panose="020F0502020204030204" pitchFamily="34" charset="0"/>
+                <a:cs typeface="Arial" panose="020B0604020202020204" pitchFamily="34" charset="0"/>
+              </a:rPr>
+              <a:t> Azkaban</a:t>
+            </a:r>
+          </a:p>
+          <a:p>
+            <a:pPr marL="177800" indent="-177800" algn="just">
+              <a:buFont typeface="+mj-lt"/>
+              <a:buAutoNum type="arabicPeriod"/>
+            </a:pPr>
+            <a:r>
+              <a:rPr lang="pt-BR" sz="1600" dirty="0">
+                <a:solidFill>
+                  <a:schemeClr val="bg2">
+                    <a:lumMod val="25000"/>
+                  </a:schemeClr>
+                </a:solidFill>
+                <a:ea typeface="Calibri" panose="020F0502020204030204" pitchFamily="34" charset="0"/>
+                <a:cs typeface="Arial" panose="020B0604020202020204" pitchFamily="34" charset="0"/>
+              </a:rPr>
+              <a:t>The </a:t>
+            </a:r>
+            <a:r>
+              <a:rPr lang="pt-BR" sz="1600" dirty="0" err="1">
+                <a:solidFill>
+                  <a:schemeClr val="bg2">
+                    <a:lumMod val="25000"/>
+                  </a:schemeClr>
+                </a:solidFill>
+                <a:ea typeface="Calibri" panose="020F0502020204030204" pitchFamily="34" charset="0"/>
+                <a:cs typeface="Arial" panose="020B0604020202020204" pitchFamily="34" charset="0"/>
+              </a:rPr>
+              <a:t>Goblet</a:t>
+            </a:r>
+            <a:r>
+              <a:rPr lang="pt-BR" sz="1600" dirty="0">
+                <a:solidFill>
+                  <a:schemeClr val="bg2">
+                    <a:lumMod val="25000"/>
+                  </a:schemeClr>
+                </a:solidFill>
+                <a:ea typeface="Calibri" panose="020F0502020204030204" pitchFamily="34" charset="0"/>
+                <a:cs typeface="Arial" panose="020B0604020202020204" pitchFamily="34" charset="0"/>
+              </a:rPr>
+              <a:t> </a:t>
+            </a:r>
+            <a:r>
+              <a:rPr lang="pt-BR" sz="1600" dirty="0" err="1">
+                <a:solidFill>
+                  <a:schemeClr val="bg2">
+                    <a:lumMod val="25000"/>
+                  </a:schemeClr>
+                </a:solidFill>
+                <a:ea typeface="Calibri" panose="020F0502020204030204" pitchFamily="34" charset="0"/>
+                <a:cs typeface="Arial" panose="020B0604020202020204" pitchFamily="34" charset="0"/>
+              </a:rPr>
+              <a:t>of</a:t>
+            </a:r>
+            <a:r>
+              <a:rPr lang="pt-BR" sz="1600" dirty="0">
+                <a:solidFill>
+                  <a:schemeClr val="bg2">
+                    <a:lumMod val="25000"/>
+                  </a:schemeClr>
+                </a:solidFill>
+                <a:ea typeface="Calibri" panose="020F0502020204030204" pitchFamily="34" charset="0"/>
+                <a:cs typeface="Arial" panose="020B0604020202020204" pitchFamily="34" charset="0"/>
+              </a:rPr>
+              <a:t> </a:t>
+            </a:r>
+            <a:r>
+              <a:rPr lang="pt-BR" sz="1600" dirty="0" err="1">
+                <a:solidFill>
+                  <a:schemeClr val="bg2">
+                    <a:lumMod val="25000"/>
+                  </a:schemeClr>
+                </a:solidFill>
+                <a:ea typeface="Calibri" panose="020F0502020204030204" pitchFamily="34" charset="0"/>
+                <a:cs typeface="Arial" panose="020B0604020202020204" pitchFamily="34" charset="0"/>
+              </a:rPr>
+              <a:t>Fire</a:t>
+            </a:r>
+            <a:endParaRPr lang="pt-BR" sz="1600" dirty="0">
+              <a:solidFill>
+                <a:schemeClr val="bg2">
+                  <a:lumMod val="25000"/>
+                </a:schemeClr>
+              </a:solidFill>
+              <a:ea typeface="Calibri" panose="020F0502020204030204" pitchFamily="34" charset="0"/>
+              <a:cs typeface="Arial" panose="020B0604020202020204" pitchFamily="34" charset="0"/>
+            </a:endParaRPr>
+          </a:p>
+          <a:p>
+            <a:pPr marL="177800" indent="-177800" algn="just">
+              <a:buFont typeface="+mj-lt"/>
+              <a:buAutoNum type="arabicPeriod"/>
+            </a:pPr>
+            <a:r>
+              <a:rPr lang="pt-BR" sz="1600" dirty="0">
+                <a:solidFill>
+                  <a:schemeClr val="bg2">
+                    <a:lumMod val="25000"/>
+                  </a:schemeClr>
+                </a:solidFill>
+                <a:ea typeface="Calibri" panose="020F0502020204030204" pitchFamily="34" charset="0"/>
+                <a:cs typeface="Arial" panose="020B0604020202020204" pitchFamily="34" charset="0"/>
+              </a:rPr>
+              <a:t>The </a:t>
+            </a:r>
+            <a:r>
+              <a:rPr lang="pt-BR" sz="1600" dirty="0" err="1">
+                <a:solidFill>
+                  <a:schemeClr val="bg2">
+                    <a:lumMod val="25000"/>
+                  </a:schemeClr>
+                </a:solidFill>
+                <a:ea typeface="Calibri" panose="020F0502020204030204" pitchFamily="34" charset="0"/>
+                <a:cs typeface="Arial" panose="020B0604020202020204" pitchFamily="34" charset="0"/>
+              </a:rPr>
+              <a:t>Order</a:t>
+            </a:r>
+            <a:r>
+              <a:rPr lang="pt-BR" sz="1600" dirty="0">
+                <a:solidFill>
+                  <a:schemeClr val="bg2">
+                    <a:lumMod val="25000"/>
+                  </a:schemeClr>
+                </a:solidFill>
+                <a:ea typeface="Calibri" panose="020F0502020204030204" pitchFamily="34" charset="0"/>
+                <a:cs typeface="Arial" panose="020B0604020202020204" pitchFamily="34" charset="0"/>
+              </a:rPr>
+              <a:t> </a:t>
+            </a:r>
+            <a:r>
+              <a:rPr lang="pt-BR" sz="1600" dirty="0" err="1">
+                <a:solidFill>
+                  <a:schemeClr val="bg2">
+                    <a:lumMod val="25000"/>
+                  </a:schemeClr>
+                </a:solidFill>
+                <a:ea typeface="Calibri" panose="020F0502020204030204" pitchFamily="34" charset="0"/>
+                <a:cs typeface="Arial" panose="020B0604020202020204" pitchFamily="34" charset="0"/>
+              </a:rPr>
+              <a:t>of</a:t>
+            </a:r>
+            <a:r>
+              <a:rPr lang="pt-BR" sz="1600" dirty="0">
+                <a:solidFill>
+                  <a:schemeClr val="bg2">
+                    <a:lumMod val="25000"/>
+                  </a:schemeClr>
+                </a:solidFill>
+                <a:ea typeface="Calibri" panose="020F0502020204030204" pitchFamily="34" charset="0"/>
+                <a:cs typeface="Arial" panose="020B0604020202020204" pitchFamily="34" charset="0"/>
+              </a:rPr>
+              <a:t> </a:t>
+            </a:r>
+            <a:r>
+              <a:rPr lang="pt-BR" sz="1600" dirty="0" err="1">
+                <a:solidFill>
+                  <a:schemeClr val="bg2">
+                    <a:lumMod val="25000"/>
+                  </a:schemeClr>
+                </a:solidFill>
+                <a:ea typeface="Calibri" panose="020F0502020204030204" pitchFamily="34" charset="0"/>
+                <a:cs typeface="Arial" panose="020B0604020202020204" pitchFamily="34" charset="0"/>
+              </a:rPr>
+              <a:t>the</a:t>
+            </a:r>
+            <a:r>
+              <a:rPr lang="pt-BR" sz="1600" dirty="0">
+                <a:solidFill>
+                  <a:schemeClr val="bg2">
+                    <a:lumMod val="25000"/>
+                  </a:schemeClr>
+                </a:solidFill>
+                <a:ea typeface="Calibri" panose="020F0502020204030204" pitchFamily="34" charset="0"/>
+                <a:cs typeface="Arial" panose="020B0604020202020204" pitchFamily="34" charset="0"/>
+              </a:rPr>
+              <a:t> Phoenix</a:t>
+            </a:r>
+          </a:p>
+          <a:p>
+            <a:pPr marL="177800" indent="-177800" algn="just">
+              <a:buFont typeface="+mj-lt"/>
+              <a:buAutoNum type="arabicPeriod"/>
+            </a:pPr>
+            <a:r>
+              <a:rPr lang="pt-BR" sz="1600" dirty="0">
+                <a:solidFill>
+                  <a:schemeClr val="bg2">
+                    <a:lumMod val="25000"/>
+                  </a:schemeClr>
+                </a:solidFill>
+                <a:ea typeface="Calibri" panose="020F0502020204030204" pitchFamily="34" charset="0"/>
+                <a:cs typeface="Arial" panose="020B0604020202020204" pitchFamily="34" charset="0"/>
+              </a:rPr>
+              <a:t>The Half </a:t>
+            </a:r>
+            <a:r>
+              <a:rPr lang="pt-BR" sz="1600" dirty="0" err="1">
+                <a:solidFill>
+                  <a:schemeClr val="bg2">
+                    <a:lumMod val="25000"/>
+                  </a:schemeClr>
+                </a:solidFill>
+                <a:ea typeface="Calibri" panose="020F0502020204030204" pitchFamily="34" charset="0"/>
+                <a:cs typeface="Arial" panose="020B0604020202020204" pitchFamily="34" charset="0"/>
+              </a:rPr>
+              <a:t>Blood</a:t>
+            </a:r>
+            <a:r>
+              <a:rPr lang="pt-BR" sz="1600" dirty="0">
+                <a:solidFill>
+                  <a:schemeClr val="bg2">
+                    <a:lumMod val="25000"/>
+                  </a:schemeClr>
+                </a:solidFill>
+                <a:ea typeface="Calibri" panose="020F0502020204030204" pitchFamily="34" charset="0"/>
+                <a:cs typeface="Arial" panose="020B0604020202020204" pitchFamily="34" charset="0"/>
+              </a:rPr>
+              <a:t> Prince</a:t>
+            </a:r>
+          </a:p>
+          <a:p>
+            <a:pPr marL="177800" indent="-177800" algn="just">
+              <a:buFont typeface="+mj-lt"/>
+              <a:buAutoNum type="arabicPeriod"/>
+            </a:pPr>
+            <a:r>
+              <a:rPr lang="pt-BR" sz="1600" dirty="0">
+                <a:solidFill>
+                  <a:schemeClr val="bg2">
+                    <a:lumMod val="25000"/>
+                  </a:schemeClr>
+                </a:solidFill>
+                <a:ea typeface="Calibri" panose="020F0502020204030204" pitchFamily="34" charset="0"/>
+                <a:cs typeface="Arial" panose="020B0604020202020204" pitchFamily="34" charset="0"/>
+              </a:rPr>
+              <a:t>The </a:t>
+            </a:r>
+            <a:r>
+              <a:rPr lang="pt-BR" sz="1600" dirty="0" err="1">
+                <a:solidFill>
+                  <a:schemeClr val="bg2">
+                    <a:lumMod val="25000"/>
+                  </a:schemeClr>
+                </a:solidFill>
+                <a:ea typeface="Calibri" panose="020F0502020204030204" pitchFamily="34" charset="0"/>
+                <a:cs typeface="Arial" panose="020B0604020202020204" pitchFamily="34" charset="0"/>
+              </a:rPr>
+              <a:t>Deathly</a:t>
+            </a:r>
+            <a:r>
+              <a:rPr lang="pt-BR" sz="1600" dirty="0">
+                <a:solidFill>
+                  <a:schemeClr val="bg2">
+                    <a:lumMod val="25000"/>
+                  </a:schemeClr>
+                </a:solidFill>
+                <a:ea typeface="Calibri" panose="020F0502020204030204" pitchFamily="34" charset="0"/>
+                <a:cs typeface="Arial" panose="020B0604020202020204" pitchFamily="34" charset="0"/>
+              </a:rPr>
+              <a:t> </a:t>
+            </a:r>
+            <a:r>
+              <a:rPr lang="pt-BR" sz="1600" dirty="0" err="1">
+                <a:solidFill>
+                  <a:schemeClr val="bg2">
+                    <a:lumMod val="25000"/>
+                  </a:schemeClr>
+                </a:solidFill>
+                <a:ea typeface="Calibri" panose="020F0502020204030204" pitchFamily="34" charset="0"/>
+                <a:cs typeface="Arial" panose="020B0604020202020204" pitchFamily="34" charset="0"/>
+              </a:rPr>
+              <a:t>Hallows</a:t>
+            </a:r>
+            <a:endParaRPr lang="pt-BR" sz="1600" dirty="0">
               <a:solidFill>
                 <a:schemeClr val="bg2">
                   <a:lumMod val="25000"/>
@@ -5467,7 +5906,7 @@
           <a:p>
             <a:pPr algn="ctr"/>
             <a:r>
-              <a:rPr lang="pt-BR" sz="4400" dirty="0">
+              <a:rPr lang="pt-BR" sz="4000" dirty="0">
                 <a:solidFill>
                   <a:schemeClr val="bg1"/>
                 </a:solidFill>
@@ -5550,8 +5989,8 @@
         </p:nvSpPr>
         <p:spPr>
           <a:xfrm>
-            <a:off x="319248" y="3254056"/>
-            <a:ext cx="5643012" cy="2148368"/>
+            <a:off x="319248" y="2947307"/>
+            <a:ext cx="5643012" cy="2740421"/>
           </a:xfrm>
           <a:prstGeom prst="rect">
             <a:avLst/>
@@ -5600,7 +6039,7 @@
               <a:buChar char="•"/>
             </a:pPr>
             <a:r>
-              <a:rPr lang="pt-BR" sz="1600" b="1" dirty="0">
+              <a:rPr lang="pt-BR" sz="1600" dirty="0">
                 <a:solidFill>
                   <a:schemeClr val="bg2">
                     <a:lumMod val="10000"/>
@@ -5609,51 +6048,92 @@
                 <a:ea typeface="Calibri" panose="020F0502020204030204" pitchFamily="34" charset="0"/>
                 <a:cs typeface="Arial" panose="020B0604020202020204" pitchFamily="34" charset="0"/>
               </a:rPr>
-              <a:t>Para a extração de informações dos livros, foi utilizado arquivos no formato .</a:t>
-            </a:r>
-            <a:r>
-              <a:rPr lang="pt-BR" sz="1600" b="1" dirty="0" err="1">
-                <a:solidFill>
-                  <a:schemeClr val="bg2">
-                    <a:lumMod val="10000"/>
-                  </a:schemeClr>
-                </a:solidFill>
-                <a:ea typeface="Calibri" panose="020F0502020204030204" pitchFamily="34" charset="0"/>
-                <a:cs typeface="Arial" panose="020B0604020202020204" pitchFamily="34" charset="0"/>
-              </a:rPr>
-              <a:t>txt</a:t>
-            </a:r>
-            <a:r>
-              <a:rPr lang="pt-BR" sz="1600" b="1" dirty="0">
-                <a:solidFill>
-                  <a:schemeClr val="bg2">
-                    <a:lumMod val="10000"/>
-                  </a:schemeClr>
-                </a:solidFill>
-                <a:ea typeface="Calibri" panose="020F0502020204030204" pitchFamily="34" charset="0"/>
-                <a:cs typeface="Arial" panose="020B0604020202020204" pitchFamily="34" charset="0"/>
-              </a:rPr>
-              <a:t>.</a:t>
-            </a:r>
-          </a:p>
-          <a:p>
-            <a:pPr>
+              <a:t>Remoção de dados “desnecessários”.</a:t>
+            </a:r>
+          </a:p>
+          <a:p>
+            <a:pPr marL="685800" lvl="1" indent="-228600">
               <a:lnSpc>
                 <a:spcPct val="90000"/>
               </a:lnSpc>
               <a:spcBef>
                 <a:spcPts val="1000"/>
               </a:spcBef>
+              <a:buFont typeface="Arial" panose="020B0604020202020204" pitchFamily="34" charset="0"/>
+              <a:buChar char="•"/>
             </a:pPr>
-            <a:endParaRPr lang="pt-BR" sz="1600" b="1" dirty="0">
-              <a:solidFill>
-                <a:schemeClr val="bg2">
-                  <a:lumMod val="10000"/>
-                </a:schemeClr>
-              </a:solidFill>
-              <a:ea typeface="Calibri" panose="020F0502020204030204" pitchFamily="34" charset="0"/>
-              <a:cs typeface="Arial" panose="020B0604020202020204" pitchFamily="34" charset="0"/>
-            </a:endParaRPr>
+            <a:r>
+              <a:rPr lang="pt-BR" sz="1600" dirty="0">
+                <a:solidFill>
+                  <a:schemeClr val="bg2">
+                    <a:lumMod val="10000"/>
+                  </a:schemeClr>
+                </a:solidFill>
+                <a:ea typeface="Calibri" panose="020F0502020204030204" pitchFamily="34" charset="0"/>
+                <a:cs typeface="Arial" panose="020B0604020202020204" pitchFamily="34" charset="0"/>
+              </a:rPr>
+              <a:t>Rodapé, no caso dos livros;</a:t>
+            </a:r>
+          </a:p>
+          <a:p>
+            <a:pPr marL="685800" lvl="1" indent="-228600">
+              <a:lnSpc>
+                <a:spcPct val="90000"/>
+              </a:lnSpc>
+              <a:spcBef>
+                <a:spcPts val="1000"/>
+              </a:spcBef>
+              <a:buFont typeface="Arial" panose="020B0604020202020204" pitchFamily="34" charset="0"/>
+              <a:buChar char="•"/>
+            </a:pPr>
+            <a:r>
+              <a:rPr lang="pt-BR" sz="1600" dirty="0" err="1">
+                <a:solidFill>
+                  <a:schemeClr val="bg2">
+                    <a:lumMod val="10000"/>
+                  </a:schemeClr>
+                </a:solidFill>
+                <a:ea typeface="Calibri" panose="020F0502020204030204" pitchFamily="34" charset="0"/>
+                <a:cs typeface="Arial" panose="020B0604020202020204" pitchFamily="34" charset="0"/>
+              </a:rPr>
+              <a:t>Stopwords</a:t>
+            </a:r>
+            <a:r>
+              <a:rPr lang="pt-BR" sz="1600" dirty="0">
+                <a:solidFill>
+                  <a:schemeClr val="bg2">
+                    <a:lumMod val="10000"/>
+                  </a:schemeClr>
+                </a:solidFill>
+                <a:ea typeface="Calibri" panose="020F0502020204030204" pitchFamily="34" charset="0"/>
+                <a:cs typeface="Arial" panose="020B0604020202020204" pitchFamily="34" charset="0"/>
+              </a:rPr>
+              <a:t>;</a:t>
+            </a:r>
+          </a:p>
+          <a:p>
+            <a:pPr marL="685800" lvl="1" indent="-228600">
+              <a:lnSpc>
+                <a:spcPct val="90000"/>
+              </a:lnSpc>
+              <a:spcBef>
+                <a:spcPts val="1000"/>
+              </a:spcBef>
+              <a:buFont typeface="Arial" panose="020B0604020202020204" pitchFamily="34" charset="0"/>
+              <a:buChar char="•"/>
+            </a:pPr>
+            <a:r>
+              <a:rPr lang="pt-BR" sz="1600" dirty="0">
+                <a:solidFill>
+                  <a:schemeClr val="bg2">
+                    <a:lumMod val="10000"/>
+                  </a:schemeClr>
+                </a:solidFill>
+                <a:ea typeface="Calibri" panose="020F0502020204030204" pitchFamily="34" charset="0"/>
+                <a:cs typeface="Arial" panose="020B0604020202020204" pitchFamily="34" charset="0"/>
+              </a:rPr>
+              <a:t>Caracteres especiais.</a:t>
+            </a:r>
           </a:p>
           <a:p>
             <a:pPr marL="228600" indent="-228600">
@@ -5667,7 +6147,7 @@
               <a:buChar char="•"/>
             </a:pPr>
             <a:r>
-              <a:rPr lang="pt-BR" sz="1600" b="1" dirty="0">
+              <a:rPr lang="pt-BR" sz="1600" dirty="0">
                 <a:solidFill>
                   <a:schemeClr val="bg2">
                     <a:lumMod val="10000"/>
@@ -5676,10 +6156,22 @@
                 <a:ea typeface="Calibri" panose="020F0502020204030204" pitchFamily="34" charset="0"/>
                 <a:cs typeface="Arial" panose="020B0604020202020204" pitchFamily="34" charset="0"/>
               </a:rPr>
-              <a:t>Para a extração de informações dos filmes, foi utilizado </a:t>
-            </a:r>
-            <a:r>
-              <a:rPr lang="pt-BR" sz="1600" b="1" dirty="0" err="1">
+              <a:t>Colocar todos os textos em minúsculo.</a:t>
+            </a:r>
+          </a:p>
+          <a:p>
+            <a:pPr marL="228600" indent="-228600">
+              <a:lnSpc>
+                <a:spcPct val="90000"/>
+              </a:lnSpc>
+              <a:spcBef>
+                <a:spcPts val="1000"/>
+              </a:spcBef>
+              <a:buFont typeface="Arial" panose="020B0604020202020204" pitchFamily="34" charset="0"/>
+              <a:buChar char="•"/>
+            </a:pPr>
+            <a:r>
+              <a:rPr lang="pt-BR" sz="1600" dirty="0">
                 <a:solidFill>
                   <a:schemeClr val="bg2">
                     <a:lumMod val="10000"/>
@@ -5688,19 +6180,7 @@
                 <a:ea typeface="Calibri" panose="020F0502020204030204" pitchFamily="34" charset="0"/>
                 <a:cs typeface="Arial" panose="020B0604020202020204" pitchFamily="34" charset="0"/>
               </a:rPr>
-              <a:t>datasets</a:t>
-            </a:r>
-            <a:r>
-              <a:rPr lang="pt-BR" sz="1600" b="1" dirty="0">
-                <a:solidFill>
-                  <a:schemeClr val="bg2">
-                    <a:lumMod val="10000"/>
-                  </a:schemeClr>
-                </a:solidFill>
-                <a:ea typeface="Calibri" panose="020F0502020204030204" pitchFamily="34" charset="0"/>
-                <a:cs typeface="Arial" panose="020B0604020202020204" pitchFamily="34" charset="0"/>
-              </a:rPr>
-              <a:t> contendo os diálogos dos personagens que foram adaptados para os filmes da saga.</a:t>
+              <a:t>Aplicar as etapas do processamento de linguagem natural, disponibilizadas pela biblioteca NLTK.</a:t>
             </a:r>
           </a:p>
         </p:txBody>
@@ -5746,7 +6226,7 @@
                 <a:ea typeface="Calibri" panose="020F0502020204030204" pitchFamily="34" charset="0"/>
                 <a:cs typeface="Arial" panose="020B0604020202020204" pitchFamily="34" charset="0"/>
               </a:rPr>
-              <a:t>Para realizar a comparação entre as dados textuais da saga Harry Potter, foi necessário coletar as informações dos livros e das obras cinematográficas.</a:t>
+              <a:t>Para melhorar a análise dos dados textuais, ambas as bases de dados foram submetidas a mesma etapa de pré-processamento.</a:t>
             </a:r>
           </a:p>
           <a:p>
@@ -5857,10 +6337,1653 @@
           </a:p>
         </p:txBody>
       </p:sp>
+      <p:grpSp>
+        <p:nvGrpSpPr>
+          <p:cNvPr id="35" name="Agrupar 34">
+            <a:extLst>
+              <a:ext uri="{FF2B5EF4-FFF2-40B4-BE49-F238E27FC236}">
+                <a16:creationId xmlns:a16="http://schemas.microsoft.com/office/drawing/2014/main" id="{B2F5165B-9F8E-8DF6-601E-8A45A3EDD144}"/>
+              </a:ext>
+            </a:extLst>
+          </p:cNvPr>
+          <p:cNvGrpSpPr/>
+          <p:nvPr/>
+        </p:nvGrpSpPr>
+        <p:grpSpPr>
+          <a:xfrm>
+            <a:off x="7962558" y="522336"/>
+            <a:ext cx="2496622" cy="4477057"/>
+            <a:chOff x="7961828" y="1040376"/>
+            <a:chExt cx="2496622" cy="4477057"/>
+          </a:xfrm>
+        </p:grpSpPr>
+        <p:sp>
+          <p:nvSpPr>
+            <p:cNvPr id="3" name="Retângulo 2">
+              <a:extLst>
+                <a:ext uri="{FF2B5EF4-FFF2-40B4-BE49-F238E27FC236}">
+                  <a16:creationId xmlns:a16="http://schemas.microsoft.com/office/drawing/2014/main" id="{CB4A7FBA-0B77-9E01-280B-835E425E309C}"/>
+                </a:ext>
+              </a:extLst>
+            </p:cNvPr>
+            <p:cNvSpPr/>
+            <p:nvPr/>
+          </p:nvSpPr>
+          <p:spPr>
+            <a:xfrm>
+              <a:off x="7968343" y="4490357"/>
+              <a:ext cx="2490107" cy="342900"/>
+            </a:xfrm>
+            <a:prstGeom prst="rect">
+              <a:avLst/>
+            </a:prstGeom>
+            <a:solidFill>
+              <a:schemeClr val="tx2">
+                <a:lumMod val="75000"/>
+              </a:schemeClr>
+            </a:solidFill>
+          </p:spPr>
+          <p:style>
+            <a:lnRef idx="0">
+              <a:schemeClr val="accent3"/>
+            </a:lnRef>
+            <a:fillRef idx="3">
+              <a:schemeClr val="accent3"/>
+            </a:fillRef>
+            <a:effectRef idx="3">
+              <a:schemeClr val="accent3"/>
+            </a:effectRef>
+            <a:fontRef idx="minor">
+              <a:schemeClr val="lt1"/>
+            </a:fontRef>
+          </p:style>
+          <p:txBody>
+            <a:bodyPr rtlCol="0" anchor="ctr"/>
+            <a:lstStyle/>
+            <a:p>
+              <a:pPr algn="ctr"/>
+              <a:r>
+                <a:rPr lang="pt-BR" sz="1600" dirty="0" err="1"/>
+                <a:t>Tokenização</a:t>
+              </a:r>
+              <a:endParaRPr lang="pt-BR" sz="1600" dirty="0"/>
+            </a:p>
+          </p:txBody>
+        </p:sp>
+        <p:sp>
+          <p:nvSpPr>
+            <p:cNvPr id="5" name="Retângulo 4">
+              <a:extLst>
+                <a:ext uri="{FF2B5EF4-FFF2-40B4-BE49-F238E27FC236}">
+                  <a16:creationId xmlns:a16="http://schemas.microsoft.com/office/drawing/2014/main" id="{E8AACD48-B7E7-0CB0-46FD-061BDE2B8C23}"/>
+                </a:ext>
+              </a:extLst>
+            </p:cNvPr>
+            <p:cNvSpPr/>
+            <p:nvPr/>
+          </p:nvSpPr>
+          <p:spPr>
+            <a:xfrm>
+              <a:off x="7965815" y="3801835"/>
+              <a:ext cx="2490107" cy="342900"/>
+            </a:xfrm>
+            <a:prstGeom prst="rect">
+              <a:avLst/>
+            </a:prstGeom>
+            <a:solidFill>
+              <a:schemeClr val="tx2">
+                <a:lumMod val="75000"/>
+              </a:schemeClr>
+            </a:solidFill>
+          </p:spPr>
+          <p:style>
+            <a:lnRef idx="0">
+              <a:schemeClr val="accent3"/>
+            </a:lnRef>
+            <a:fillRef idx="3">
+              <a:schemeClr val="accent3"/>
+            </a:fillRef>
+            <a:effectRef idx="3">
+              <a:schemeClr val="accent3"/>
+            </a:effectRef>
+            <a:fontRef idx="minor">
+              <a:schemeClr val="lt1"/>
+            </a:fontRef>
+          </p:style>
+          <p:txBody>
+            <a:bodyPr rtlCol="0" anchor="ctr"/>
+            <a:lstStyle/>
+            <a:p>
+              <a:pPr algn="ctr"/>
+              <a:r>
+                <a:rPr lang="pt-BR" sz="1600" dirty="0"/>
+                <a:t>Análise Léxica</a:t>
+              </a:r>
+            </a:p>
+          </p:txBody>
+        </p:sp>
+        <p:sp>
+          <p:nvSpPr>
+            <p:cNvPr id="8" name="Retângulo 7">
+              <a:extLst>
+                <a:ext uri="{FF2B5EF4-FFF2-40B4-BE49-F238E27FC236}">
+                  <a16:creationId xmlns:a16="http://schemas.microsoft.com/office/drawing/2014/main" id="{E99FE1D2-7310-3C15-2A22-A077AFF675A8}"/>
+                </a:ext>
+              </a:extLst>
+            </p:cNvPr>
+            <p:cNvSpPr/>
+            <p:nvPr/>
+          </p:nvSpPr>
+          <p:spPr>
+            <a:xfrm>
+              <a:off x="7961830" y="3113313"/>
+              <a:ext cx="2490107" cy="342900"/>
+            </a:xfrm>
+            <a:prstGeom prst="rect">
+              <a:avLst/>
+            </a:prstGeom>
+            <a:solidFill>
+              <a:schemeClr val="tx2">
+                <a:lumMod val="75000"/>
+              </a:schemeClr>
+            </a:solidFill>
+          </p:spPr>
+          <p:style>
+            <a:lnRef idx="0">
+              <a:schemeClr val="accent3"/>
+            </a:lnRef>
+            <a:fillRef idx="3">
+              <a:schemeClr val="accent3"/>
+            </a:fillRef>
+            <a:effectRef idx="3">
+              <a:schemeClr val="accent3"/>
+            </a:effectRef>
+            <a:fontRef idx="minor">
+              <a:schemeClr val="lt1"/>
+            </a:fontRef>
+          </p:style>
+          <p:txBody>
+            <a:bodyPr rtlCol="0" anchor="ctr"/>
+            <a:lstStyle/>
+            <a:p>
+              <a:pPr algn="ctr"/>
+              <a:r>
+                <a:rPr lang="pt-BR" sz="1600" dirty="0"/>
+                <a:t>Análise Sintática</a:t>
+              </a:r>
+            </a:p>
+          </p:txBody>
+        </p:sp>
+        <p:sp>
+          <p:nvSpPr>
+            <p:cNvPr id="9" name="Retângulo 8">
+              <a:extLst>
+                <a:ext uri="{FF2B5EF4-FFF2-40B4-BE49-F238E27FC236}">
+                  <a16:creationId xmlns:a16="http://schemas.microsoft.com/office/drawing/2014/main" id="{B1495781-18A6-08AC-D627-3F6182B6C22D}"/>
+                </a:ext>
+              </a:extLst>
+            </p:cNvPr>
+            <p:cNvSpPr/>
+            <p:nvPr/>
+          </p:nvSpPr>
+          <p:spPr>
+            <a:xfrm>
+              <a:off x="7961828" y="2433354"/>
+              <a:ext cx="2490107" cy="342900"/>
+            </a:xfrm>
+            <a:prstGeom prst="rect">
+              <a:avLst/>
+            </a:prstGeom>
+            <a:solidFill>
+              <a:schemeClr val="tx2">
+                <a:lumMod val="75000"/>
+              </a:schemeClr>
+            </a:solidFill>
+          </p:spPr>
+          <p:style>
+            <a:lnRef idx="0">
+              <a:schemeClr val="accent3"/>
+            </a:lnRef>
+            <a:fillRef idx="3">
+              <a:schemeClr val="accent3"/>
+            </a:fillRef>
+            <a:effectRef idx="3">
+              <a:schemeClr val="accent3"/>
+            </a:effectRef>
+            <a:fontRef idx="minor">
+              <a:schemeClr val="lt1"/>
+            </a:fontRef>
+          </p:style>
+          <p:txBody>
+            <a:bodyPr rtlCol="0" anchor="ctr"/>
+            <a:lstStyle/>
+            <a:p>
+              <a:pPr algn="ctr"/>
+              <a:r>
+                <a:rPr lang="pt-BR" sz="1600" dirty="0"/>
+                <a:t>Análise Semântica</a:t>
+              </a:r>
+            </a:p>
+          </p:txBody>
+        </p:sp>
+        <p:sp>
+          <p:nvSpPr>
+            <p:cNvPr id="10" name="Retângulo 9">
+              <a:extLst>
+                <a:ext uri="{FF2B5EF4-FFF2-40B4-BE49-F238E27FC236}">
+                  <a16:creationId xmlns:a16="http://schemas.microsoft.com/office/drawing/2014/main" id="{DC6AD309-DDDD-BB64-E2DD-4A7E6870F311}"/>
+                </a:ext>
+              </a:extLst>
+            </p:cNvPr>
+            <p:cNvSpPr/>
+            <p:nvPr/>
+          </p:nvSpPr>
+          <p:spPr>
+            <a:xfrm>
+              <a:off x="7961829" y="1744832"/>
+              <a:ext cx="2490107" cy="342900"/>
+            </a:xfrm>
+            <a:prstGeom prst="rect">
+              <a:avLst/>
+            </a:prstGeom>
+            <a:solidFill>
+              <a:schemeClr val="tx2">
+                <a:lumMod val="75000"/>
+              </a:schemeClr>
+            </a:solidFill>
+          </p:spPr>
+          <p:style>
+            <a:lnRef idx="0">
+              <a:schemeClr val="accent3"/>
+            </a:lnRef>
+            <a:fillRef idx="3">
+              <a:schemeClr val="accent3"/>
+            </a:fillRef>
+            <a:effectRef idx="3">
+              <a:schemeClr val="accent3"/>
+            </a:effectRef>
+            <a:fontRef idx="minor">
+              <a:schemeClr val="lt1"/>
+            </a:fontRef>
+          </p:style>
+          <p:txBody>
+            <a:bodyPr rtlCol="0" anchor="ctr"/>
+            <a:lstStyle/>
+            <a:p>
+              <a:pPr algn="ctr"/>
+              <a:r>
+                <a:rPr lang="pt-BR" sz="1600" dirty="0"/>
+                <a:t>Análise Pragmática</a:t>
+              </a:r>
+            </a:p>
+          </p:txBody>
+        </p:sp>
+        <p:sp>
+          <p:nvSpPr>
+            <p:cNvPr id="12" name="CaixaDeTexto 11">
+              <a:extLst>
+                <a:ext uri="{FF2B5EF4-FFF2-40B4-BE49-F238E27FC236}">
+                  <a16:creationId xmlns:a16="http://schemas.microsoft.com/office/drawing/2014/main" id="{CC42E623-EE05-6955-D585-D2E5B304EF41}"/>
+                </a:ext>
+              </a:extLst>
+            </p:cNvPr>
+            <p:cNvSpPr txBox="1"/>
+            <p:nvPr/>
+          </p:nvSpPr>
+          <p:spPr>
+            <a:xfrm>
+              <a:off x="7968342" y="5178879"/>
+              <a:ext cx="2483593" cy="338554"/>
+            </a:xfrm>
+            <a:prstGeom prst="rect">
+              <a:avLst/>
+            </a:prstGeom>
+            <a:noFill/>
+          </p:spPr>
+          <p:txBody>
+            <a:bodyPr wrap="square" rtlCol="0">
+              <a:spAutoFit/>
+            </a:bodyPr>
+            <a:lstStyle/>
+            <a:p>
+              <a:pPr algn="ctr"/>
+              <a:r>
+                <a:rPr lang="pt-BR" sz="1600" dirty="0">
+                  <a:solidFill>
+                    <a:schemeClr val="bg2">
+                      <a:lumMod val="25000"/>
+                    </a:schemeClr>
+                  </a:solidFill>
+                </a:rPr>
+                <a:t>Texto</a:t>
+              </a:r>
+            </a:p>
+          </p:txBody>
+        </p:sp>
+        <p:sp>
+          <p:nvSpPr>
+            <p:cNvPr id="13" name="CaixaDeTexto 12">
+              <a:extLst>
+                <a:ext uri="{FF2B5EF4-FFF2-40B4-BE49-F238E27FC236}">
+                  <a16:creationId xmlns:a16="http://schemas.microsoft.com/office/drawing/2014/main" id="{52AFF625-02BA-3990-75E5-5A719B9C7434}"/>
+                </a:ext>
+              </a:extLst>
+            </p:cNvPr>
+            <p:cNvSpPr txBox="1"/>
+            <p:nvPr/>
+          </p:nvSpPr>
+          <p:spPr>
+            <a:xfrm>
+              <a:off x="7961828" y="1040376"/>
+              <a:ext cx="2483593" cy="338554"/>
+            </a:xfrm>
+            <a:prstGeom prst="rect">
+              <a:avLst/>
+            </a:prstGeom>
+            <a:noFill/>
+          </p:spPr>
+          <p:txBody>
+            <a:bodyPr wrap="square" rtlCol="0">
+              <a:spAutoFit/>
+            </a:bodyPr>
+            <a:lstStyle/>
+            <a:p>
+              <a:pPr algn="ctr"/>
+              <a:r>
+                <a:rPr lang="pt-BR" sz="1600" dirty="0">
+                  <a:solidFill>
+                    <a:schemeClr val="bg2">
+                      <a:lumMod val="25000"/>
+                    </a:schemeClr>
+                  </a:solidFill>
+                </a:rPr>
+                <a:t>Significado Pretendido</a:t>
+              </a:r>
+            </a:p>
+          </p:txBody>
+        </p:sp>
+        <p:cxnSp>
+          <p:nvCxnSpPr>
+            <p:cNvPr id="15" name="Conector de Seta Reta 14">
+              <a:extLst>
+                <a:ext uri="{FF2B5EF4-FFF2-40B4-BE49-F238E27FC236}">
+                  <a16:creationId xmlns:a16="http://schemas.microsoft.com/office/drawing/2014/main" id="{305EBE24-B0FA-56E7-8B02-766A753DE7AD}"/>
+                </a:ext>
+              </a:extLst>
+            </p:cNvPr>
+            <p:cNvCxnSpPr>
+              <a:stCxn id="12" idx="0"/>
+              <a:endCxn id="3" idx="2"/>
+            </p:cNvCxnSpPr>
+            <p:nvPr/>
+          </p:nvCxnSpPr>
+          <p:spPr>
+            <a:xfrm flipV="1">
+              <a:off x="9210139" y="4833257"/>
+              <a:ext cx="3258" cy="345622"/>
+            </a:xfrm>
+            <a:prstGeom prst="straightConnector1">
+              <a:avLst/>
+            </a:prstGeom>
+            <a:ln>
+              <a:solidFill>
+                <a:schemeClr val="tx2">
+                  <a:lumMod val="75000"/>
+                </a:schemeClr>
+              </a:solidFill>
+              <a:tailEnd type="triangle"/>
+            </a:ln>
+          </p:spPr>
+          <p:style>
+            <a:lnRef idx="3">
+              <a:schemeClr val="accent1"/>
+            </a:lnRef>
+            <a:fillRef idx="0">
+              <a:schemeClr val="accent1"/>
+            </a:fillRef>
+            <a:effectRef idx="2">
+              <a:schemeClr val="accent1"/>
+            </a:effectRef>
+            <a:fontRef idx="minor">
+              <a:schemeClr val="tx1"/>
+            </a:fontRef>
+          </p:style>
+        </p:cxnSp>
+        <p:cxnSp>
+          <p:nvCxnSpPr>
+            <p:cNvPr id="17" name="Conector de Seta Reta 16">
+              <a:extLst>
+                <a:ext uri="{FF2B5EF4-FFF2-40B4-BE49-F238E27FC236}">
+                  <a16:creationId xmlns:a16="http://schemas.microsoft.com/office/drawing/2014/main" id="{79E11F70-7DDD-30BC-74BF-625EB8A4A303}"/>
+                </a:ext>
+              </a:extLst>
+            </p:cNvPr>
+            <p:cNvCxnSpPr>
+              <a:cxnSpLocks/>
+              <a:endCxn id="5" idx="2"/>
+            </p:cNvCxnSpPr>
+            <p:nvPr/>
+          </p:nvCxnSpPr>
+          <p:spPr>
+            <a:xfrm flipV="1">
+              <a:off x="9210139" y="4144735"/>
+              <a:ext cx="730" cy="342900"/>
+            </a:xfrm>
+            <a:prstGeom prst="straightConnector1">
+              <a:avLst/>
+            </a:prstGeom>
+            <a:ln>
+              <a:solidFill>
+                <a:schemeClr val="tx2">
+                  <a:lumMod val="75000"/>
+                </a:schemeClr>
+              </a:solidFill>
+              <a:tailEnd type="triangle"/>
+            </a:ln>
+          </p:spPr>
+          <p:style>
+            <a:lnRef idx="3">
+              <a:schemeClr val="accent1"/>
+            </a:lnRef>
+            <a:fillRef idx="0">
+              <a:schemeClr val="accent1"/>
+            </a:fillRef>
+            <a:effectRef idx="2">
+              <a:schemeClr val="accent1"/>
+            </a:effectRef>
+            <a:fontRef idx="minor">
+              <a:schemeClr val="tx1"/>
+            </a:fontRef>
+          </p:style>
+        </p:cxnSp>
+        <p:cxnSp>
+          <p:nvCxnSpPr>
+            <p:cNvPr id="20" name="Conector de Seta Reta 19">
+              <a:extLst>
+                <a:ext uri="{FF2B5EF4-FFF2-40B4-BE49-F238E27FC236}">
+                  <a16:creationId xmlns:a16="http://schemas.microsoft.com/office/drawing/2014/main" id="{0096316C-2F2A-43D8-4968-76EDED63F198}"/>
+                </a:ext>
+              </a:extLst>
+            </p:cNvPr>
+            <p:cNvCxnSpPr>
+              <a:cxnSpLocks/>
+              <a:stCxn id="5" idx="0"/>
+              <a:endCxn id="8" idx="2"/>
+            </p:cNvCxnSpPr>
+            <p:nvPr/>
+          </p:nvCxnSpPr>
+          <p:spPr>
+            <a:xfrm flipH="1" flipV="1">
+              <a:off x="9206884" y="3456213"/>
+              <a:ext cx="3985" cy="345622"/>
+            </a:xfrm>
+            <a:prstGeom prst="straightConnector1">
+              <a:avLst/>
+            </a:prstGeom>
+            <a:ln>
+              <a:solidFill>
+                <a:schemeClr val="tx2">
+                  <a:lumMod val="75000"/>
+                </a:schemeClr>
+              </a:solidFill>
+              <a:tailEnd type="triangle"/>
+            </a:ln>
+          </p:spPr>
+          <p:style>
+            <a:lnRef idx="3">
+              <a:schemeClr val="accent1"/>
+            </a:lnRef>
+            <a:fillRef idx="0">
+              <a:schemeClr val="accent1"/>
+            </a:fillRef>
+            <a:effectRef idx="2">
+              <a:schemeClr val="accent1"/>
+            </a:effectRef>
+            <a:fontRef idx="minor">
+              <a:schemeClr val="tx1"/>
+            </a:fontRef>
+          </p:style>
+        </p:cxnSp>
+        <p:cxnSp>
+          <p:nvCxnSpPr>
+            <p:cNvPr id="23" name="Conector de Seta Reta 22">
+              <a:extLst>
+                <a:ext uri="{FF2B5EF4-FFF2-40B4-BE49-F238E27FC236}">
+                  <a16:creationId xmlns:a16="http://schemas.microsoft.com/office/drawing/2014/main" id="{7FDBF02E-3ED7-C05F-F17F-FDC657BB0BFD}"/>
+                </a:ext>
+              </a:extLst>
+            </p:cNvPr>
+            <p:cNvCxnSpPr>
+              <a:cxnSpLocks/>
+              <a:stCxn id="8" idx="0"/>
+              <a:endCxn id="9" idx="2"/>
+            </p:cNvCxnSpPr>
+            <p:nvPr/>
+          </p:nvCxnSpPr>
+          <p:spPr>
+            <a:xfrm flipH="1" flipV="1">
+              <a:off x="9206882" y="2776254"/>
+              <a:ext cx="2" cy="337059"/>
+            </a:xfrm>
+            <a:prstGeom prst="straightConnector1">
+              <a:avLst/>
+            </a:prstGeom>
+            <a:ln>
+              <a:solidFill>
+                <a:schemeClr val="tx2">
+                  <a:lumMod val="75000"/>
+                </a:schemeClr>
+              </a:solidFill>
+              <a:tailEnd type="triangle"/>
+            </a:ln>
+          </p:spPr>
+          <p:style>
+            <a:lnRef idx="3">
+              <a:schemeClr val="accent1"/>
+            </a:lnRef>
+            <a:fillRef idx="0">
+              <a:schemeClr val="accent1"/>
+            </a:fillRef>
+            <a:effectRef idx="2">
+              <a:schemeClr val="accent1"/>
+            </a:effectRef>
+            <a:fontRef idx="minor">
+              <a:schemeClr val="tx1"/>
+            </a:fontRef>
+          </p:style>
+        </p:cxnSp>
+        <p:cxnSp>
+          <p:nvCxnSpPr>
+            <p:cNvPr id="28" name="Conector de Seta Reta 27">
+              <a:extLst>
+                <a:ext uri="{FF2B5EF4-FFF2-40B4-BE49-F238E27FC236}">
+                  <a16:creationId xmlns:a16="http://schemas.microsoft.com/office/drawing/2014/main" id="{F5D89F0A-ABAB-B26D-5F24-4E8E8FDE9FA8}"/>
+                </a:ext>
+              </a:extLst>
+            </p:cNvPr>
+            <p:cNvCxnSpPr>
+              <a:cxnSpLocks/>
+              <a:stCxn id="9" idx="0"/>
+            </p:cNvCxnSpPr>
+            <p:nvPr/>
+          </p:nvCxnSpPr>
+          <p:spPr>
+            <a:xfrm flipH="1" flipV="1">
+              <a:off x="9206881" y="2125042"/>
+              <a:ext cx="1" cy="308312"/>
+            </a:xfrm>
+            <a:prstGeom prst="straightConnector1">
+              <a:avLst/>
+            </a:prstGeom>
+            <a:ln>
+              <a:solidFill>
+                <a:schemeClr val="tx2">
+                  <a:lumMod val="75000"/>
+                </a:schemeClr>
+              </a:solidFill>
+              <a:tailEnd type="triangle"/>
+            </a:ln>
+          </p:spPr>
+          <p:style>
+            <a:lnRef idx="3">
+              <a:schemeClr val="accent1"/>
+            </a:lnRef>
+            <a:fillRef idx="0">
+              <a:schemeClr val="accent1"/>
+            </a:fillRef>
+            <a:effectRef idx="2">
+              <a:schemeClr val="accent1"/>
+            </a:effectRef>
+            <a:fontRef idx="minor">
+              <a:schemeClr val="tx1"/>
+            </a:fontRef>
+          </p:style>
+        </p:cxnSp>
+        <p:cxnSp>
+          <p:nvCxnSpPr>
+            <p:cNvPr id="31" name="Conector de Seta Reta 30">
+              <a:extLst>
+                <a:ext uri="{FF2B5EF4-FFF2-40B4-BE49-F238E27FC236}">
+                  <a16:creationId xmlns:a16="http://schemas.microsoft.com/office/drawing/2014/main" id="{53994989-4347-DCC7-61FE-3B26D5E36D91}"/>
+                </a:ext>
+              </a:extLst>
+            </p:cNvPr>
+            <p:cNvCxnSpPr>
+              <a:cxnSpLocks/>
+              <a:stCxn id="10" idx="0"/>
+              <a:endCxn id="13" idx="2"/>
+            </p:cNvCxnSpPr>
+            <p:nvPr/>
+          </p:nvCxnSpPr>
+          <p:spPr>
+            <a:xfrm flipH="1" flipV="1">
+              <a:off x="9203625" y="1378930"/>
+              <a:ext cx="3258" cy="365902"/>
+            </a:xfrm>
+            <a:prstGeom prst="straightConnector1">
+              <a:avLst/>
+            </a:prstGeom>
+            <a:ln>
+              <a:solidFill>
+                <a:schemeClr val="tx2">
+                  <a:lumMod val="75000"/>
+                </a:schemeClr>
+              </a:solidFill>
+              <a:tailEnd type="triangle"/>
+            </a:ln>
+          </p:spPr>
+          <p:style>
+            <a:lnRef idx="3">
+              <a:schemeClr val="accent1"/>
+            </a:lnRef>
+            <a:fillRef idx="0">
+              <a:schemeClr val="accent1"/>
+            </a:fillRef>
+            <a:effectRef idx="2">
+              <a:schemeClr val="accent1"/>
+            </a:effectRef>
+            <a:fontRef idx="minor">
+              <a:schemeClr val="tx1"/>
+            </a:fontRef>
+          </p:style>
+        </p:cxnSp>
+      </p:grpSp>
+      <p:sp>
+        <p:nvSpPr>
+          <p:cNvPr id="36" name="Espaço Reservado para Conteúdo 2">
+            <a:extLst>
+              <a:ext uri="{FF2B5EF4-FFF2-40B4-BE49-F238E27FC236}">
+                <a16:creationId xmlns:a16="http://schemas.microsoft.com/office/drawing/2014/main" id="{C8C1E745-6D3D-E75E-B325-B9F158B99BA3}"/>
+              </a:ext>
+            </a:extLst>
+          </p:cNvPr>
+          <p:cNvSpPr txBox="1">
+            <a:spLocks/>
+          </p:cNvSpPr>
+          <p:nvPr/>
+        </p:nvSpPr>
+        <p:spPr>
+          <a:xfrm>
+            <a:off x="6382848" y="5108808"/>
+            <a:ext cx="5643012" cy="586176"/>
+          </a:xfrm>
+          <a:prstGeom prst="rect">
+            <a:avLst/>
+          </a:prstGeom>
+        </p:spPr>
+        <p:txBody>
+          <a:bodyPr vert="horz" lIns="91440" tIns="45720" rIns="91440" bIns="45720" rtlCol="0">
+            <a:normAutofit/>
+          </a:bodyPr>
+          <a:lstStyle>
+            <a:lvl1pPr marL="228600" indent="-228600" algn="l" defTabSz="914400" rtl="0" eaLnBrk="1" latinLnBrk="0" hangingPunct="1">
+              <a:lnSpc>
+                <a:spcPct val="90000"/>
+              </a:lnSpc>
+              <a:spcBef>
+                <a:spcPts val="1000"/>
+              </a:spcBef>
+              <a:buFont typeface="Arial" panose="020B0604020202020204" pitchFamily="34" charset="0"/>
+              <a:buChar char="•"/>
+              <a:defRPr sz="2800" kern="1200">
+                <a:solidFill>
+                  <a:schemeClr val="tx1"/>
+                </a:solidFill>
+                <a:latin typeface="+mn-lt"/>
+                <a:ea typeface="+mn-ea"/>
+                <a:cs typeface="+mn-cs"/>
+              </a:defRPr>
+            </a:lvl1pPr>
+            <a:lvl2pPr marL="685800" indent="-228600" algn="l" defTabSz="914400" rtl="0" eaLnBrk="1" latinLnBrk="0" hangingPunct="1">
+              <a:lnSpc>
+                <a:spcPct val="90000"/>
+              </a:lnSpc>
+              <a:spcBef>
+                <a:spcPts val="500"/>
+              </a:spcBef>
+              <a:buFont typeface="Arial" panose="020B0604020202020204" pitchFamily="34" charset="0"/>
+              <a:buChar char="•"/>
+              <a:defRPr sz="2400" kern="1200">
+                <a:solidFill>
+                  <a:schemeClr val="tx1"/>
+                </a:solidFill>
+                <a:latin typeface="+mn-lt"/>
+                <a:ea typeface="+mn-ea"/>
+                <a:cs typeface="+mn-cs"/>
+              </a:defRPr>
+            </a:lvl2pPr>
+            <a:lvl3pPr marL="1143000" indent="-228600" algn="l" defTabSz="914400" rtl="0" eaLnBrk="1" latinLnBrk="0" hangingPunct="1">
+              <a:lnSpc>
+                <a:spcPct val="90000"/>
+              </a:lnSpc>
+              <a:spcBef>
+                <a:spcPts val="500"/>
+              </a:spcBef>
+              <a:buFont typeface="Arial" panose="020B0604020202020204" pitchFamily="34" charset="0"/>
+              <a:buChar char="•"/>
+              <a:defRPr sz="2000" kern="1200">
+                <a:solidFill>
+                  <a:schemeClr val="tx1"/>
+                </a:solidFill>
+                <a:latin typeface="+mn-lt"/>
+                <a:ea typeface="+mn-ea"/>
+                <a:cs typeface="+mn-cs"/>
+              </a:defRPr>
+            </a:lvl3pPr>
+            <a:lvl4pPr marL="1600200" indent="-228600" algn="l" defTabSz="914400" rtl="0" eaLnBrk="1" latinLnBrk="0" hangingPunct="1">
+              <a:lnSpc>
+                <a:spcPct val="90000"/>
+              </a:lnSpc>
+              <a:spcBef>
+                <a:spcPts val="500"/>
+              </a:spcBef>
+              <a:buFont typeface="Arial" panose="020B0604020202020204" pitchFamily="34" charset="0"/>
+              <a:buChar char="•"/>
+              <a:defRPr sz="1800" kern="1200">
+                <a:solidFill>
+                  <a:schemeClr val="tx1"/>
+                </a:solidFill>
+                <a:latin typeface="+mn-lt"/>
+                <a:ea typeface="+mn-ea"/>
+                <a:cs typeface="+mn-cs"/>
+              </a:defRPr>
+            </a:lvl4pPr>
+            <a:lvl5pPr marL="2057400" indent="-228600" algn="l" defTabSz="914400" rtl="0" eaLnBrk="1" latinLnBrk="0" hangingPunct="1">
+              <a:lnSpc>
+                <a:spcPct val="90000"/>
+              </a:lnSpc>
+              <a:spcBef>
+                <a:spcPts val="500"/>
+              </a:spcBef>
+              <a:buFont typeface="Arial" panose="020B0604020202020204" pitchFamily="34" charset="0"/>
+              <a:buChar char="•"/>
+              <a:defRPr sz="1800" kern="1200">
+                <a:solidFill>
+                  <a:schemeClr val="tx1"/>
+                </a:solidFill>
+                <a:latin typeface="+mn-lt"/>
+                <a:ea typeface="+mn-ea"/>
+                <a:cs typeface="+mn-cs"/>
+              </a:defRPr>
+            </a:lvl5pPr>
+            <a:lvl6pPr marL="2514600" indent="-228600" algn="l" defTabSz="914400" rtl="0" eaLnBrk="1" latinLnBrk="0" hangingPunct="1">
+              <a:lnSpc>
+                <a:spcPct val="90000"/>
+              </a:lnSpc>
+              <a:spcBef>
+                <a:spcPts val="500"/>
+              </a:spcBef>
+              <a:buFont typeface="Arial" panose="020B0604020202020204" pitchFamily="34" charset="0"/>
+              <a:buChar char="•"/>
+              <a:defRPr sz="1800" kern="1200">
+                <a:solidFill>
+                  <a:schemeClr val="tx1"/>
+                </a:solidFill>
+                <a:latin typeface="+mn-lt"/>
+                <a:ea typeface="+mn-ea"/>
+                <a:cs typeface="+mn-cs"/>
+              </a:defRPr>
+            </a:lvl6pPr>
+            <a:lvl7pPr marL="2971800" indent="-228600" algn="l" defTabSz="914400" rtl="0" eaLnBrk="1" latinLnBrk="0" hangingPunct="1">
+              <a:lnSpc>
+                <a:spcPct val="90000"/>
+              </a:lnSpc>
+              <a:spcBef>
+                <a:spcPts val="500"/>
+              </a:spcBef>
+              <a:buFont typeface="Arial" panose="020B0604020202020204" pitchFamily="34" charset="0"/>
+              <a:buChar char="•"/>
+              <a:defRPr sz="1800" kern="1200">
+                <a:solidFill>
+                  <a:schemeClr val="tx1"/>
+                </a:solidFill>
+                <a:latin typeface="+mn-lt"/>
+                <a:ea typeface="+mn-ea"/>
+                <a:cs typeface="+mn-cs"/>
+              </a:defRPr>
+            </a:lvl7pPr>
+            <a:lvl8pPr marL="3429000" indent="-228600" algn="l" defTabSz="914400" rtl="0" eaLnBrk="1" latinLnBrk="0" hangingPunct="1">
+              <a:lnSpc>
+                <a:spcPct val="90000"/>
+              </a:lnSpc>
+              <a:spcBef>
+                <a:spcPts val="500"/>
+              </a:spcBef>
+              <a:buFont typeface="Arial" panose="020B0604020202020204" pitchFamily="34" charset="0"/>
+              <a:buChar char="•"/>
+              <a:defRPr sz="1800" kern="1200">
+                <a:solidFill>
+                  <a:schemeClr val="tx1"/>
+                </a:solidFill>
+                <a:latin typeface="+mn-lt"/>
+                <a:ea typeface="+mn-ea"/>
+                <a:cs typeface="+mn-cs"/>
+              </a:defRPr>
+            </a:lvl8pPr>
+            <a:lvl9pPr marL="3886200" indent="-228600" algn="l" defTabSz="914400" rtl="0" eaLnBrk="1" latinLnBrk="0" hangingPunct="1">
+              <a:lnSpc>
+                <a:spcPct val="90000"/>
+              </a:lnSpc>
+              <a:spcBef>
+                <a:spcPts val="500"/>
+              </a:spcBef>
+              <a:buFont typeface="Arial" panose="020B0604020202020204" pitchFamily="34" charset="0"/>
+              <a:buChar char="•"/>
+              <a:defRPr sz="1800" kern="1200">
+                <a:solidFill>
+                  <a:schemeClr val="tx1"/>
+                </a:solidFill>
+                <a:latin typeface="+mn-lt"/>
+                <a:ea typeface="+mn-ea"/>
+                <a:cs typeface="+mn-cs"/>
+              </a:defRPr>
+            </a:lvl9pPr>
+          </a:lstStyle>
+          <a:p>
+            <a:pPr marL="0" indent="0">
+              <a:buNone/>
+            </a:pPr>
+            <a:r>
+              <a:rPr lang="pt-BR" sz="1600" dirty="0">
+                <a:solidFill>
+                  <a:schemeClr val="bg2">
+                    <a:lumMod val="25000"/>
+                  </a:schemeClr>
+                </a:solidFill>
+                <a:cs typeface="Arial" panose="020B0604020202020204" pitchFamily="34" charset="0"/>
+              </a:rPr>
+              <a:t>Estágios de análise do processamento de linguagem natural</a:t>
+            </a:r>
+            <a:br>
+              <a:rPr lang="pt-BR" sz="1600" dirty="0">
+                <a:solidFill>
+                  <a:schemeClr val="bg2">
+                    <a:lumMod val="25000"/>
+                  </a:schemeClr>
+                </a:solidFill>
+                <a:cs typeface="Arial" panose="020B0604020202020204" pitchFamily="34" charset="0"/>
+              </a:rPr>
+            </a:br>
+            <a:r>
+              <a:rPr lang="pt-BR" sz="1600" dirty="0">
+                <a:solidFill>
+                  <a:schemeClr val="bg2">
+                    <a:lumMod val="25000"/>
+                  </a:schemeClr>
+                </a:solidFill>
+                <a:cs typeface="Arial" panose="020B0604020202020204" pitchFamily="34" charset="0"/>
+              </a:rPr>
+              <a:t>Fonte: Adaptado de Dale et al. (2000) </a:t>
+            </a:r>
+          </a:p>
+        </p:txBody>
+      </p:sp>
     </p:spTree>
     <p:extLst>
       <p:ext uri="{BB962C8B-B14F-4D97-AF65-F5344CB8AC3E}">
         <p14:creationId xmlns:p14="http://schemas.microsoft.com/office/powerpoint/2010/main" val="3847835442"/>
+      </p:ext>
+    </p:extLst>
+  </p:cSld>
+  <p:clrMapOvr>
+    <a:masterClrMapping/>
+  </p:clrMapOvr>
+</p:sld>
+</file>
+
+<file path=ppt/slides/slide7.xml><?xml version="1.0" encoding="utf-8"?>
+<p:sld xmlns:a="http://schemas.openxmlformats.org/drawingml/2006/main" xmlns:r="http://schemas.openxmlformats.org/officeDocument/2006/relationships" xmlns:p="http://schemas.openxmlformats.org/presentationml/2006/main">
+  <p:cSld>
+    <p:spTree>
+      <p:nvGrpSpPr>
+        <p:cNvPr id="1" name=""/>
+        <p:cNvGrpSpPr/>
+        <p:nvPr/>
+      </p:nvGrpSpPr>
+      <p:grpSpPr>
+        <a:xfrm>
+          <a:off x="0" y="0"/>
+          <a:ext cx="0" cy="0"/>
+          <a:chOff x="0" y="0"/>
+          <a:chExt cx="0" cy="0"/>
+        </a:xfrm>
+      </p:grpSpPr>
+      <p:sp>
+        <p:nvSpPr>
+          <p:cNvPr id="4" name="Arrow: Pentagon 3">
+            <a:extLst>
+              <a:ext uri="{FF2B5EF4-FFF2-40B4-BE49-F238E27FC236}">
+                <a16:creationId xmlns:a16="http://schemas.microsoft.com/office/drawing/2014/main" id="{0E1C5205-F74D-8360-EDEE-B204D8633772}"/>
+              </a:ext>
+            </a:extLst>
+          </p:cNvPr>
+          <p:cNvSpPr/>
+          <p:nvPr/>
+        </p:nvSpPr>
+        <p:spPr>
+          <a:xfrm>
+            <a:off x="-1" y="383391"/>
+            <a:ext cx="5962261" cy="905773"/>
+          </a:xfrm>
+          <a:prstGeom prst="homePlate">
+            <a:avLst/>
+          </a:prstGeom>
+          <a:solidFill>
+            <a:schemeClr val="bg2">
+              <a:lumMod val="25000"/>
+              <a:alpha val="85000"/>
+            </a:schemeClr>
+          </a:solidFill>
+        </p:spPr>
+        <p:style>
+          <a:lnRef idx="1">
+            <a:schemeClr val="accent3"/>
+          </a:lnRef>
+          <a:fillRef idx="3">
+            <a:schemeClr val="accent3"/>
+          </a:fillRef>
+          <a:effectRef idx="2">
+            <a:schemeClr val="accent3"/>
+          </a:effectRef>
+          <a:fontRef idx="minor">
+            <a:schemeClr val="lt1"/>
+          </a:fontRef>
+        </p:style>
+        <p:txBody>
+          <a:bodyPr rtlCol="0" anchor="ctr"/>
+          <a:lstStyle/>
+          <a:p>
+            <a:pPr algn="ctr"/>
+            <a:r>
+              <a:rPr lang="pt-BR" sz="3700" dirty="0">
+                <a:solidFill>
+                  <a:schemeClr val="bg1"/>
+                </a:solidFill>
+              </a:rPr>
+              <a:t>RESULTADOS E DISCUSSÕES</a:t>
+            </a:r>
+          </a:p>
+        </p:txBody>
+      </p:sp>
+      <p:sp>
+        <p:nvSpPr>
+          <p:cNvPr id="6" name="Arrow: Pentagon 5">
+            <a:extLst>
+              <a:ext uri="{FF2B5EF4-FFF2-40B4-BE49-F238E27FC236}">
+                <a16:creationId xmlns:a16="http://schemas.microsoft.com/office/drawing/2014/main" id="{6495FEFB-EF83-9F99-FA59-304B76DA4498}"/>
+              </a:ext>
+            </a:extLst>
+          </p:cNvPr>
+          <p:cNvSpPr/>
+          <p:nvPr/>
+        </p:nvSpPr>
+        <p:spPr>
+          <a:xfrm>
+            <a:off x="-1" y="1170272"/>
+            <a:ext cx="4450704" cy="453255"/>
+          </a:xfrm>
+          <a:prstGeom prst="homePlate">
+            <a:avLst/>
+          </a:prstGeom>
+          <a:solidFill>
+            <a:schemeClr val="bg2">
+              <a:lumMod val="75000"/>
+              <a:alpha val="90000"/>
+            </a:schemeClr>
+          </a:solidFill>
+        </p:spPr>
+        <p:style>
+          <a:lnRef idx="1">
+            <a:schemeClr val="accent3"/>
+          </a:lnRef>
+          <a:fillRef idx="3">
+            <a:schemeClr val="accent3"/>
+          </a:fillRef>
+          <a:effectRef idx="2">
+            <a:schemeClr val="accent3"/>
+          </a:effectRef>
+          <a:fontRef idx="minor">
+            <a:schemeClr val="lt1"/>
+          </a:fontRef>
+        </p:style>
+        <p:txBody>
+          <a:bodyPr rtlCol="0" anchor="ctr"/>
+          <a:lstStyle/>
+          <a:p>
+            <a:pPr algn="ctr"/>
+            <a:r>
+              <a:rPr lang="pt-BR" sz="2800" dirty="0">
+                <a:solidFill>
+                  <a:schemeClr val="bg2">
+                    <a:lumMod val="25000"/>
+                  </a:schemeClr>
+                </a:solidFill>
+              </a:rPr>
+              <a:t>PRÉ-PROCESSAMENTO</a:t>
+            </a:r>
+          </a:p>
+        </p:txBody>
+      </p:sp>
+      <p:sp>
+        <p:nvSpPr>
+          <p:cNvPr id="7" name="Rectangle 6">
+            <a:extLst>
+              <a:ext uri="{FF2B5EF4-FFF2-40B4-BE49-F238E27FC236}">
+                <a16:creationId xmlns:a16="http://schemas.microsoft.com/office/drawing/2014/main" id="{04FABB05-6C2E-CEFC-8C95-F5EA054DAF7D}"/>
+              </a:ext>
+            </a:extLst>
+          </p:cNvPr>
+          <p:cNvSpPr/>
+          <p:nvPr/>
+        </p:nvSpPr>
+        <p:spPr>
+          <a:xfrm>
+            <a:off x="8588828" y="383391"/>
+            <a:ext cx="3603171" cy="1560750"/>
+          </a:xfrm>
+          <a:prstGeom prst="rect">
+            <a:avLst/>
+          </a:prstGeom>
+          <a:solidFill>
+            <a:schemeClr val="tx2">
+              <a:lumMod val="60000"/>
+              <a:lumOff val="40000"/>
+              <a:alpha val="70000"/>
+            </a:schemeClr>
+          </a:solidFill>
+          <a:ln w="12700">
+            <a:noFill/>
+          </a:ln>
+        </p:spPr>
+        <p:style>
+          <a:lnRef idx="0">
+            <a:scrgbClr r="0" g="0" b="0"/>
+          </a:lnRef>
+          <a:fillRef idx="0">
+            <a:scrgbClr r="0" g="0" b="0"/>
+          </a:fillRef>
+          <a:effectRef idx="0">
+            <a:scrgbClr r="0" g="0" b="0"/>
+          </a:effectRef>
+          <a:fontRef idx="minor">
+            <a:schemeClr val="lt1"/>
+          </a:fontRef>
+        </p:style>
+        <p:txBody>
+          <a:bodyPr rtlCol="0" anchor="ctr"/>
+          <a:lstStyle/>
+          <a:p>
+            <a:pPr marL="228600" indent="-228600">
+              <a:lnSpc>
+                <a:spcPct val="90000"/>
+              </a:lnSpc>
+              <a:spcBef>
+                <a:spcPts val="1000"/>
+              </a:spcBef>
+              <a:buFont typeface="Arial" panose="020B0604020202020204" pitchFamily="34" charset="0"/>
+              <a:buChar char="•"/>
+            </a:pPr>
+            <a:r>
+              <a:rPr lang="pt-BR" sz="1600" dirty="0">
+                <a:solidFill>
+                  <a:schemeClr val="bg2">
+                    <a:lumMod val="10000"/>
+                  </a:schemeClr>
+                </a:solidFill>
+                <a:ea typeface="Calibri" panose="020F0502020204030204" pitchFamily="34" charset="0"/>
+                <a:cs typeface="Arial" panose="020B0604020202020204" pitchFamily="34" charset="0"/>
+              </a:rPr>
+              <a:t>Identificação de arquivos.</a:t>
+            </a:r>
+          </a:p>
+          <a:p>
+            <a:pPr marL="228600" indent="-228600">
+              <a:lnSpc>
+                <a:spcPct val="90000"/>
+              </a:lnSpc>
+              <a:spcBef>
+                <a:spcPts val="1000"/>
+              </a:spcBef>
+              <a:buFont typeface="Arial" panose="020B0604020202020204" pitchFamily="34" charset="0"/>
+              <a:buChar char="•"/>
+            </a:pPr>
+            <a:r>
+              <a:rPr lang="pt-BR" sz="1600" dirty="0">
+                <a:solidFill>
+                  <a:schemeClr val="bg2">
+                    <a:lumMod val="10000"/>
+                  </a:schemeClr>
+                </a:solidFill>
+                <a:ea typeface="Calibri" panose="020F0502020204030204" pitchFamily="34" charset="0"/>
+                <a:cs typeface="Arial" panose="020B0604020202020204" pitchFamily="34" charset="0"/>
+              </a:rPr>
+              <a:t>Google </a:t>
+            </a:r>
+            <a:r>
+              <a:rPr lang="pt-BR" sz="1600" dirty="0" err="1">
+                <a:solidFill>
+                  <a:schemeClr val="bg2">
+                    <a:lumMod val="10000"/>
+                  </a:schemeClr>
+                </a:solidFill>
+                <a:ea typeface="Calibri" panose="020F0502020204030204" pitchFamily="34" charset="0"/>
+                <a:cs typeface="Arial" panose="020B0604020202020204" pitchFamily="34" charset="0"/>
+              </a:rPr>
+              <a:t>Colab</a:t>
+            </a:r>
+            <a:r>
+              <a:rPr lang="pt-BR" sz="1600" dirty="0">
+                <a:solidFill>
+                  <a:schemeClr val="bg2">
+                    <a:lumMod val="10000"/>
+                  </a:schemeClr>
+                </a:solidFill>
+                <a:ea typeface="Calibri" panose="020F0502020204030204" pitchFamily="34" charset="0"/>
+                <a:cs typeface="Arial" panose="020B0604020202020204" pitchFamily="34" charset="0"/>
+              </a:rPr>
+              <a:t> + Google Drive.</a:t>
+            </a:r>
+          </a:p>
+          <a:p>
+            <a:pPr marL="228600" indent="-228600">
+              <a:lnSpc>
+                <a:spcPct val="90000"/>
+              </a:lnSpc>
+              <a:spcBef>
+                <a:spcPts val="1000"/>
+              </a:spcBef>
+              <a:buFont typeface="Arial" panose="020B0604020202020204" pitchFamily="34" charset="0"/>
+              <a:buChar char="•"/>
+            </a:pPr>
+            <a:r>
+              <a:rPr lang="pt-BR" sz="1600" dirty="0">
+                <a:solidFill>
+                  <a:schemeClr val="bg2">
+                    <a:lumMod val="10000"/>
+                  </a:schemeClr>
+                </a:solidFill>
+                <a:ea typeface="Calibri" panose="020F0502020204030204" pitchFamily="34" charset="0"/>
+                <a:cs typeface="Arial" panose="020B0604020202020204" pitchFamily="34" charset="0"/>
+              </a:rPr>
+              <a:t>Python.</a:t>
+            </a:r>
+          </a:p>
+        </p:txBody>
+      </p:sp>
+      <p:sp>
+        <p:nvSpPr>
+          <p:cNvPr id="36" name="Espaço Reservado para Conteúdo 2">
+            <a:extLst>
+              <a:ext uri="{FF2B5EF4-FFF2-40B4-BE49-F238E27FC236}">
+                <a16:creationId xmlns:a16="http://schemas.microsoft.com/office/drawing/2014/main" id="{C8C1E745-6D3D-E75E-B325-B9F158B99BA3}"/>
+              </a:ext>
+            </a:extLst>
+          </p:cNvPr>
+          <p:cNvSpPr txBox="1">
+            <a:spLocks/>
+          </p:cNvSpPr>
+          <p:nvPr/>
+        </p:nvSpPr>
+        <p:spPr>
+          <a:xfrm>
+            <a:off x="179613" y="5267653"/>
+            <a:ext cx="5603622" cy="586176"/>
+          </a:xfrm>
+          <a:prstGeom prst="rect">
+            <a:avLst/>
+          </a:prstGeom>
+        </p:spPr>
+        <p:txBody>
+          <a:bodyPr vert="horz" lIns="91440" tIns="45720" rIns="91440" bIns="45720" rtlCol="0">
+            <a:normAutofit/>
+          </a:bodyPr>
+          <a:lstStyle>
+            <a:lvl1pPr marL="228600" indent="-228600" algn="l" defTabSz="914400" rtl="0" eaLnBrk="1" latinLnBrk="0" hangingPunct="1">
+              <a:lnSpc>
+                <a:spcPct val="90000"/>
+              </a:lnSpc>
+              <a:spcBef>
+                <a:spcPts val="1000"/>
+              </a:spcBef>
+              <a:buFont typeface="Arial" panose="020B0604020202020204" pitchFamily="34" charset="0"/>
+              <a:buChar char="•"/>
+              <a:defRPr sz="2800" kern="1200">
+                <a:solidFill>
+                  <a:schemeClr val="tx1"/>
+                </a:solidFill>
+                <a:latin typeface="+mn-lt"/>
+                <a:ea typeface="+mn-ea"/>
+                <a:cs typeface="+mn-cs"/>
+              </a:defRPr>
+            </a:lvl1pPr>
+            <a:lvl2pPr marL="685800" indent="-228600" algn="l" defTabSz="914400" rtl="0" eaLnBrk="1" latinLnBrk="0" hangingPunct="1">
+              <a:lnSpc>
+                <a:spcPct val="90000"/>
+              </a:lnSpc>
+              <a:spcBef>
+                <a:spcPts val="500"/>
+              </a:spcBef>
+              <a:buFont typeface="Arial" panose="020B0604020202020204" pitchFamily="34" charset="0"/>
+              <a:buChar char="•"/>
+              <a:defRPr sz="2400" kern="1200">
+                <a:solidFill>
+                  <a:schemeClr val="tx1"/>
+                </a:solidFill>
+                <a:latin typeface="+mn-lt"/>
+                <a:ea typeface="+mn-ea"/>
+                <a:cs typeface="+mn-cs"/>
+              </a:defRPr>
+            </a:lvl2pPr>
+            <a:lvl3pPr marL="1143000" indent="-228600" algn="l" defTabSz="914400" rtl="0" eaLnBrk="1" latinLnBrk="0" hangingPunct="1">
+              <a:lnSpc>
+                <a:spcPct val="90000"/>
+              </a:lnSpc>
+              <a:spcBef>
+                <a:spcPts val="500"/>
+              </a:spcBef>
+              <a:buFont typeface="Arial" panose="020B0604020202020204" pitchFamily="34" charset="0"/>
+              <a:buChar char="•"/>
+              <a:defRPr sz="2000" kern="1200">
+                <a:solidFill>
+                  <a:schemeClr val="tx1"/>
+                </a:solidFill>
+                <a:latin typeface="+mn-lt"/>
+                <a:ea typeface="+mn-ea"/>
+                <a:cs typeface="+mn-cs"/>
+              </a:defRPr>
+            </a:lvl3pPr>
+            <a:lvl4pPr marL="1600200" indent="-228600" algn="l" defTabSz="914400" rtl="0" eaLnBrk="1" latinLnBrk="0" hangingPunct="1">
+              <a:lnSpc>
+                <a:spcPct val="90000"/>
+              </a:lnSpc>
+              <a:spcBef>
+                <a:spcPts val="500"/>
+              </a:spcBef>
+              <a:buFont typeface="Arial" panose="020B0604020202020204" pitchFamily="34" charset="0"/>
+              <a:buChar char="•"/>
+              <a:defRPr sz="1800" kern="1200">
+                <a:solidFill>
+                  <a:schemeClr val="tx1"/>
+                </a:solidFill>
+                <a:latin typeface="+mn-lt"/>
+                <a:ea typeface="+mn-ea"/>
+                <a:cs typeface="+mn-cs"/>
+              </a:defRPr>
+            </a:lvl4pPr>
+            <a:lvl5pPr marL="2057400" indent="-228600" algn="l" defTabSz="914400" rtl="0" eaLnBrk="1" latinLnBrk="0" hangingPunct="1">
+              <a:lnSpc>
+                <a:spcPct val="90000"/>
+              </a:lnSpc>
+              <a:spcBef>
+                <a:spcPts val="500"/>
+              </a:spcBef>
+              <a:buFont typeface="Arial" panose="020B0604020202020204" pitchFamily="34" charset="0"/>
+              <a:buChar char="•"/>
+              <a:defRPr sz="1800" kern="1200">
+                <a:solidFill>
+                  <a:schemeClr val="tx1"/>
+                </a:solidFill>
+                <a:latin typeface="+mn-lt"/>
+                <a:ea typeface="+mn-ea"/>
+                <a:cs typeface="+mn-cs"/>
+              </a:defRPr>
+            </a:lvl5pPr>
+            <a:lvl6pPr marL="2514600" indent="-228600" algn="l" defTabSz="914400" rtl="0" eaLnBrk="1" latinLnBrk="0" hangingPunct="1">
+              <a:lnSpc>
+                <a:spcPct val="90000"/>
+              </a:lnSpc>
+              <a:spcBef>
+                <a:spcPts val="500"/>
+              </a:spcBef>
+              <a:buFont typeface="Arial" panose="020B0604020202020204" pitchFamily="34" charset="0"/>
+              <a:buChar char="•"/>
+              <a:defRPr sz="1800" kern="1200">
+                <a:solidFill>
+                  <a:schemeClr val="tx1"/>
+                </a:solidFill>
+                <a:latin typeface="+mn-lt"/>
+                <a:ea typeface="+mn-ea"/>
+                <a:cs typeface="+mn-cs"/>
+              </a:defRPr>
+            </a:lvl6pPr>
+            <a:lvl7pPr marL="2971800" indent="-228600" algn="l" defTabSz="914400" rtl="0" eaLnBrk="1" latinLnBrk="0" hangingPunct="1">
+              <a:lnSpc>
+                <a:spcPct val="90000"/>
+              </a:lnSpc>
+              <a:spcBef>
+                <a:spcPts val="500"/>
+              </a:spcBef>
+              <a:buFont typeface="Arial" panose="020B0604020202020204" pitchFamily="34" charset="0"/>
+              <a:buChar char="•"/>
+              <a:defRPr sz="1800" kern="1200">
+                <a:solidFill>
+                  <a:schemeClr val="tx1"/>
+                </a:solidFill>
+                <a:latin typeface="+mn-lt"/>
+                <a:ea typeface="+mn-ea"/>
+                <a:cs typeface="+mn-cs"/>
+              </a:defRPr>
+            </a:lvl7pPr>
+            <a:lvl8pPr marL="3429000" indent="-228600" algn="l" defTabSz="914400" rtl="0" eaLnBrk="1" latinLnBrk="0" hangingPunct="1">
+              <a:lnSpc>
+                <a:spcPct val="90000"/>
+              </a:lnSpc>
+              <a:spcBef>
+                <a:spcPts val="500"/>
+              </a:spcBef>
+              <a:buFont typeface="Arial" panose="020B0604020202020204" pitchFamily="34" charset="0"/>
+              <a:buChar char="•"/>
+              <a:defRPr sz="1800" kern="1200">
+                <a:solidFill>
+                  <a:schemeClr val="tx1"/>
+                </a:solidFill>
+                <a:latin typeface="+mn-lt"/>
+                <a:ea typeface="+mn-ea"/>
+                <a:cs typeface="+mn-cs"/>
+              </a:defRPr>
+            </a:lvl8pPr>
+            <a:lvl9pPr marL="3886200" indent="-228600" algn="l" defTabSz="914400" rtl="0" eaLnBrk="1" latinLnBrk="0" hangingPunct="1">
+              <a:lnSpc>
+                <a:spcPct val="90000"/>
+              </a:lnSpc>
+              <a:spcBef>
+                <a:spcPts val="500"/>
+              </a:spcBef>
+              <a:buFont typeface="Arial" panose="020B0604020202020204" pitchFamily="34" charset="0"/>
+              <a:buChar char="•"/>
+              <a:defRPr sz="1800" kern="1200">
+                <a:solidFill>
+                  <a:schemeClr val="tx1"/>
+                </a:solidFill>
+                <a:latin typeface="+mn-lt"/>
+                <a:ea typeface="+mn-ea"/>
+                <a:cs typeface="+mn-cs"/>
+              </a:defRPr>
+            </a:lvl9pPr>
+          </a:lstStyle>
+          <a:p>
+            <a:pPr marL="0" indent="0">
+              <a:buNone/>
+            </a:pPr>
+            <a:r>
+              <a:rPr lang="pt-BR" sz="1600" dirty="0">
+                <a:solidFill>
+                  <a:schemeClr val="bg2">
+                    <a:lumMod val="25000"/>
+                  </a:schemeClr>
+                </a:solidFill>
+                <a:cs typeface="Arial" panose="020B0604020202020204" pitchFamily="34" charset="0"/>
+              </a:rPr>
+              <a:t>Leitura de arquivos .</a:t>
+            </a:r>
+            <a:r>
+              <a:rPr lang="pt-BR" sz="1600" dirty="0" err="1">
+                <a:solidFill>
+                  <a:schemeClr val="bg2">
+                    <a:lumMod val="25000"/>
+                  </a:schemeClr>
+                </a:solidFill>
+                <a:cs typeface="Arial" panose="020B0604020202020204" pitchFamily="34" charset="0"/>
+              </a:rPr>
+              <a:t>txt</a:t>
+            </a:r>
+            <a:r>
+              <a:rPr lang="pt-BR" sz="1600" dirty="0">
+                <a:solidFill>
+                  <a:schemeClr val="bg2">
+                    <a:lumMod val="25000"/>
+                  </a:schemeClr>
+                </a:solidFill>
+                <a:cs typeface="Arial" panose="020B0604020202020204" pitchFamily="34" charset="0"/>
+              </a:rPr>
+              <a:t> armazenados no Google Drive</a:t>
+            </a:r>
+            <a:br>
+              <a:rPr lang="pt-BR" sz="1600" dirty="0">
+                <a:solidFill>
+                  <a:schemeClr val="bg2">
+                    <a:lumMod val="25000"/>
+                  </a:schemeClr>
+                </a:solidFill>
+                <a:cs typeface="Arial" panose="020B0604020202020204" pitchFamily="34" charset="0"/>
+              </a:rPr>
+            </a:br>
+            <a:r>
+              <a:rPr lang="pt-BR" sz="1600" dirty="0">
+                <a:solidFill>
+                  <a:schemeClr val="bg2">
+                    <a:lumMod val="25000"/>
+                  </a:schemeClr>
+                </a:solidFill>
+                <a:cs typeface="Arial" panose="020B0604020202020204" pitchFamily="34" charset="0"/>
+              </a:rPr>
+              <a:t>Fonte: Resultados originais da pesquisa </a:t>
+            </a:r>
+          </a:p>
+        </p:txBody>
+      </p:sp>
+      <p:pic>
+        <p:nvPicPr>
+          <p:cNvPr id="19" name="Espaço Reservado para Conteúdo 18" descr="Interface gráfica do usuário, Texto, Aplicativo&#10;&#10;Descrição gerada automaticamente">
+            <a:extLst>
+              <a:ext uri="{FF2B5EF4-FFF2-40B4-BE49-F238E27FC236}">
+                <a16:creationId xmlns:a16="http://schemas.microsoft.com/office/drawing/2014/main" id="{D96DFF99-8B78-7F65-EDFA-331910C21FB4}"/>
+              </a:ext>
+            </a:extLst>
+          </p:cNvPr>
+          <p:cNvPicPr>
+            <a:picLocks noGrp="1" noChangeAspect="1"/>
+          </p:cNvPicPr>
+          <p:nvPr>
+            <p:ph sz="half" idx="2"/>
+          </p:nvPr>
+        </p:nvPicPr>
+        <p:blipFill>
+          <a:blip r:embed="rId2">
+            <a:extLst>
+              <a:ext uri="{28A0092B-C50C-407E-A947-70E740481C1C}">
+                <a14:useLocalDpi xmlns:a14="http://schemas.microsoft.com/office/drawing/2010/main" val="0"/>
+              </a:ext>
+            </a:extLst>
+          </a:blip>
+          <a:stretch>
+            <a:fillRect/>
+          </a:stretch>
+        </p:blipFill>
+        <p:spPr>
+          <a:xfrm>
+            <a:off x="179613" y="2516543"/>
+            <a:ext cx="5603622" cy="2751110"/>
+          </a:xfrm>
+        </p:spPr>
+      </p:pic>
+      <p:pic>
+        <p:nvPicPr>
+          <p:cNvPr id="26" name="Imagem 25" descr="Texto&#10;&#10;Descrição gerada automaticamente com confiança média">
+            <a:extLst>
+              <a:ext uri="{FF2B5EF4-FFF2-40B4-BE49-F238E27FC236}">
+                <a16:creationId xmlns:a16="http://schemas.microsoft.com/office/drawing/2014/main" id="{2663AA25-7416-4E6E-E7F7-E29933F158A5}"/>
+              </a:ext>
+            </a:extLst>
+          </p:cNvPr>
+          <p:cNvPicPr>
+            <a:picLocks noChangeAspect="1"/>
+          </p:cNvPicPr>
+          <p:nvPr/>
+        </p:nvPicPr>
+        <p:blipFill>
+          <a:blip r:embed="rId3">
+            <a:extLst>
+              <a:ext uri="{28A0092B-C50C-407E-A947-70E740481C1C}">
+                <a14:useLocalDpi xmlns:a14="http://schemas.microsoft.com/office/drawing/2010/main" val="0"/>
+              </a:ext>
+            </a:extLst>
+          </a:blip>
+          <a:stretch>
+            <a:fillRect/>
+          </a:stretch>
+        </p:blipFill>
+        <p:spPr>
+          <a:xfrm>
+            <a:off x="6096000" y="3072619"/>
+            <a:ext cx="5981700" cy="1054100"/>
+          </a:xfrm>
+          <a:prstGeom prst="rect">
+            <a:avLst/>
+          </a:prstGeom>
+        </p:spPr>
+      </p:pic>
+      <p:sp>
+        <p:nvSpPr>
+          <p:cNvPr id="27" name="Espaço Reservado para Conteúdo 2">
+            <a:extLst>
+              <a:ext uri="{FF2B5EF4-FFF2-40B4-BE49-F238E27FC236}">
+                <a16:creationId xmlns:a16="http://schemas.microsoft.com/office/drawing/2014/main" id="{9DE381F3-DF21-E88C-6E9D-29A81845FC7C}"/>
+              </a:ext>
+            </a:extLst>
+          </p:cNvPr>
+          <p:cNvSpPr txBox="1">
+            <a:spLocks/>
+          </p:cNvSpPr>
+          <p:nvPr/>
+        </p:nvSpPr>
+        <p:spPr>
+          <a:xfrm>
+            <a:off x="6096000" y="4155085"/>
+            <a:ext cx="5603622" cy="719897"/>
+          </a:xfrm>
+          <a:prstGeom prst="rect">
+            <a:avLst/>
+          </a:prstGeom>
+        </p:spPr>
+        <p:txBody>
+          <a:bodyPr vert="horz" lIns="91440" tIns="45720" rIns="91440" bIns="45720" rtlCol="0">
+            <a:noAutofit/>
+          </a:bodyPr>
+          <a:lstStyle>
+            <a:defPPr>
+              <a:defRPr lang="pt-BR"/>
+            </a:defPPr>
+            <a:lvl1pPr indent="0">
+              <a:lnSpc>
+                <a:spcPct val="90000"/>
+              </a:lnSpc>
+              <a:spcBef>
+                <a:spcPts val="1000"/>
+              </a:spcBef>
+              <a:buFont typeface="Arial" panose="020B0604020202020204" pitchFamily="34" charset="0"/>
+              <a:buNone/>
+              <a:defRPr sz="1600">
+                <a:solidFill>
+                  <a:schemeClr val="bg2">
+                    <a:lumMod val="25000"/>
+                  </a:schemeClr>
+                </a:solidFill>
+                <a:cs typeface="Arial" panose="020B0604020202020204" pitchFamily="34" charset="0"/>
+              </a:defRPr>
+            </a:lvl1pPr>
+            <a:lvl2pPr marL="685800" indent="-228600">
+              <a:lnSpc>
+                <a:spcPct val="90000"/>
+              </a:lnSpc>
+              <a:spcBef>
+                <a:spcPts val="500"/>
+              </a:spcBef>
+              <a:buFont typeface="Arial" panose="020B0604020202020204" pitchFamily="34" charset="0"/>
+              <a:buChar char="•"/>
+              <a:defRPr sz="2400"/>
+            </a:lvl2pPr>
+            <a:lvl3pPr marL="1143000" indent="-228600">
+              <a:lnSpc>
+                <a:spcPct val="90000"/>
+              </a:lnSpc>
+              <a:spcBef>
+                <a:spcPts val="500"/>
+              </a:spcBef>
+              <a:buFont typeface="Arial" panose="020B0604020202020204" pitchFamily="34" charset="0"/>
+              <a:buChar char="•"/>
+              <a:defRPr sz="2000"/>
+            </a:lvl3pPr>
+            <a:lvl4pPr marL="1600200" indent="-228600">
+              <a:lnSpc>
+                <a:spcPct val="90000"/>
+              </a:lnSpc>
+              <a:spcBef>
+                <a:spcPts val="500"/>
+              </a:spcBef>
+              <a:buFont typeface="Arial" panose="020B0604020202020204" pitchFamily="34" charset="0"/>
+              <a:buChar char="•"/>
+            </a:lvl4pPr>
+            <a:lvl5pPr marL="2057400" indent="-228600">
+              <a:lnSpc>
+                <a:spcPct val="90000"/>
+              </a:lnSpc>
+              <a:spcBef>
+                <a:spcPts val="500"/>
+              </a:spcBef>
+              <a:buFont typeface="Arial" panose="020B0604020202020204" pitchFamily="34" charset="0"/>
+              <a:buChar char="•"/>
+            </a:lvl5pPr>
+            <a:lvl6pPr marL="2514600" indent="-228600">
+              <a:lnSpc>
+                <a:spcPct val="90000"/>
+              </a:lnSpc>
+              <a:spcBef>
+                <a:spcPts val="500"/>
+              </a:spcBef>
+              <a:buFont typeface="Arial" panose="020B0604020202020204" pitchFamily="34" charset="0"/>
+              <a:buChar char="•"/>
+            </a:lvl6pPr>
+            <a:lvl7pPr marL="2971800" indent="-228600">
+              <a:lnSpc>
+                <a:spcPct val="90000"/>
+              </a:lnSpc>
+              <a:spcBef>
+                <a:spcPts val="500"/>
+              </a:spcBef>
+              <a:buFont typeface="Arial" panose="020B0604020202020204" pitchFamily="34" charset="0"/>
+              <a:buChar char="•"/>
+            </a:lvl7pPr>
+            <a:lvl8pPr marL="3429000" indent="-228600">
+              <a:lnSpc>
+                <a:spcPct val="90000"/>
+              </a:lnSpc>
+              <a:spcBef>
+                <a:spcPts val="500"/>
+              </a:spcBef>
+              <a:buFont typeface="Arial" panose="020B0604020202020204" pitchFamily="34" charset="0"/>
+              <a:buChar char="•"/>
+            </a:lvl8pPr>
+            <a:lvl9pPr marL="3886200" indent="-228600">
+              <a:lnSpc>
+                <a:spcPct val="90000"/>
+              </a:lnSpc>
+              <a:spcBef>
+                <a:spcPts val="500"/>
+              </a:spcBef>
+              <a:buFont typeface="Arial" panose="020B0604020202020204" pitchFamily="34" charset="0"/>
+              <a:buChar char="•"/>
+            </a:lvl9pPr>
+          </a:lstStyle>
+          <a:p>
+            <a:r>
+              <a:rPr lang="pt-BR" dirty="0"/>
+              <a:t>“Print” de uma parte do livro Harry Potter e a Pedra Filosofal sem nenhuma aplicação de pré-processamento </a:t>
+            </a:r>
+            <a:br>
+              <a:rPr lang="pt-BR" dirty="0"/>
+            </a:br>
+            <a:r>
+              <a:rPr lang="pt-BR" dirty="0"/>
+              <a:t>Fonte: Resultados originais da pesquisa </a:t>
+            </a:r>
+          </a:p>
+        </p:txBody>
+      </p:sp>
+    </p:spTree>
+    <p:extLst>
+      <p:ext uri="{BB962C8B-B14F-4D97-AF65-F5344CB8AC3E}">
+        <p14:creationId xmlns:p14="http://schemas.microsoft.com/office/powerpoint/2010/main" val="3703064575"/>
       </p:ext>
     </p:extLst>
   </p:cSld>

</xml_diff>

<commit_message>
V1.0 - Apresentação TCC
</commit_message>
<xml_diff>
--- a/Apresentação TCC - Vinícius Andrade Lopes.pptx
+++ b/Apresentação TCC - Vinícius Andrade Lopes.pptx
@@ -11,7 +11,10 @@
     <p:sldId id="260" r:id="rId5"/>
     <p:sldId id="261" r:id="rId6"/>
     <p:sldId id="262" r:id="rId7"/>
-    <p:sldId id="263" r:id="rId8"/>
+    <p:sldId id="264" r:id="rId8"/>
+    <p:sldId id="263" r:id="rId9"/>
+    <p:sldId id="265" r:id="rId10"/>
+    <p:sldId id="266" r:id="rId11"/>
   </p:sldIdLst>
   <p:sldSz cx="12192000" cy="6858000"/>
   <p:notesSz cx="6858000" cy="9144000"/>
@@ -3356,6 +3359,221 @@
 </p:sld>
 </file>
 
+<file path=ppt/slides/slide10.xml><?xml version="1.0" encoding="utf-8"?>
+<p:sld xmlns:a="http://schemas.openxmlformats.org/drawingml/2006/main" xmlns:r="http://schemas.openxmlformats.org/officeDocument/2006/relationships" xmlns:p="http://schemas.openxmlformats.org/presentationml/2006/main">
+  <p:cSld>
+    <p:spTree>
+      <p:nvGrpSpPr>
+        <p:cNvPr id="1" name=""/>
+        <p:cNvGrpSpPr/>
+        <p:nvPr/>
+      </p:nvGrpSpPr>
+      <p:grpSpPr>
+        <a:xfrm>
+          <a:off x="0" y="0"/>
+          <a:ext cx="0" cy="0"/>
+          <a:chOff x="0" y="0"/>
+          <a:chExt cx="0" cy="0"/>
+        </a:xfrm>
+      </p:grpSpPr>
+      <p:sp>
+        <p:nvSpPr>
+          <p:cNvPr id="7" name="Rectangle 6">
+            <a:extLst>
+              <a:ext uri="{FF2B5EF4-FFF2-40B4-BE49-F238E27FC236}">
+                <a16:creationId xmlns:a16="http://schemas.microsoft.com/office/drawing/2014/main" id="{04FABB05-6C2E-CEFC-8C95-F5EA054DAF7D}"/>
+              </a:ext>
+            </a:extLst>
+          </p:cNvPr>
+          <p:cNvSpPr/>
+          <p:nvPr/>
+        </p:nvSpPr>
+        <p:spPr>
+          <a:xfrm>
+            <a:off x="6229739" y="0"/>
+            <a:ext cx="5962261" cy="6858000"/>
+          </a:xfrm>
+          <a:prstGeom prst="rect">
+            <a:avLst/>
+          </a:prstGeom>
+          <a:solidFill>
+            <a:schemeClr val="tx2">
+              <a:lumMod val="60000"/>
+              <a:lumOff val="40000"/>
+              <a:alpha val="70000"/>
+            </a:schemeClr>
+          </a:solidFill>
+          <a:ln w="12700">
+            <a:noFill/>
+          </a:ln>
+        </p:spPr>
+        <p:style>
+          <a:lnRef idx="0">
+            <a:scrgbClr r="0" g="0" b="0"/>
+          </a:lnRef>
+          <a:fillRef idx="0">
+            <a:scrgbClr r="0" g="0" b="0"/>
+          </a:fillRef>
+          <a:effectRef idx="0">
+            <a:scrgbClr r="0" g="0" b="0"/>
+          </a:effectRef>
+          <a:fontRef idx="minor">
+            <a:schemeClr val="lt1"/>
+          </a:fontRef>
+        </p:style>
+        <p:txBody>
+          <a:bodyPr rtlCol="0" anchor="ctr"/>
+          <a:lstStyle/>
+          <a:p>
+            <a:pPr>
+              <a:lnSpc>
+                <a:spcPct val="90000"/>
+              </a:lnSpc>
+              <a:spcBef>
+                <a:spcPts val="1000"/>
+              </a:spcBef>
+            </a:pPr>
+            <a:endParaRPr lang="pt-BR" sz="1600" dirty="0">
+              <a:solidFill>
+                <a:schemeClr val="bg2">
+                  <a:lumMod val="10000"/>
+                </a:schemeClr>
+              </a:solidFill>
+              <a:ea typeface="Calibri" panose="020F0502020204030204" pitchFamily="34" charset="0"/>
+              <a:cs typeface="Arial" panose="020B0604020202020204" pitchFamily="34" charset="0"/>
+            </a:endParaRPr>
+          </a:p>
+        </p:txBody>
+      </p:sp>
+      <p:sp>
+        <p:nvSpPr>
+          <p:cNvPr id="4" name="Arrow: Pentagon 3">
+            <a:extLst>
+              <a:ext uri="{FF2B5EF4-FFF2-40B4-BE49-F238E27FC236}">
+                <a16:creationId xmlns:a16="http://schemas.microsoft.com/office/drawing/2014/main" id="{0E1C5205-F74D-8360-EDEE-B204D8633772}"/>
+              </a:ext>
+            </a:extLst>
+          </p:cNvPr>
+          <p:cNvSpPr/>
+          <p:nvPr/>
+        </p:nvSpPr>
+        <p:spPr>
+          <a:xfrm>
+            <a:off x="-1" y="383391"/>
+            <a:ext cx="5962261" cy="905773"/>
+          </a:xfrm>
+          <a:prstGeom prst="homePlate">
+            <a:avLst/>
+          </a:prstGeom>
+          <a:solidFill>
+            <a:schemeClr val="bg2">
+              <a:lumMod val="25000"/>
+              <a:alpha val="85000"/>
+            </a:schemeClr>
+          </a:solidFill>
+        </p:spPr>
+        <p:style>
+          <a:lnRef idx="1">
+            <a:schemeClr val="accent3"/>
+          </a:lnRef>
+          <a:fillRef idx="3">
+            <a:schemeClr val="accent3"/>
+          </a:fillRef>
+          <a:effectRef idx="2">
+            <a:schemeClr val="accent3"/>
+          </a:effectRef>
+          <a:fontRef idx="minor">
+            <a:schemeClr val="lt1"/>
+          </a:fontRef>
+        </p:style>
+        <p:txBody>
+          <a:bodyPr rtlCol="0" anchor="ctr"/>
+          <a:lstStyle/>
+          <a:p>
+            <a:pPr algn="ctr"/>
+            <a:r>
+              <a:rPr lang="pt-BR" sz="3700" dirty="0">
+                <a:solidFill>
+                  <a:schemeClr val="bg1"/>
+                </a:solidFill>
+              </a:rPr>
+              <a:t>RESULTADOS E DISCUSSÕES</a:t>
+            </a:r>
+          </a:p>
+        </p:txBody>
+      </p:sp>
+      <p:sp>
+        <p:nvSpPr>
+          <p:cNvPr id="6" name="Arrow: Pentagon 5">
+            <a:extLst>
+              <a:ext uri="{FF2B5EF4-FFF2-40B4-BE49-F238E27FC236}">
+                <a16:creationId xmlns:a16="http://schemas.microsoft.com/office/drawing/2014/main" id="{6495FEFB-EF83-9F99-FA59-304B76DA4498}"/>
+              </a:ext>
+            </a:extLst>
+          </p:cNvPr>
+          <p:cNvSpPr/>
+          <p:nvPr/>
+        </p:nvSpPr>
+        <p:spPr>
+          <a:xfrm>
+            <a:off x="-1" y="1170272"/>
+            <a:ext cx="4450704" cy="453255"/>
+          </a:xfrm>
+          <a:prstGeom prst="homePlate">
+            <a:avLst/>
+          </a:prstGeom>
+          <a:solidFill>
+            <a:schemeClr val="bg2">
+              <a:lumMod val="75000"/>
+              <a:alpha val="90000"/>
+            </a:schemeClr>
+          </a:solidFill>
+        </p:spPr>
+        <p:style>
+          <a:lnRef idx="1">
+            <a:schemeClr val="accent3"/>
+          </a:lnRef>
+          <a:fillRef idx="3">
+            <a:schemeClr val="accent3"/>
+          </a:fillRef>
+          <a:effectRef idx="2">
+            <a:schemeClr val="accent3"/>
+          </a:effectRef>
+          <a:fontRef idx="minor">
+            <a:schemeClr val="lt1"/>
+          </a:fontRef>
+        </p:style>
+        <p:txBody>
+          <a:bodyPr rtlCol="0" anchor="ctr"/>
+          <a:lstStyle/>
+          <a:p>
+            <a:pPr algn="ctr"/>
+            <a:r>
+              <a:rPr lang="pt-BR" sz="2800" dirty="0">
+                <a:solidFill>
+                  <a:schemeClr val="bg2">
+                    <a:lumMod val="25000"/>
+                  </a:schemeClr>
+                </a:solidFill>
+              </a:rPr>
+              <a:t>VISUALIZAÇÃO DE DADOS</a:t>
+            </a:r>
+          </a:p>
+        </p:txBody>
+      </p:sp>
+    </p:spTree>
+    <p:extLst>
+      <p:ext uri="{BB962C8B-B14F-4D97-AF65-F5344CB8AC3E}">
+        <p14:creationId xmlns:p14="http://schemas.microsoft.com/office/powerpoint/2010/main" val="3513648849"/>
+      </p:ext>
+    </p:extLst>
+  </p:cSld>
+  <p:clrMapOvr>
+    <a:masterClrMapping/>
+  </p:clrMapOvr>
+</p:sld>
+</file>
+
 <file path=ppt/slides/slide2.xml><?xml version="1.0" encoding="utf-8"?>
 <p:sld xmlns:a="http://schemas.openxmlformats.org/drawingml/2006/main" xmlns:r="http://schemas.openxmlformats.org/officeDocument/2006/relationships" xmlns:p="http://schemas.openxmlformats.org/presentationml/2006/main">
   <p:cSld>
@@ -3593,7 +3811,7 @@
           <a:lstStyle/>
           <a:p>
             <a:r>
-              <a:rPr lang="pt-BR" sz="1600" b="1" dirty="0">
+              <a:rPr lang="pt-BR" sz="1600" dirty="0">
                 <a:solidFill>
                   <a:schemeClr val="bg2">
                     <a:lumMod val="10000"/>
@@ -3605,7 +3823,7 @@
               <a:t>N</a:t>
             </a:r>
             <a:r>
-              <a:rPr lang="pt-BR" sz="1600" b="1" dirty="0">
+              <a:rPr lang="pt-BR" sz="1600" dirty="0">
                 <a:solidFill>
                   <a:schemeClr val="bg2">
                     <a:lumMod val="10000"/>
@@ -3617,7 +3835,7 @@
               </a:rPr>
               <a:t>ão basta somente ter acesso a grandes volumes de dados. O ponto chave a ser realmente considerado, é como encontrar uma informação útil dentro de um arcabouço de dados diversificados (Yang et al., 2020).</a:t>
             </a:r>
-            <a:endParaRPr lang="pt-BR" sz="1600" b="1" dirty="0">
+            <a:endParaRPr lang="pt-BR" sz="1600" dirty="0">
               <a:solidFill>
                 <a:schemeClr val="bg2">
                   <a:lumMod val="10000"/>
@@ -3631,7 +3849,7 @@
             <a:pPr marL="0" indent="0">
               <a:buNone/>
             </a:pPr>
-            <a:endParaRPr lang="pt-BR" sz="1600" b="1" dirty="0">
+            <a:endParaRPr lang="pt-BR" sz="1600" dirty="0">
               <a:solidFill>
                 <a:schemeClr val="bg2">
                   <a:lumMod val="10000"/>
@@ -3643,7 +3861,7 @@
           </a:p>
           <a:p>
             <a:r>
-              <a:rPr lang="pt-BR" sz="1600" b="1" dirty="0">
+              <a:rPr lang="pt-BR" sz="1600" dirty="0">
                 <a:solidFill>
                   <a:schemeClr val="bg2">
                     <a:lumMod val="10000"/>
@@ -3655,7 +3873,7 @@
               </a:rPr>
               <a:t>Desenvolver uma base de dados estruturada, sem erros de formatação e com os devidos parâmetros definidos, facilita a objetividade da visualização e análise das informações (Wickham, 2016).</a:t>
             </a:r>
-            <a:endParaRPr lang="pt-BR" sz="1600" b="1" dirty="0">
+            <a:endParaRPr lang="pt-BR" sz="1600" dirty="0">
               <a:solidFill>
                 <a:schemeClr val="bg2">
                   <a:lumMod val="10000"/>
@@ -4038,7 +4256,7 @@
               <a:buChar char="•"/>
             </a:pPr>
             <a:r>
-              <a:rPr lang="pt-BR" sz="1600" b="1" dirty="0">
+              <a:rPr lang="pt-BR" sz="1600" dirty="0">
                 <a:solidFill>
                   <a:schemeClr val="bg2">
                     <a:lumMod val="10000"/>
@@ -4050,7 +4268,7 @@
               <a:t>PLN utiliza preceitos linguísticos como classe de palavras para realizar as análises, como por exemplo substantivos, verbos, adjetivos, pronomes, dentre outros, além de diversas estruturas gramaticais que têm por objetivo dar sentido às sentenças analisadas (</a:t>
             </a:r>
             <a:r>
-              <a:rPr lang="pt-BR" sz="1600" b="1" dirty="0" err="1">
+              <a:rPr lang="pt-BR" sz="1600" dirty="0" err="1">
                 <a:solidFill>
                   <a:schemeClr val="bg2">
                     <a:lumMod val="10000"/>
@@ -4062,7 +4280,7 @@
               <a:t>Indurkhya</a:t>
             </a:r>
             <a:r>
-              <a:rPr lang="pt-BR" sz="1600" b="1" dirty="0">
+              <a:rPr lang="pt-BR" sz="1600" dirty="0">
                 <a:solidFill>
                   <a:schemeClr val="bg2">
                     <a:lumMod val="10000"/>
@@ -4083,7 +4301,7 @@
                 <a:spcPts val="1000"/>
               </a:spcBef>
             </a:pPr>
-            <a:endParaRPr lang="pt-BR" sz="1600" b="1" dirty="0">
+            <a:endParaRPr lang="pt-BR" sz="1600" dirty="0">
               <a:solidFill>
                 <a:schemeClr val="bg2">
                   <a:lumMod val="10000"/>
@@ -4105,7 +4323,7 @@
               <a:buChar char="•"/>
             </a:pPr>
             <a:r>
-              <a:rPr lang="pt-BR" sz="1600" b="1" dirty="0">
+              <a:rPr lang="pt-BR" sz="1600" dirty="0">
                 <a:solidFill>
                   <a:schemeClr val="bg2">
                     <a:lumMod val="10000"/>
@@ -4196,7 +4414,7 @@
               <a:buNone/>
             </a:pPr>
             <a:r>
-              <a:rPr lang="pt-BR" sz="1600" b="1" dirty="0">
+              <a:rPr lang="pt-BR" sz="1600" dirty="0">
                 <a:solidFill>
                   <a:schemeClr val="bg2">
                     <a:lumMod val="25000"/>
@@ -4208,7 +4426,7 @@
               <a:t>NLTK é uma plataforma que trabalha com as diversas técnicas de processamento estatístico de linguagem natural, facilitando a implementação dessas ferramentas em diversos “softwares”. A plataforma possui recursos léxicos e disponibiliza bibliotecas de processamento de textos para </a:t>
             </a:r>
             <a:r>
-              <a:rPr lang="pt-BR" sz="1600" b="1" dirty="0" err="1">
+              <a:rPr lang="pt-BR" sz="1600" dirty="0" err="1">
                 <a:solidFill>
                   <a:schemeClr val="bg2">
                     <a:lumMod val="25000"/>
@@ -4220,7 +4438,7 @@
               <a:t>tokenização</a:t>
             </a:r>
             <a:r>
-              <a:rPr lang="pt-BR" sz="1600" b="1" dirty="0">
+              <a:rPr lang="pt-BR" sz="1600" dirty="0">
                 <a:solidFill>
                   <a:schemeClr val="bg2">
                     <a:lumMod val="25000"/>
@@ -4232,7 +4450,7 @@
               <a:t>, classificação, “</a:t>
             </a:r>
             <a:r>
-              <a:rPr lang="pt-BR" sz="1600" b="1" dirty="0" err="1">
+              <a:rPr lang="pt-BR" sz="1600" dirty="0" err="1">
                 <a:solidFill>
                   <a:schemeClr val="bg2">
                     <a:lumMod val="25000"/>
@@ -4244,7 +4462,7 @@
               <a:t>stemming</a:t>
             </a:r>
             <a:r>
-              <a:rPr lang="pt-BR" sz="1600" b="1" dirty="0">
+              <a:rPr lang="pt-BR" sz="1600" dirty="0">
                 <a:solidFill>
                   <a:schemeClr val="bg2">
                     <a:lumMod val="25000"/>
@@ -4256,7 +4474,7 @@
               <a:t>”, análise de raciocínio semântico, e um fórum ativo de discussão (Bird et al., 2009). Para acessar todos os recursos da biblioteca, foi utilizado a linguagem de programação </a:t>
             </a:r>
             <a:r>
-              <a:rPr lang="pt-BR" sz="1600" b="1" dirty="0" err="1">
+              <a:rPr lang="pt-BR" sz="1600" dirty="0" err="1">
                 <a:solidFill>
                   <a:schemeClr val="bg2">
                     <a:lumMod val="25000"/>
@@ -4268,7 +4486,7 @@
               <a:t>python</a:t>
             </a:r>
             <a:r>
-              <a:rPr lang="pt-BR" sz="1600" b="1" dirty="0">
+              <a:rPr lang="pt-BR" sz="1600" dirty="0">
                 <a:solidFill>
                   <a:schemeClr val="bg2">
                     <a:lumMod val="25000"/>
@@ -4508,7 +4726,7 @@
               <a:buChar char="•"/>
             </a:pPr>
             <a:r>
-              <a:rPr lang="pt-BR" sz="1600" b="1" dirty="0">
+              <a:rPr lang="pt-BR" sz="1600" dirty="0">
                 <a:solidFill>
                   <a:schemeClr val="bg2">
                     <a:lumMod val="10000"/>
@@ -4520,7 +4738,7 @@
               <a:t>A estratégia de pesquisa utilizada no desenvolvimento deste projeto será exploratória, visando apresentar de forma clara e concisa, didática e prática, a implementação das técnicas de processamento de linguagem natural disponibilizadas pela biblioteca “Natural </a:t>
             </a:r>
             <a:r>
-              <a:rPr lang="pt-BR" sz="1600" b="1" dirty="0" err="1">
+              <a:rPr lang="pt-BR" sz="1600" dirty="0" err="1">
                 <a:solidFill>
                   <a:schemeClr val="bg2">
                     <a:lumMod val="10000"/>
@@ -4532,7 +4750,7 @@
               <a:t>Language</a:t>
             </a:r>
             <a:r>
-              <a:rPr lang="pt-BR" sz="1600" b="1" dirty="0">
+              <a:rPr lang="pt-BR" sz="1600" dirty="0">
                 <a:solidFill>
                   <a:schemeClr val="bg2">
                     <a:lumMod val="10000"/>
@@ -7205,7 +7423,7 @@
               </a:rPr>
             </a:br>
             <a:r>
-              <a:rPr lang="pt-BR" sz="1600" dirty="0">
+              <a:rPr lang="pt-BR" sz="1600" b="1" dirty="0">
                 <a:solidFill>
                   <a:schemeClr val="bg2">
                     <a:lumMod val="25000"/>
@@ -7359,7 +7577,7 @@
                   </a:schemeClr>
                 </a:solidFill>
               </a:rPr>
-              <a:t>PRÉ-PROCESSAMENTO</a:t>
+              <a:t>COLETA DOS DADOS</a:t>
             </a:r>
           </a:p>
         </p:txBody>
@@ -7749,7 +7967,7 @@
               </a:rPr>
             </a:br>
             <a:r>
-              <a:rPr lang="pt-BR" sz="1600" dirty="0">
+              <a:rPr lang="pt-BR" sz="1600" b="1" dirty="0">
                 <a:solidFill>
                   <a:schemeClr val="bg2">
                     <a:lumMod val="25000"/>
@@ -7974,7 +8192,710 @@
               <a:rPr lang="pt-BR" dirty="0"/>
             </a:br>
             <a:r>
+              <a:rPr lang="pt-BR" b="1" dirty="0"/>
+              <a:t>Fonte: Resultados originais da pesquisa </a:t>
+            </a:r>
+          </a:p>
+        </p:txBody>
+      </p:sp>
+    </p:spTree>
+    <p:extLst>
+      <p:ext uri="{BB962C8B-B14F-4D97-AF65-F5344CB8AC3E}">
+        <p14:creationId xmlns:p14="http://schemas.microsoft.com/office/powerpoint/2010/main" val="799120742"/>
+      </p:ext>
+    </p:extLst>
+  </p:cSld>
+  <p:clrMapOvr>
+    <a:masterClrMapping/>
+  </p:clrMapOvr>
+</p:sld>
+</file>
+
+<file path=ppt/slides/slide8.xml><?xml version="1.0" encoding="utf-8"?>
+<p:sld xmlns:a="http://schemas.openxmlformats.org/drawingml/2006/main" xmlns:r="http://schemas.openxmlformats.org/officeDocument/2006/relationships" xmlns:p="http://schemas.openxmlformats.org/presentationml/2006/main">
+  <p:cSld>
+    <p:spTree>
+      <p:nvGrpSpPr>
+        <p:cNvPr id="1" name=""/>
+        <p:cNvGrpSpPr/>
+        <p:nvPr/>
+      </p:nvGrpSpPr>
+      <p:grpSpPr>
+        <a:xfrm>
+          <a:off x="0" y="0"/>
+          <a:ext cx="0" cy="0"/>
+          <a:chOff x="0" y="0"/>
+          <a:chExt cx="0" cy="0"/>
+        </a:xfrm>
+      </p:grpSpPr>
+      <p:sp>
+        <p:nvSpPr>
+          <p:cNvPr id="4" name="Arrow: Pentagon 3">
+            <a:extLst>
+              <a:ext uri="{FF2B5EF4-FFF2-40B4-BE49-F238E27FC236}">
+                <a16:creationId xmlns:a16="http://schemas.microsoft.com/office/drawing/2014/main" id="{0E1C5205-F74D-8360-EDEE-B204D8633772}"/>
+              </a:ext>
+            </a:extLst>
+          </p:cNvPr>
+          <p:cNvSpPr/>
+          <p:nvPr/>
+        </p:nvSpPr>
+        <p:spPr>
+          <a:xfrm>
+            <a:off x="-1" y="383391"/>
+            <a:ext cx="5962261" cy="905773"/>
+          </a:xfrm>
+          <a:prstGeom prst="homePlate">
+            <a:avLst/>
+          </a:prstGeom>
+          <a:solidFill>
+            <a:schemeClr val="bg2">
+              <a:lumMod val="25000"/>
+              <a:alpha val="85000"/>
+            </a:schemeClr>
+          </a:solidFill>
+        </p:spPr>
+        <p:style>
+          <a:lnRef idx="1">
+            <a:schemeClr val="accent3"/>
+          </a:lnRef>
+          <a:fillRef idx="3">
+            <a:schemeClr val="accent3"/>
+          </a:fillRef>
+          <a:effectRef idx="2">
+            <a:schemeClr val="accent3"/>
+          </a:effectRef>
+          <a:fontRef idx="minor">
+            <a:schemeClr val="lt1"/>
+          </a:fontRef>
+        </p:style>
+        <p:txBody>
+          <a:bodyPr rtlCol="0" anchor="ctr"/>
+          <a:lstStyle/>
+          <a:p>
+            <a:pPr algn="ctr"/>
+            <a:r>
+              <a:rPr lang="pt-BR" sz="3700" dirty="0">
+                <a:solidFill>
+                  <a:schemeClr val="bg1"/>
+                </a:solidFill>
+              </a:rPr>
+              <a:t>RESULTADOS E DISCUSSÕES</a:t>
+            </a:r>
+          </a:p>
+        </p:txBody>
+      </p:sp>
+      <p:sp>
+        <p:nvSpPr>
+          <p:cNvPr id="6" name="Arrow: Pentagon 5">
+            <a:extLst>
+              <a:ext uri="{FF2B5EF4-FFF2-40B4-BE49-F238E27FC236}">
+                <a16:creationId xmlns:a16="http://schemas.microsoft.com/office/drawing/2014/main" id="{6495FEFB-EF83-9F99-FA59-304B76DA4498}"/>
+              </a:ext>
+            </a:extLst>
+          </p:cNvPr>
+          <p:cNvSpPr/>
+          <p:nvPr/>
+        </p:nvSpPr>
+        <p:spPr>
+          <a:xfrm>
+            <a:off x="-1" y="1170272"/>
+            <a:ext cx="4450704" cy="453255"/>
+          </a:xfrm>
+          <a:prstGeom prst="homePlate">
+            <a:avLst/>
+          </a:prstGeom>
+          <a:solidFill>
+            <a:schemeClr val="bg2">
+              <a:lumMod val="75000"/>
+              <a:alpha val="90000"/>
+            </a:schemeClr>
+          </a:solidFill>
+        </p:spPr>
+        <p:style>
+          <a:lnRef idx="1">
+            <a:schemeClr val="accent3"/>
+          </a:lnRef>
+          <a:fillRef idx="3">
+            <a:schemeClr val="accent3"/>
+          </a:fillRef>
+          <a:effectRef idx="2">
+            <a:schemeClr val="accent3"/>
+          </a:effectRef>
+          <a:fontRef idx="minor">
+            <a:schemeClr val="lt1"/>
+          </a:fontRef>
+        </p:style>
+        <p:txBody>
+          <a:bodyPr rtlCol="0" anchor="ctr"/>
+          <a:lstStyle/>
+          <a:p>
+            <a:pPr algn="ctr"/>
+            <a:r>
+              <a:rPr lang="pt-BR" sz="2800" dirty="0">
+                <a:solidFill>
+                  <a:schemeClr val="bg2">
+                    <a:lumMod val="25000"/>
+                  </a:schemeClr>
+                </a:solidFill>
+              </a:rPr>
+              <a:t>TRATATIVA DOS DADOS</a:t>
+            </a:r>
+          </a:p>
+        </p:txBody>
+      </p:sp>
+      <p:sp>
+        <p:nvSpPr>
+          <p:cNvPr id="7" name="Rectangle 6">
+            <a:extLst>
+              <a:ext uri="{FF2B5EF4-FFF2-40B4-BE49-F238E27FC236}">
+                <a16:creationId xmlns:a16="http://schemas.microsoft.com/office/drawing/2014/main" id="{04FABB05-6C2E-CEFC-8C95-F5EA054DAF7D}"/>
+              </a:ext>
+            </a:extLst>
+          </p:cNvPr>
+          <p:cNvSpPr/>
+          <p:nvPr/>
+        </p:nvSpPr>
+        <p:spPr>
+          <a:xfrm>
+            <a:off x="225664" y="2091972"/>
+            <a:ext cx="5188817" cy="4288280"/>
+          </a:xfrm>
+          <a:prstGeom prst="rect">
+            <a:avLst/>
+          </a:prstGeom>
+          <a:solidFill>
+            <a:schemeClr val="tx2">
+              <a:lumMod val="60000"/>
+              <a:lumOff val="40000"/>
+              <a:alpha val="70000"/>
+            </a:schemeClr>
+          </a:solidFill>
+          <a:ln w="12700">
+            <a:noFill/>
+          </a:ln>
+        </p:spPr>
+        <p:style>
+          <a:lnRef idx="0">
+            <a:scrgbClr r="0" g="0" b="0"/>
+          </a:lnRef>
+          <a:fillRef idx="0">
+            <a:scrgbClr r="0" g="0" b="0"/>
+          </a:fillRef>
+          <a:effectRef idx="0">
+            <a:scrgbClr r="0" g="0" b="0"/>
+          </a:effectRef>
+          <a:fontRef idx="minor">
+            <a:schemeClr val="lt1"/>
+          </a:fontRef>
+        </p:style>
+        <p:txBody>
+          <a:bodyPr rtlCol="0" anchor="ctr"/>
+          <a:lstStyle/>
+          <a:p>
+            <a:pPr marL="228600" indent="-228600">
+              <a:lnSpc>
+                <a:spcPct val="90000"/>
+              </a:lnSpc>
+              <a:spcBef>
+                <a:spcPts val="1000"/>
+              </a:spcBef>
+              <a:buFont typeface="Arial" panose="020B0604020202020204" pitchFamily="34" charset="0"/>
+              <a:buChar char="•"/>
+            </a:pPr>
+            <a:r>
+              <a:rPr lang="pt-BR" sz="1600" dirty="0">
+                <a:solidFill>
+                  <a:schemeClr val="bg2">
+                    <a:lumMod val="10000"/>
+                  </a:schemeClr>
+                </a:solidFill>
+                <a:ea typeface="Calibri" panose="020F0502020204030204" pitchFamily="34" charset="0"/>
+                <a:cs typeface="Arial" panose="020B0604020202020204" pitchFamily="34" charset="0"/>
+              </a:rPr>
+              <a:t>Implementação de expressões regulares (</a:t>
+            </a:r>
+            <a:r>
+              <a:rPr lang="pt-BR" sz="1600" dirty="0" err="1">
+                <a:solidFill>
+                  <a:schemeClr val="bg2">
+                    <a:lumMod val="10000"/>
+                  </a:schemeClr>
+                </a:solidFill>
+                <a:ea typeface="Calibri" panose="020F0502020204030204" pitchFamily="34" charset="0"/>
+                <a:cs typeface="Arial" panose="020B0604020202020204" pitchFamily="34" charset="0"/>
+              </a:rPr>
+              <a:t>ReGex</a:t>
+            </a:r>
+            <a:r>
+              <a:rPr lang="pt-BR" sz="1600" dirty="0">
+                <a:solidFill>
+                  <a:schemeClr val="bg2">
+                    <a:lumMod val="10000"/>
+                  </a:schemeClr>
+                </a:solidFill>
+                <a:ea typeface="Calibri" panose="020F0502020204030204" pitchFamily="34" charset="0"/>
+                <a:cs typeface="Arial" panose="020B0604020202020204" pitchFamily="34" charset="0"/>
+              </a:rPr>
+              <a:t>).</a:t>
+            </a:r>
+          </a:p>
+          <a:p>
+            <a:pPr marL="228600" indent="-228600">
+              <a:lnSpc>
+                <a:spcPct val="90000"/>
+              </a:lnSpc>
+              <a:spcBef>
+                <a:spcPts val="1000"/>
+              </a:spcBef>
+              <a:buFont typeface="Arial" panose="020B0604020202020204" pitchFamily="34" charset="0"/>
+              <a:buChar char="•"/>
+            </a:pPr>
+            <a:r>
+              <a:rPr lang="pt-BR" sz="1600" dirty="0">
+                <a:solidFill>
+                  <a:schemeClr val="bg2">
+                    <a:lumMod val="10000"/>
+                  </a:schemeClr>
+                </a:solidFill>
+                <a:ea typeface="Calibri" panose="020F0502020204030204" pitchFamily="34" charset="0"/>
+                <a:cs typeface="Arial" panose="020B0604020202020204" pitchFamily="34" charset="0"/>
+              </a:rPr>
+              <a:t>Limpeza dos dados.</a:t>
+            </a:r>
+          </a:p>
+          <a:p>
+            <a:pPr marL="228600" indent="-228600">
+              <a:lnSpc>
+                <a:spcPct val="90000"/>
+              </a:lnSpc>
+              <a:spcBef>
+                <a:spcPts val="1000"/>
+              </a:spcBef>
+              <a:buFont typeface="Arial" panose="020B0604020202020204" pitchFamily="34" charset="0"/>
+              <a:buChar char="•"/>
+            </a:pPr>
+            <a:r>
+              <a:rPr lang="pt-BR" sz="1600" dirty="0">
+                <a:solidFill>
+                  <a:schemeClr val="bg2">
+                    <a:lumMod val="10000"/>
+                  </a:schemeClr>
+                </a:solidFill>
+                <a:ea typeface="Calibri" panose="020F0502020204030204" pitchFamily="34" charset="0"/>
+                <a:cs typeface="Arial" panose="020B0604020202020204" pitchFamily="34" charset="0"/>
+              </a:rPr>
+              <a:t>Padronização dos dados.</a:t>
+            </a:r>
+          </a:p>
+          <a:p>
+            <a:pPr marL="228600" indent="-228600">
+              <a:lnSpc>
+                <a:spcPct val="90000"/>
+              </a:lnSpc>
+              <a:spcBef>
+                <a:spcPts val="1000"/>
+              </a:spcBef>
+              <a:buFont typeface="Arial" panose="020B0604020202020204" pitchFamily="34" charset="0"/>
+              <a:buChar char="•"/>
+            </a:pPr>
+            <a:r>
+              <a:rPr lang="pt-BR" sz="1600" dirty="0">
+                <a:solidFill>
+                  <a:schemeClr val="bg2">
+                    <a:lumMod val="10000"/>
+                  </a:schemeClr>
+                </a:solidFill>
+                <a:ea typeface="Calibri" panose="020F0502020204030204" pitchFamily="34" charset="0"/>
+                <a:cs typeface="Arial" panose="020B0604020202020204" pitchFamily="34" charset="0"/>
+              </a:rPr>
+              <a:t>Processamento de dados.</a:t>
+            </a:r>
+          </a:p>
+          <a:p>
+            <a:pPr marL="228600" indent="-228600">
+              <a:lnSpc>
+                <a:spcPct val="90000"/>
+              </a:lnSpc>
+              <a:spcBef>
+                <a:spcPts val="1000"/>
+              </a:spcBef>
+              <a:buFont typeface="Arial" panose="020B0604020202020204" pitchFamily="34" charset="0"/>
+              <a:buChar char="•"/>
+            </a:pPr>
+            <a:endParaRPr lang="pt-BR" sz="1600" dirty="0">
+              <a:solidFill>
+                <a:schemeClr val="bg2">
+                  <a:lumMod val="10000"/>
+                </a:schemeClr>
+              </a:solidFill>
+              <a:ea typeface="Calibri" panose="020F0502020204030204" pitchFamily="34" charset="0"/>
+              <a:cs typeface="Arial" panose="020B0604020202020204" pitchFamily="34" charset="0"/>
+            </a:endParaRPr>
+          </a:p>
+        </p:txBody>
+      </p:sp>
+      <p:sp>
+        <p:nvSpPr>
+          <p:cNvPr id="27" name="Espaço Reservado para Conteúdo 2">
+            <a:extLst>
+              <a:ext uri="{FF2B5EF4-FFF2-40B4-BE49-F238E27FC236}">
+                <a16:creationId xmlns:a16="http://schemas.microsoft.com/office/drawing/2014/main" id="{9DE381F3-DF21-E88C-6E9D-29A81845FC7C}"/>
+              </a:ext>
+            </a:extLst>
+          </p:cNvPr>
+          <p:cNvSpPr txBox="1">
+            <a:spLocks/>
+          </p:cNvSpPr>
+          <p:nvPr/>
+        </p:nvSpPr>
+        <p:spPr>
+          <a:xfrm>
+            <a:off x="5962260" y="2310124"/>
+            <a:ext cx="5603622" cy="719897"/>
+          </a:xfrm>
+          <a:prstGeom prst="rect">
+            <a:avLst/>
+          </a:prstGeom>
+        </p:spPr>
+        <p:txBody>
+          <a:bodyPr vert="horz" lIns="91440" tIns="45720" rIns="91440" bIns="45720" rtlCol="0">
+            <a:noAutofit/>
+          </a:bodyPr>
+          <a:lstStyle>
+            <a:defPPr>
+              <a:defRPr lang="pt-BR"/>
+            </a:defPPr>
+            <a:lvl1pPr indent="0">
+              <a:lnSpc>
+                <a:spcPct val="90000"/>
+              </a:lnSpc>
+              <a:spcBef>
+                <a:spcPts val="1000"/>
+              </a:spcBef>
+              <a:buFont typeface="Arial" panose="020B0604020202020204" pitchFamily="34" charset="0"/>
+              <a:buNone/>
+              <a:defRPr sz="1600">
+                <a:solidFill>
+                  <a:schemeClr val="bg2">
+                    <a:lumMod val="25000"/>
+                  </a:schemeClr>
+                </a:solidFill>
+                <a:cs typeface="Arial" panose="020B0604020202020204" pitchFamily="34" charset="0"/>
+              </a:defRPr>
+            </a:lvl1pPr>
+            <a:lvl2pPr marL="685800" indent="-228600">
+              <a:lnSpc>
+                <a:spcPct val="90000"/>
+              </a:lnSpc>
+              <a:spcBef>
+                <a:spcPts val="500"/>
+              </a:spcBef>
+              <a:buFont typeface="Arial" panose="020B0604020202020204" pitchFamily="34" charset="0"/>
+              <a:buChar char="•"/>
+              <a:defRPr sz="2400"/>
+            </a:lvl2pPr>
+            <a:lvl3pPr marL="1143000" indent="-228600">
+              <a:lnSpc>
+                <a:spcPct val="90000"/>
+              </a:lnSpc>
+              <a:spcBef>
+                <a:spcPts val="500"/>
+              </a:spcBef>
+              <a:buFont typeface="Arial" panose="020B0604020202020204" pitchFamily="34" charset="0"/>
+              <a:buChar char="•"/>
+              <a:defRPr sz="2000"/>
+            </a:lvl3pPr>
+            <a:lvl4pPr marL="1600200" indent="-228600">
+              <a:lnSpc>
+                <a:spcPct val="90000"/>
+              </a:lnSpc>
+              <a:spcBef>
+                <a:spcPts val="500"/>
+              </a:spcBef>
+              <a:buFont typeface="Arial" panose="020B0604020202020204" pitchFamily="34" charset="0"/>
+              <a:buChar char="•"/>
+            </a:lvl4pPr>
+            <a:lvl5pPr marL="2057400" indent="-228600">
+              <a:lnSpc>
+                <a:spcPct val="90000"/>
+              </a:lnSpc>
+              <a:spcBef>
+                <a:spcPts val="500"/>
+              </a:spcBef>
+              <a:buFont typeface="Arial" panose="020B0604020202020204" pitchFamily="34" charset="0"/>
+              <a:buChar char="•"/>
+            </a:lvl5pPr>
+            <a:lvl6pPr marL="2514600" indent="-228600">
+              <a:lnSpc>
+                <a:spcPct val="90000"/>
+              </a:lnSpc>
+              <a:spcBef>
+                <a:spcPts val="500"/>
+              </a:spcBef>
+              <a:buFont typeface="Arial" panose="020B0604020202020204" pitchFamily="34" charset="0"/>
+              <a:buChar char="•"/>
+            </a:lvl6pPr>
+            <a:lvl7pPr marL="2971800" indent="-228600">
+              <a:lnSpc>
+                <a:spcPct val="90000"/>
+              </a:lnSpc>
+              <a:spcBef>
+                <a:spcPts val="500"/>
+              </a:spcBef>
+              <a:buFont typeface="Arial" panose="020B0604020202020204" pitchFamily="34" charset="0"/>
+              <a:buChar char="•"/>
+            </a:lvl7pPr>
+            <a:lvl8pPr marL="3429000" indent="-228600">
+              <a:lnSpc>
+                <a:spcPct val="90000"/>
+              </a:lnSpc>
+              <a:spcBef>
+                <a:spcPts val="500"/>
+              </a:spcBef>
+              <a:buFont typeface="Arial" panose="020B0604020202020204" pitchFamily="34" charset="0"/>
+              <a:buChar char="•"/>
+            </a:lvl8pPr>
+            <a:lvl9pPr marL="3886200" indent="-228600">
+              <a:lnSpc>
+                <a:spcPct val="90000"/>
+              </a:lnSpc>
+              <a:spcBef>
+                <a:spcPts val="500"/>
+              </a:spcBef>
+              <a:buFont typeface="Arial" panose="020B0604020202020204" pitchFamily="34" charset="0"/>
+              <a:buChar char="•"/>
+            </a:lvl9pPr>
+          </a:lstStyle>
+          <a:p>
+            <a:r>
               <a:rPr lang="pt-BR" dirty="0"/>
+              <a:t>“Print” de uma parte do livro Harry Potter e a Pedra Filosofal com a aplicação do pré-processamento </a:t>
+            </a:r>
+            <a:br>
+              <a:rPr lang="pt-BR" dirty="0"/>
+            </a:br>
+            <a:r>
+              <a:rPr lang="pt-BR" b="1" dirty="0"/>
+              <a:t>Fonte: Resultados originais da pesquisa </a:t>
+            </a:r>
+          </a:p>
+        </p:txBody>
+      </p:sp>
+      <p:pic>
+        <p:nvPicPr>
+          <p:cNvPr id="3" name="Imagem 2" descr="Uma imagem contendo Interface gráfica do usuário&#10;&#10;Descrição gerada automaticamente">
+            <a:extLst>
+              <a:ext uri="{FF2B5EF4-FFF2-40B4-BE49-F238E27FC236}">
+                <a16:creationId xmlns:a16="http://schemas.microsoft.com/office/drawing/2014/main" id="{B041E96C-974C-7FEE-F428-301C2EAE9368}"/>
+              </a:ext>
+            </a:extLst>
+          </p:cNvPr>
+          <p:cNvPicPr>
+            <a:picLocks noChangeAspect="1"/>
+          </p:cNvPicPr>
+          <p:nvPr/>
+        </p:nvPicPr>
+        <p:blipFill>
+          <a:blip r:embed="rId2">
+            <a:extLst>
+              <a:ext uri="{28A0092B-C50C-407E-A947-70E740481C1C}">
+                <a14:useLocalDpi xmlns:a14="http://schemas.microsoft.com/office/drawing/2010/main" val="0"/>
+              </a:ext>
+            </a:extLst>
+          </a:blip>
+          <a:stretch>
+            <a:fillRect/>
+          </a:stretch>
+        </p:blipFill>
+        <p:spPr>
+          <a:xfrm>
+            <a:off x="5962260" y="1369611"/>
+            <a:ext cx="5981700" cy="876300"/>
+          </a:xfrm>
+          <a:prstGeom prst="rect">
+            <a:avLst/>
+          </a:prstGeom>
+        </p:spPr>
+      </p:pic>
+      <p:pic>
+        <p:nvPicPr>
+          <p:cNvPr id="9" name="Imagem 8" descr="Tabela&#10;&#10;Descrição gerada automaticamente com confiança média">
+            <a:extLst>
+              <a:ext uri="{FF2B5EF4-FFF2-40B4-BE49-F238E27FC236}">
+                <a16:creationId xmlns:a16="http://schemas.microsoft.com/office/drawing/2014/main" id="{A970A6BB-725C-686A-7631-F7751D5F7FA4}"/>
+              </a:ext>
+            </a:extLst>
+          </p:cNvPr>
+          <p:cNvPicPr>
+            <a:picLocks noChangeAspect="1"/>
+          </p:cNvPicPr>
+          <p:nvPr/>
+        </p:nvPicPr>
+        <p:blipFill>
+          <a:blip r:embed="rId3">
+            <a:extLst>
+              <a:ext uri="{28A0092B-C50C-407E-A947-70E740481C1C}">
+                <a14:useLocalDpi xmlns:a14="http://schemas.microsoft.com/office/drawing/2010/main" val="0"/>
+              </a:ext>
+            </a:extLst>
+          </a:blip>
+          <a:stretch>
+            <a:fillRect/>
+          </a:stretch>
+        </p:blipFill>
+        <p:spPr>
+          <a:xfrm>
+            <a:off x="5962260" y="3429000"/>
+            <a:ext cx="5981700" cy="1447800"/>
+          </a:xfrm>
+          <a:prstGeom prst="rect">
+            <a:avLst/>
+          </a:prstGeom>
+        </p:spPr>
+      </p:pic>
+      <p:sp>
+        <p:nvSpPr>
+          <p:cNvPr id="10" name="Espaço Reservado para Conteúdo 2">
+            <a:extLst>
+              <a:ext uri="{FF2B5EF4-FFF2-40B4-BE49-F238E27FC236}">
+                <a16:creationId xmlns:a16="http://schemas.microsoft.com/office/drawing/2014/main" id="{25BCA366-A7A8-28F9-F6C3-27406198351F}"/>
+              </a:ext>
+            </a:extLst>
+          </p:cNvPr>
+          <p:cNvSpPr txBox="1">
+            <a:spLocks/>
+          </p:cNvSpPr>
+          <p:nvPr/>
+        </p:nvSpPr>
+        <p:spPr>
+          <a:xfrm>
+            <a:off x="6096000" y="4915575"/>
+            <a:ext cx="5603622" cy="719897"/>
+          </a:xfrm>
+          <a:prstGeom prst="rect">
+            <a:avLst/>
+          </a:prstGeom>
+        </p:spPr>
+        <p:txBody>
+          <a:bodyPr vert="horz" lIns="91440" tIns="45720" rIns="91440" bIns="45720" rtlCol="0">
+            <a:noAutofit/>
+          </a:bodyPr>
+          <a:lstStyle>
+            <a:defPPr>
+              <a:defRPr lang="pt-BR"/>
+            </a:defPPr>
+            <a:lvl1pPr indent="0">
+              <a:lnSpc>
+                <a:spcPct val="90000"/>
+              </a:lnSpc>
+              <a:spcBef>
+                <a:spcPts val="1000"/>
+              </a:spcBef>
+              <a:buFont typeface="Arial" panose="020B0604020202020204" pitchFamily="34" charset="0"/>
+              <a:buNone/>
+              <a:defRPr sz="1600">
+                <a:solidFill>
+                  <a:schemeClr val="bg2">
+                    <a:lumMod val="25000"/>
+                  </a:schemeClr>
+                </a:solidFill>
+                <a:cs typeface="Arial" panose="020B0604020202020204" pitchFamily="34" charset="0"/>
+              </a:defRPr>
+            </a:lvl1pPr>
+            <a:lvl2pPr marL="685800" indent="-228600">
+              <a:lnSpc>
+                <a:spcPct val="90000"/>
+              </a:lnSpc>
+              <a:spcBef>
+                <a:spcPts val="500"/>
+              </a:spcBef>
+              <a:buFont typeface="Arial" panose="020B0604020202020204" pitchFamily="34" charset="0"/>
+              <a:buChar char="•"/>
+              <a:defRPr sz="2400"/>
+            </a:lvl2pPr>
+            <a:lvl3pPr marL="1143000" indent="-228600">
+              <a:lnSpc>
+                <a:spcPct val="90000"/>
+              </a:lnSpc>
+              <a:spcBef>
+                <a:spcPts val="500"/>
+              </a:spcBef>
+              <a:buFont typeface="Arial" panose="020B0604020202020204" pitchFamily="34" charset="0"/>
+              <a:buChar char="•"/>
+              <a:defRPr sz="2000"/>
+            </a:lvl3pPr>
+            <a:lvl4pPr marL="1600200" indent="-228600">
+              <a:lnSpc>
+                <a:spcPct val="90000"/>
+              </a:lnSpc>
+              <a:spcBef>
+                <a:spcPts val="500"/>
+              </a:spcBef>
+              <a:buFont typeface="Arial" panose="020B0604020202020204" pitchFamily="34" charset="0"/>
+              <a:buChar char="•"/>
+            </a:lvl4pPr>
+            <a:lvl5pPr marL="2057400" indent="-228600">
+              <a:lnSpc>
+                <a:spcPct val="90000"/>
+              </a:lnSpc>
+              <a:spcBef>
+                <a:spcPts val="500"/>
+              </a:spcBef>
+              <a:buFont typeface="Arial" panose="020B0604020202020204" pitchFamily="34" charset="0"/>
+              <a:buChar char="•"/>
+            </a:lvl5pPr>
+            <a:lvl6pPr marL="2514600" indent="-228600">
+              <a:lnSpc>
+                <a:spcPct val="90000"/>
+              </a:lnSpc>
+              <a:spcBef>
+                <a:spcPts val="500"/>
+              </a:spcBef>
+              <a:buFont typeface="Arial" panose="020B0604020202020204" pitchFamily="34" charset="0"/>
+              <a:buChar char="•"/>
+            </a:lvl6pPr>
+            <a:lvl7pPr marL="2971800" indent="-228600">
+              <a:lnSpc>
+                <a:spcPct val="90000"/>
+              </a:lnSpc>
+              <a:spcBef>
+                <a:spcPts val="500"/>
+              </a:spcBef>
+              <a:buFont typeface="Arial" panose="020B0604020202020204" pitchFamily="34" charset="0"/>
+              <a:buChar char="•"/>
+            </a:lvl7pPr>
+            <a:lvl8pPr marL="3429000" indent="-228600">
+              <a:lnSpc>
+                <a:spcPct val="90000"/>
+              </a:lnSpc>
+              <a:spcBef>
+                <a:spcPts val="500"/>
+              </a:spcBef>
+              <a:buFont typeface="Arial" panose="020B0604020202020204" pitchFamily="34" charset="0"/>
+              <a:buChar char="•"/>
+            </a:lvl8pPr>
+            <a:lvl9pPr marL="3886200" indent="-228600">
+              <a:lnSpc>
+                <a:spcPct val="90000"/>
+              </a:lnSpc>
+              <a:spcBef>
+                <a:spcPts val="500"/>
+              </a:spcBef>
+              <a:buFont typeface="Arial" panose="020B0604020202020204" pitchFamily="34" charset="0"/>
+              <a:buChar char="•"/>
+            </a:lvl9pPr>
+          </a:lstStyle>
+          <a:p>
+            <a:r>
+              <a:rPr lang="pt-BR" dirty="0"/>
+              <a:t>Output gerado após o processamento textual do livro Harry Potter e a Pedra Filosofal, limitado a cinco palavras que mais se repete, onde é possível representar a diferença das informações não tratadas e a aplicação do pré-processamento. </a:t>
+            </a:r>
+            <a:br>
+              <a:rPr lang="pt-BR" dirty="0"/>
+            </a:br>
+            <a:r>
+              <a:rPr lang="pt-BR" b="1" dirty="0"/>
               <a:t>Fonte: Resultados originais da pesquisa </a:t>
             </a:r>
           </a:p>
@@ -7984,6 +8905,801 @@
     <p:extLst>
       <p:ext uri="{BB962C8B-B14F-4D97-AF65-F5344CB8AC3E}">
         <p14:creationId xmlns:p14="http://schemas.microsoft.com/office/powerpoint/2010/main" val="3703064575"/>
+      </p:ext>
+    </p:extLst>
+  </p:cSld>
+  <p:clrMapOvr>
+    <a:masterClrMapping/>
+  </p:clrMapOvr>
+</p:sld>
+</file>
+
+<file path=ppt/slides/slide9.xml><?xml version="1.0" encoding="utf-8"?>
+<p:sld xmlns:a="http://schemas.openxmlformats.org/drawingml/2006/main" xmlns:r="http://schemas.openxmlformats.org/officeDocument/2006/relationships" xmlns:p="http://schemas.openxmlformats.org/presentationml/2006/main">
+  <p:cSld>
+    <p:spTree>
+      <p:nvGrpSpPr>
+        <p:cNvPr id="1" name=""/>
+        <p:cNvGrpSpPr/>
+        <p:nvPr/>
+      </p:nvGrpSpPr>
+      <p:grpSpPr>
+        <a:xfrm>
+          <a:off x="0" y="0"/>
+          <a:ext cx="0" cy="0"/>
+          <a:chOff x="0" y="0"/>
+          <a:chExt cx="0" cy="0"/>
+        </a:xfrm>
+      </p:grpSpPr>
+      <p:sp>
+        <p:nvSpPr>
+          <p:cNvPr id="7" name="Rectangle 6">
+            <a:extLst>
+              <a:ext uri="{FF2B5EF4-FFF2-40B4-BE49-F238E27FC236}">
+                <a16:creationId xmlns:a16="http://schemas.microsoft.com/office/drawing/2014/main" id="{04FABB05-6C2E-CEFC-8C95-F5EA054DAF7D}"/>
+              </a:ext>
+            </a:extLst>
+          </p:cNvPr>
+          <p:cNvSpPr/>
+          <p:nvPr/>
+        </p:nvSpPr>
+        <p:spPr>
+          <a:xfrm>
+            <a:off x="-1" y="0"/>
+            <a:ext cx="12192002" cy="6858000"/>
+          </a:xfrm>
+          <a:prstGeom prst="rect">
+            <a:avLst/>
+          </a:prstGeom>
+          <a:solidFill>
+            <a:schemeClr val="tx2">
+              <a:lumMod val="60000"/>
+              <a:lumOff val="40000"/>
+              <a:alpha val="70000"/>
+            </a:schemeClr>
+          </a:solidFill>
+          <a:ln w="12700">
+            <a:noFill/>
+          </a:ln>
+        </p:spPr>
+        <p:style>
+          <a:lnRef idx="0">
+            <a:scrgbClr r="0" g="0" b="0"/>
+          </a:lnRef>
+          <a:fillRef idx="0">
+            <a:scrgbClr r="0" g="0" b="0"/>
+          </a:fillRef>
+          <a:effectRef idx="0">
+            <a:scrgbClr r="0" g="0" b="0"/>
+          </a:effectRef>
+          <a:fontRef idx="minor">
+            <a:schemeClr val="lt1"/>
+          </a:fontRef>
+        </p:style>
+        <p:txBody>
+          <a:bodyPr rtlCol="0" anchor="ctr"/>
+          <a:lstStyle/>
+          <a:p>
+            <a:pPr>
+              <a:lnSpc>
+                <a:spcPct val="90000"/>
+              </a:lnSpc>
+              <a:spcBef>
+                <a:spcPts val="1000"/>
+              </a:spcBef>
+            </a:pPr>
+            <a:endParaRPr lang="pt-BR" sz="1600" dirty="0">
+              <a:solidFill>
+                <a:schemeClr val="bg2">
+                  <a:lumMod val="10000"/>
+                </a:schemeClr>
+              </a:solidFill>
+              <a:ea typeface="Calibri" panose="020F0502020204030204" pitchFamily="34" charset="0"/>
+              <a:cs typeface="Arial" panose="020B0604020202020204" pitchFamily="34" charset="0"/>
+            </a:endParaRPr>
+          </a:p>
+        </p:txBody>
+      </p:sp>
+      <p:sp>
+        <p:nvSpPr>
+          <p:cNvPr id="4" name="Arrow: Pentagon 3">
+            <a:extLst>
+              <a:ext uri="{FF2B5EF4-FFF2-40B4-BE49-F238E27FC236}">
+                <a16:creationId xmlns:a16="http://schemas.microsoft.com/office/drawing/2014/main" id="{0E1C5205-F74D-8360-EDEE-B204D8633772}"/>
+              </a:ext>
+            </a:extLst>
+          </p:cNvPr>
+          <p:cNvSpPr/>
+          <p:nvPr/>
+        </p:nvSpPr>
+        <p:spPr>
+          <a:xfrm>
+            <a:off x="-1" y="383391"/>
+            <a:ext cx="5962261" cy="905773"/>
+          </a:xfrm>
+          <a:prstGeom prst="homePlate">
+            <a:avLst/>
+          </a:prstGeom>
+          <a:solidFill>
+            <a:schemeClr val="bg2">
+              <a:lumMod val="25000"/>
+              <a:alpha val="85000"/>
+            </a:schemeClr>
+          </a:solidFill>
+        </p:spPr>
+        <p:style>
+          <a:lnRef idx="1">
+            <a:schemeClr val="accent3"/>
+          </a:lnRef>
+          <a:fillRef idx="3">
+            <a:schemeClr val="accent3"/>
+          </a:fillRef>
+          <a:effectRef idx="2">
+            <a:schemeClr val="accent3"/>
+          </a:effectRef>
+          <a:fontRef idx="minor">
+            <a:schemeClr val="lt1"/>
+          </a:fontRef>
+        </p:style>
+        <p:txBody>
+          <a:bodyPr rtlCol="0" anchor="ctr"/>
+          <a:lstStyle/>
+          <a:p>
+            <a:pPr algn="ctr"/>
+            <a:r>
+              <a:rPr lang="pt-BR" sz="3700" dirty="0">
+                <a:solidFill>
+                  <a:schemeClr val="bg1"/>
+                </a:solidFill>
+              </a:rPr>
+              <a:t>RESULTADOS E DISCUSSÕES</a:t>
+            </a:r>
+          </a:p>
+        </p:txBody>
+      </p:sp>
+      <p:sp>
+        <p:nvSpPr>
+          <p:cNvPr id="6" name="Arrow: Pentagon 5">
+            <a:extLst>
+              <a:ext uri="{FF2B5EF4-FFF2-40B4-BE49-F238E27FC236}">
+                <a16:creationId xmlns:a16="http://schemas.microsoft.com/office/drawing/2014/main" id="{6495FEFB-EF83-9F99-FA59-304B76DA4498}"/>
+              </a:ext>
+            </a:extLst>
+          </p:cNvPr>
+          <p:cNvSpPr/>
+          <p:nvPr/>
+        </p:nvSpPr>
+        <p:spPr>
+          <a:xfrm>
+            <a:off x="-1" y="1170272"/>
+            <a:ext cx="4450704" cy="453255"/>
+          </a:xfrm>
+          <a:prstGeom prst="homePlate">
+            <a:avLst/>
+          </a:prstGeom>
+          <a:solidFill>
+            <a:schemeClr val="bg2">
+              <a:lumMod val="75000"/>
+              <a:alpha val="90000"/>
+            </a:schemeClr>
+          </a:solidFill>
+        </p:spPr>
+        <p:style>
+          <a:lnRef idx="1">
+            <a:schemeClr val="accent3"/>
+          </a:lnRef>
+          <a:fillRef idx="3">
+            <a:schemeClr val="accent3"/>
+          </a:fillRef>
+          <a:effectRef idx="2">
+            <a:schemeClr val="accent3"/>
+          </a:effectRef>
+          <a:fontRef idx="minor">
+            <a:schemeClr val="lt1"/>
+          </a:fontRef>
+        </p:style>
+        <p:txBody>
+          <a:bodyPr rtlCol="0" anchor="ctr"/>
+          <a:lstStyle/>
+          <a:p>
+            <a:pPr algn="ctr"/>
+            <a:r>
+              <a:rPr lang="pt-BR" sz="2800" dirty="0">
+                <a:solidFill>
+                  <a:schemeClr val="bg2">
+                    <a:lumMod val="25000"/>
+                  </a:schemeClr>
+                </a:solidFill>
+              </a:rPr>
+              <a:t>VISUALIZAÇÃO DE DADOS</a:t>
+            </a:r>
+          </a:p>
+        </p:txBody>
+      </p:sp>
+      <p:pic>
+        <p:nvPicPr>
+          <p:cNvPr id="9" name="Imagem 8" descr="Gráfico, Gráfico de barras&#10;&#10;Descrição gerada automaticamente">
+            <a:extLst>
+              <a:ext uri="{FF2B5EF4-FFF2-40B4-BE49-F238E27FC236}">
+                <a16:creationId xmlns:a16="http://schemas.microsoft.com/office/drawing/2014/main" id="{0444EBEB-4912-C295-A549-4F7E3FAA591D}"/>
+              </a:ext>
+            </a:extLst>
+          </p:cNvPr>
+          <p:cNvPicPr>
+            <a:picLocks noChangeAspect="1"/>
+          </p:cNvPicPr>
+          <p:nvPr/>
+        </p:nvPicPr>
+        <p:blipFill>
+          <a:blip r:embed="rId2">
+            <a:extLst>
+              <a:ext uri="{28A0092B-C50C-407E-A947-70E740481C1C}">
+                <a14:useLocalDpi xmlns:a14="http://schemas.microsoft.com/office/drawing/2010/main" val="0"/>
+              </a:ext>
+            </a:extLst>
+          </a:blip>
+          <a:stretch>
+            <a:fillRect/>
+          </a:stretch>
+        </p:blipFill>
+        <p:spPr>
+          <a:xfrm>
+            <a:off x="197052" y="2685721"/>
+            <a:ext cx="5671986" cy="3110083"/>
+          </a:xfrm>
+          <a:prstGeom prst="rect">
+            <a:avLst/>
+          </a:prstGeom>
+        </p:spPr>
+      </p:pic>
+      <p:pic>
+        <p:nvPicPr>
+          <p:cNvPr id="11" name="Imagem 10" descr="Gráfico, Gráfico de barras&#10;&#10;Descrição gerada automaticamente">
+            <a:extLst>
+              <a:ext uri="{FF2B5EF4-FFF2-40B4-BE49-F238E27FC236}">
+                <a16:creationId xmlns:a16="http://schemas.microsoft.com/office/drawing/2014/main" id="{ED3C1984-94CC-9985-27F9-04D6B2BEE1DC}"/>
+              </a:ext>
+            </a:extLst>
+          </p:cNvPr>
+          <p:cNvPicPr>
+            <a:picLocks noChangeAspect="1"/>
+          </p:cNvPicPr>
+          <p:nvPr/>
+        </p:nvPicPr>
+        <p:blipFill>
+          <a:blip r:embed="rId3">
+            <a:extLst>
+              <a:ext uri="{28A0092B-C50C-407E-A947-70E740481C1C}">
+                <a14:useLocalDpi xmlns:a14="http://schemas.microsoft.com/office/drawing/2010/main" val="0"/>
+              </a:ext>
+            </a:extLst>
+          </a:blip>
+          <a:stretch>
+            <a:fillRect/>
+          </a:stretch>
+        </p:blipFill>
+        <p:spPr>
+          <a:xfrm>
+            <a:off x="6334150" y="2685721"/>
+            <a:ext cx="5660798" cy="3110083"/>
+          </a:xfrm>
+          <a:prstGeom prst="rect">
+            <a:avLst/>
+          </a:prstGeom>
+        </p:spPr>
+      </p:pic>
+      <p:sp>
+        <p:nvSpPr>
+          <p:cNvPr id="12" name="Espaço Reservado para Conteúdo 2">
+            <a:extLst>
+              <a:ext uri="{FF2B5EF4-FFF2-40B4-BE49-F238E27FC236}">
+                <a16:creationId xmlns:a16="http://schemas.microsoft.com/office/drawing/2014/main" id="{607A63FA-6DE4-6B2E-65B7-120513DDBAA2}"/>
+              </a:ext>
+            </a:extLst>
+          </p:cNvPr>
+          <p:cNvSpPr txBox="1">
+            <a:spLocks/>
+          </p:cNvSpPr>
+          <p:nvPr/>
+        </p:nvSpPr>
+        <p:spPr>
+          <a:xfrm>
+            <a:off x="197052" y="2374858"/>
+            <a:ext cx="5660799" cy="310863"/>
+          </a:xfrm>
+          <a:prstGeom prst="rect">
+            <a:avLst/>
+          </a:prstGeom>
+        </p:spPr>
+        <p:txBody>
+          <a:bodyPr vert="horz" lIns="91440" tIns="45720" rIns="91440" bIns="45720" rtlCol="0">
+            <a:normAutofit lnSpcReduction="10000"/>
+          </a:bodyPr>
+          <a:lstStyle>
+            <a:lvl1pPr marL="228600" indent="-228600" algn="l" defTabSz="914400" rtl="0" eaLnBrk="1" latinLnBrk="0" hangingPunct="1">
+              <a:lnSpc>
+                <a:spcPct val="90000"/>
+              </a:lnSpc>
+              <a:spcBef>
+                <a:spcPts val="1000"/>
+              </a:spcBef>
+              <a:buFont typeface="Arial" panose="020B0604020202020204" pitchFamily="34" charset="0"/>
+              <a:buChar char="•"/>
+              <a:defRPr sz="2800" kern="1200">
+                <a:solidFill>
+                  <a:schemeClr val="tx1"/>
+                </a:solidFill>
+                <a:latin typeface="+mn-lt"/>
+                <a:ea typeface="+mn-ea"/>
+                <a:cs typeface="+mn-cs"/>
+              </a:defRPr>
+            </a:lvl1pPr>
+            <a:lvl2pPr marL="685800" indent="-228600" algn="l" defTabSz="914400" rtl="0" eaLnBrk="1" latinLnBrk="0" hangingPunct="1">
+              <a:lnSpc>
+                <a:spcPct val="90000"/>
+              </a:lnSpc>
+              <a:spcBef>
+                <a:spcPts val="500"/>
+              </a:spcBef>
+              <a:buFont typeface="Arial" panose="020B0604020202020204" pitchFamily="34" charset="0"/>
+              <a:buChar char="•"/>
+              <a:defRPr sz="2400" kern="1200">
+                <a:solidFill>
+                  <a:schemeClr val="tx1"/>
+                </a:solidFill>
+                <a:latin typeface="+mn-lt"/>
+                <a:ea typeface="+mn-ea"/>
+                <a:cs typeface="+mn-cs"/>
+              </a:defRPr>
+            </a:lvl2pPr>
+            <a:lvl3pPr marL="1143000" indent="-228600" algn="l" defTabSz="914400" rtl="0" eaLnBrk="1" latinLnBrk="0" hangingPunct="1">
+              <a:lnSpc>
+                <a:spcPct val="90000"/>
+              </a:lnSpc>
+              <a:spcBef>
+                <a:spcPts val="500"/>
+              </a:spcBef>
+              <a:buFont typeface="Arial" panose="020B0604020202020204" pitchFamily="34" charset="0"/>
+              <a:buChar char="•"/>
+              <a:defRPr sz="2000" kern="1200">
+                <a:solidFill>
+                  <a:schemeClr val="tx1"/>
+                </a:solidFill>
+                <a:latin typeface="+mn-lt"/>
+                <a:ea typeface="+mn-ea"/>
+                <a:cs typeface="+mn-cs"/>
+              </a:defRPr>
+            </a:lvl3pPr>
+            <a:lvl4pPr marL="1600200" indent="-228600" algn="l" defTabSz="914400" rtl="0" eaLnBrk="1" latinLnBrk="0" hangingPunct="1">
+              <a:lnSpc>
+                <a:spcPct val="90000"/>
+              </a:lnSpc>
+              <a:spcBef>
+                <a:spcPts val="500"/>
+              </a:spcBef>
+              <a:buFont typeface="Arial" panose="020B0604020202020204" pitchFamily="34" charset="0"/>
+              <a:buChar char="•"/>
+              <a:defRPr sz="1800" kern="1200">
+                <a:solidFill>
+                  <a:schemeClr val="tx1"/>
+                </a:solidFill>
+                <a:latin typeface="+mn-lt"/>
+                <a:ea typeface="+mn-ea"/>
+                <a:cs typeface="+mn-cs"/>
+              </a:defRPr>
+            </a:lvl4pPr>
+            <a:lvl5pPr marL="2057400" indent="-228600" algn="l" defTabSz="914400" rtl="0" eaLnBrk="1" latinLnBrk="0" hangingPunct="1">
+              <a:lnSpc>
+                <a:spcPct val="90000"/>
+              </a:lnSpc>
+              <a:spcBef>
+                <a:spcPts val="500"/>
+              </a:spcBef>
+              <a:buFont typeface="Arial" panose="020B0604020202020204" pitchFamily="34" charset="0"/>
+              <a:buChar char="•"/>
+              <a:defRPr sz="1800" kern="1200">
+                <a:solidFill>
+                  <a:schemeClr val="tx1"/>
+                </a:solidFill>
+                <a:latin typeface="+mn-lt"/>
+                <a:ea typeface="+mn-ea"/>
+                <a:cs typeface="+mn-cs"/>
+              </a:defRPr>
+            </a:lvl5pPr>
+            <a:lvl6pPr marL="2514600" indent="-228600" algn="l" defTabSz="914400" rtl="0" eaLnBrk="1" latinLnBrk="0" hangingPunct="1">
+              <a:lnSpc>
+                <a:spcPct val="90000"/>
+              </a:lnSpc>
+              <a:spcBef>
+                <a:spcPts val="500"/>
+              </a:spcBef>
+              <a:buFont typeface="Arial" panose="020B0604020202020204" pitchFamily="34" charset="0"/>
+              <a:buChar char="•"/>
+              <a:defRPr sz="1800" kern="1200">
+                <a:solidFill>
+                  <a:schemeClr val="tx1"/>
+                </a:solidFill>
+                <a:latin typeface="+mn-lt"/>
+                <a:ea typeface="+mn-ea"/>
+                <a:cs typeface="+mn-cs"/>
+              </a:defRPr>
+            </a:lvl6pPr>
+            <a:lvl7pPr marL="2971800" indent="-228600" algn="l" defTabSz="914400" rtl="0" eaLnBrk="1" latinLnBrk="0" hangingPunct="1">
+              <a:lnSpc>
+                <a:spcPct val="90000"/>
+              </a:lnSpc>
+              <a:spcBef>
+                <a:spcPts val="500"/>
+              </a:spcBef>
+              <a:buFont typeface="Arial" panose="020B0604020202020204" pitchFamily="34" charset="0"/>
+              <a:buChar char="•"/>
+              <a:defRPr sz="1800" kern="1200">
+                <a:solidFill>
+                  <a:schemeClr val="tx1"/>
+                </a:solidFill>
+                <a:latin typeface="+mn-lt"/>
+                <a:ea typeface="+mn-ea"/>
+                <a:cs typeface="+mn-cs"/>
+              </a:defRPr>
+            </a:lvl7pPr>
+            <a:lvl8pPr marL="3429000" indent="-228600" algn="l" defTabSz="914400" rtl="0" eaLnBrk="1" latinLnBrk="0" hangingPunct="1">
+              <a:lnSpc>
+                <a:spcPct val="90000"/>
+              </a:lnSpc>
+              <a:spcBef>
+                <a:spcPts val="500"/>
+              </a:spcBef>
+              <a:buFont typeface="Arial" panose="020B0604020202020204" pitchFamily="34" charset="0"/>
+              <a:buChar char="•"/>
+              <a:defRPr sz="1800" kern="1200">
+                <a:solidFill>
+                  <a:schemeClr val="tx1"/>
+                </a:solidFill>
+                <a:latin typeface="+mn-lt"/>
+                <a:ea typeface="+mn-ea"/>
+                <a:cs typeface="+mn-cs"/>
+              </a:defRPr>
+            </a:lvl8pPr>
+            <a:lvl9pPr marL="3886200" indent="-228600" algn="l" defTabSz="914400" rtl="0" eaLnBrk="1" latinLnBrk="0" hangingPunct="1">
+              <a:lnSpc>
+                <a:spcPct val="90000"/>
+              </a:lnSpc>
+              <a:spcBef>
+                <a:spcPts val="500"/>
+              </a:spcBef>
+              <a:buFont typeface="Arial" panose="020B0604020202020204" pitchFamily="34" charset="0"/>
+              <a:buChar char="•"/>
+              <a:defRPr sz="1800" kern="1200">
+                <a:solidFill>
+                  <a:schemeClr val="tx1"/>
+                </a:solidFill>
+                <a:latin typeface="+mn-lt"/>
+                <a:ea typeface="+mn-ea"/>
+                <a:cs typeface="+mn-cs"/>
+              </a:defRPr>
+            </a:lvl9pPr>
+          </a:lstStyle>
+          <a:p>
+            <a:pPr marL="0" indent="0" algn="ctr">
+              <a:buNone/>
+            </a:pPr>
+            <a:r>
+              <a:rPr lang="pt-BR" sz="1600" b="1" dirty="0">
+                <a:solidFill>
+                  <a:schemeClr val="bg2">
+                    <a:lumMod val="25000"/>
+                  </a:schemeClr>
+                </a:solidFill>
+                <a:cs typeface="Arial" panose="020B0604020202020204" pitchFamily="34" charset="0"/>
+              </a:rPr>
+              <a:t>COM A APLICAÇÃO DE PRÉ-PROCESSAMENTO</a:t>
+            </a:r>
+          </a:p>
+        </p:txBody>
+      </p:sp>
+      <p:sp>
+        <p:nvSpPr>
+          <p:cNvPr id="13" name="Espaço Reservado para Conteúdo 2">
+            <a:extLst>
+              <a:ext uri="{FF2B5EF4-FFF2-40B4-BE49-F238E27FC236}">
+                <a16:creationId xmlns:a16="http://schemas.microsoft.com/office/drawing/2014/main" id="{344D3FBE-9B4D-FD81-4FD9-442F8C1867AA}"/>
+              </a:ext>
+            </a:extLst>
+          </p:cNvPr>
+          <p:cNvSpPr txBox="1">
+            <a:spLocks/>
+          </p:cNvSpPr>
+          <p:nvPr/>
+        </p:nvSpPr>
+        <p:spPr>
+          <a:xfrm>
+            <a:off x="6334150" y="2377704"/>
+            <a:ext cx="5660799" cy="310863"/>
+          </a:xfrm>
+          <a:prstGeom prst="rect">
+            <a:avLst/>
+          </a:prstGeom>
+        </p:spPr>
+        <p:txBody>
+          <a:bodyPr vert="horz" lIns="91440" tIns="45720" rIns="91440" bIns="45720" rtlCol="0">
+            <a:normAutofit lnSpcReduction="10000"/>
+          </a:bodyPr>
+          <a:lstStyle>
+            <a:lvl1pPr marL="228600" indent="-228600" algn="l" defTabSz="914400" rtl="0" eaLnBrk="1" latinLnBrk="0" hangingPunct="1">
+              <a:lnSpc>
+                <a:spcPct val="90000"/>
+              </a:lnSpc>
+              <a:spcBef>
+                <a:spcPts val="1000"/>
+              </a:spcBef>
+              <a:buFont typeface="Arial" panose="020B0604020202020204" pitchFamily="34" charset="0"/>
+              <a:buChar char="•"/>
+              <a:defRPr sz="2800" kern="1200">
+                <a:solidFill>
+                  <a:schemeClr val="tx1"/>
+                </a:solidFill>
+                <a:latin typeface="+mn-lt"/>
+                <a:ea typeface="+mn-ea"/>
+                <a:cs typeface="+mn-cs"/>
+              </a:defRPr>
+            </a:lvl1pPr>
+            <a:lvl2pPr marL="685800" indent="-228600" algn="l" defTabSz="914400" rtl="0" eaLnBrk="1" latinLnBrk="0" hangingPunct="1">
+              <a:lnSpc>
+                <a:spcPct val="90000"/>
+              </a:lnSpc>
+              <a:spcBef>
+                <a:spcPts val="500"/>
+              </a:spcBef>
+              <a:buFont typeface="Arial" panose="020B0604020202020204" pitchFamily="34" charset="0"/>
+              <a:buChar char="•"/>
+              <a:defRPr sz="2400" kern="1200">
+                <a:solidFill>
+                  <a:schemeClr val="tx1"/>
+                </a:solidFill>
+                <a:latin typeface="+mn-lt"/>
+                <a:ea typeface="+mn-ea"/>
+                <a:cs typeface="+mn-cs"/>
+              </a:defRPr>
+            </a:lvl2pPr>
+            <a:lvl3pPr marL="1143000" indent="-228600" algn="l" defTabSz="914400" rtl="0" eaLnBrk="1" latinLnBrk="0" hangingPunct="1">
+              <a:lnSpc>
+                <a:spcPct val="90000"/>
+              </a:lnSpc>
+              <a:spcBef>
+                <a:spcPts val="500"/>
+              </a:spcBef>
+              <a:buFont typeface="Arial" panose="020B0604020202020204" pitchFamily="34" charset="0"/>
+              <a:buChar char="•"/>
+              <a:defRPr sz="2000" kern="1200">
+                <a:solidFill>
+                  <a:schemeClr val="tx1"/>
+                </a:solidFill>
+                <a:latin typeface="+mn-lt"/>
+                <a:ea typeface="+mn-ea"/>
+                <a:cs typeface="+mn-cs"/>
+              </a:defRPr>
+            </a:lvl3pPr>
+            <a:lvl4pPr marL="1600200" indent="-228600" algn="l" defTabSz="914400" rtl="0" eaLnBrk="1" latinLnBrk="0" hangingPunct="1">
+              <a:lnSpc>
+                <a:spcPct val="90000"/>
+              </a:lnSpc>
+              <a:spcBef>
+                <a:spcPts val="500"/>
+              </a:spcBef>
+              <a:buFont typeface="Arial" panose="020B0604020202020204" pitchFamily="34" charset="0"/>
+              <a:buChar char="•"/>
+              <a:defRPr sz="1800" kern="1200">
+                <a:solidFill>
+                  <a:schemeClr val="tx1"/>
+                </a:solidFill>
+                <a:latin typeface="+mn-lt"/>
+                <a:ea typeface="+mn-ea"/>
+                <a:cs typeface="+mn-cs"/>
+              </a:defRPr>
+            </a:lvl4pPr>
+            <a:lvl5pPr marL="2057400" indent="-228600" algn="l" defTabSz="914400" rtl="0" eaLnBrk="1" latinLnBrk="0" hangingPunct="1">
+              <a:lnSpc>
+                <a:spcPct val="90000"/>
+              </a:lnSpc>
+              <a:spcBef>
+                <a:spcPts val="500"/>
+              </a:spcBef>
+              <a:buFont typeface="Arial" panose="020B0604020202020204" pitchFamily="34" charset="0"/>
+              <a:buChar char="•"/>
+              <a:defRPr sz="1800" kern="1200">
+                <a:solidFill>
+                  <a:schemeClr val="tx1"/>
+                </a:solidFill>
+                <a:latin typeface="+mn-lt"/>
+                <a:ea typeface="+mn-ea"/>
+                <a:cs typeface="+mn-cs"/>
+              </a:defRPr>
+            </a:lvl5pPr>
+            <a:lvl6pPr marL="2514600" indent="-228600" algn="l" defTabSz="914400" rtl="0" eaLnBrk="1" latinLnBrk="0" hangingPunct="1">
+              <a:lnSpc>
+                <a:spcPct val="90000"/>
+              </a:lnSpc>
+              <a:spcBef>
+                <a:spcPts val="500"/>
+              </a:spcBef>
+              <a:buFont typeface="Arial" panose="020B0604020202020204" pitchFamily="34" charset="0"/>
+              <a:buChar char="•"/>
+              <a:defRPr sz="1800" kern="1200">
+                <a:solidFill>
+                  <a:schemeClr val="tx1"/>
+                </a:solidFill>
+                <a:latin typeface="+mn-lt"/>
+                <a:ea typeface="+mn-ea"/>
+                <a:cs typeface="+mn-cs"/>
+              </a:defRPr>
+            </a:lvl6pPr>
+            <a:lvl7pPr marL="2971800" indent="-228600" algn="l" defTabSz="914400" rtl="0" eaLnBrk="1" latinLnBrk="0" hangingPunct="1">
+              <a:lnSpc>
+                <a:spcPct val="90000"/>
+              </a:lnSpc>
+              <a:spcBef>
+                <a:spcPts val="500"/>
+              </a:spcBef>
+              <a:buFont typeface="Arial" panose="020B0604020202020204" pitchFamily="34" charset="0"/>
+              <a:buChar char="•"/>
+              <a:defRPr sz="1800" kern="1200">
+                <a:solidFill>
+                  <a:schemeClr val="tx1"/>
+                </a:solidFill>
+                <a:latin typeface="+mn-lt"/>
+                <a:ea typeface="+mn-ea"/>
+                <a:cs typeface="+mn-cs"/>
+              </a:defRPr>
+            </a:lvl7pPr>
+            <a:lvl8pPr marL="3429000" indent="-228600" algn="l" defTabSz="914400" rtl="0" eaLnBrk="1" latinLnBrk="0" hangingPunct="1">
+              <a:lnSpc>
+                <a:spcPct val="90000"/>
+              </a:lnSpc>
+              <a:spcBef>
+                <a:spcPts val="500"/>
+              </a:spcBef>
+              <a:buFont typeface="Arial" panose="020B0604020202020204" pitchFamily="34" charset="0"/>
+              <a:buChar char="•"/>
+              <a:defRPr sz="1800" kern="1200">
+                <a:solidFill>
+                  <a:schemeClr val="tx1"/>
+                </a:solidFill>
+                <a:latin typeface="+mn-lt"/>
+                <a:ea typeface="+mn-ea"/>
+                <a:cs typeface="+mn-cs"/>
+              </a:defRPr>
+            </a:lvl8pPr>
+            <a:lvl9pPr marL="3886200" indent="-228600" algn="l" defTabSz="914400" rtl="0" eaLnBrk="1" latinLnBrk="0" hangingPunct="1">
+              <a:lnSpc>
+                <a:spcPct val="90000"/>
+              </a:lnSpc>
+              <a:spcBef>
+                <a:spcPts val="500"/>
+              </a:spcBef>
+              <a:buFont typeface="Arial" panose="020B0604020202020204" pitchFamily="34" charset="0"/>
+              <a:buChar char="•"/>
+              <a:defRPr sz="1800" kern="1200">
+                <a:solidFill>
+                  <a:schemeClr val="tx1"/>
+                </a:solidFill>
+                <a:latin typeface="+mn-lt"/>
+                <a:ea typeface="+mn-ea"/>
+                <a:cs typeface="+mn-cs"/>
+              </a:defRPr>
+            </a:lvl9pPr>
+          </a:lstStyle>
+          <a:p>
+            <a:pPr marL="0" indent="0" algn="ctr">
+              <a:buNone/>
+            </a:pPr>
+            <a:r>
+              <a:rPr lang="pt-BR" sz="1600" b="1" dirty="0">
+                <a:solidFill>
+                  <a:schemeClr val="bg2">
+                    <a:lumMod val="25000"/>
+                  </a:schemeClr>
+                </a:solidFill>
+                <a:cs typeface="Arial" panose="020B0604020202020204" pitchFamily="34" charset="0"/>
+              </a:rPr>
+              <a:t>SEM A APLICAÇÃO DE PRÉ-PROCESSAMENTO</a:t>
+            </a:r>
+          </a:p>
+        </p:txBody>
+      </p:sp>
+      <p:sp>
+        <p:nvSpPr>
+          <p:cNvPr id="14" name="Rectangle 8">
+            <a:extLst>
+              <a:ext uri="{FF2B5EF4-FFF2-40B4-BE49-F238E27FC236}">
+                <a16:creationId xmlns:a16="http://schemas.microsoft.com/office/drawing/2014/main" id="{7F4C3459-6C82-4757-61D0-E6E215CA1867}"/>
+              </a:ext>
+            </a:extLst>
+          </p:cNvPr>
+          <p:cNvSpPr/>
+          <p:nvPr/>
+        </p:nvSpPr>
+        <p:spPr>
+          <a:xfrm>
+            <a:off x="8787566" y="352307"/>
+            <a:ext cx="3404433" cy="1065527"/>
+          </a:xfrm>
+          <a:prstGeom prst="rect">
+            <a:avLst/>
+          </a:prstGeom>
+          <a:solidFill>
+            <a:schemeClr val="tx2">
+              <a:lumMod val="60000"/>
+              <a:lumOff val="40000"/>
+              <a:alpha val="70000"/>
+            </a:schemeClr>
+          </a:solidFill>
+          <a:ln w="12700">
+            <a:solidFill>
+              <a:schemeClr val="bg2">
+                <a:lumMod val="25000"/>
+              </a:schemeClr>
+            </a:solidFill>
+          </a:ln>
+        </p:spPr>
+        <p:style>
+          <a:lnRef idx="1">
+            <a:schemeClr val="accent3"/>
+          </a:lnRef>
+          <a:fillRef idx="2">
+            <a:schemeClr val="accent3"/>
+          </a:fillRef>
+          <a:effectRef idx="1">
+            <a:schemeClr val="accent3"/>
+          </a:effectRef>
+          <a:fontRef idx="minor">
+            <a:schemeClr val="dk1"/>
+          </a:fontRef>
+        </p:style>
+        <p:txBody>
+          <a:bodyPr vert="horz" lIns="91440" tIns="45720" rIns="91440" bIns="45720" rtlCol="0" anchor="ctr" anchorCtr="0">
+            <a:noAutofit/>
+          </a:bodyPr>
+          <a:lstStyle/>
+          <a:p>
+            <a:pPr>
+              <a:lnSpc>
+                <a:spcPct val="90000"/>
+              </a:lnSpc>
+              <a:spcBef>
+                <a:spcPts val="1000"/>
+              </a:spcBef>
+            </a:pPr>
+            <a:r>
+              <a:rPr lang="pt-BR" sz="1600" dirty="0" err="1">
+                <a:solidFill>
+                  <a:schemeClr val="bg2">
+                    <a:lumMod val="10000"/>
+                  </a:schemeClr>
+                </a:solidFill>
+                <a:ea typeface="Calibri" panose="020F0502020204030204" pitchFamily="34" charset="0"/>
+                <a:cs typeface="Arial" panose="020B0604020202020204" pitchFamily="34" charset="0"/>
+              </a:rPr>
+              <a:t>FreqDist</a:t>
+            </a:r>
+            <a:r>
+              <a:rPr lang="pt-BR" sz="1600" dirty="0">
+                <a:solidFill>
+                  <a:schemeClr val="bg2">
+                    <a:lumMod val="10000"/>
+                  </a:schemeClr>
+                </a:solidFill>
+                <a:ea typeface="Calibri" panose="020F0502020204030204" pitchFamily="34" charset="0"/>
+                <a:cs typeface="Arial" panose="020B0604020202020204" pitchFamily="34" charset="0"/>
+              </a:rPr>
+              <a:t>: Mensura a frequência que cada palavra aparece dentro de um contexto.</a:t>
+            </a:r>
+          </a:p>
+        </p:txBody>
+      </p:sp>
+    </p:spTree>
+    <p:extLst>
+      <p:ext uri="{BB962C8B-B14F-4D97-AF65-F5344CB8AC3E}">
+        <p14:creationId xmlns:p14="http://schemas.microsoft.com/office/powerpoint/2010/main" val="1794440633"/>
       </p:ext>
     </p:extLst>
   </p:cSld>

</xml_diff>

<commit_message>
Ajustes TCC e apresentação
</commit_message>
<xml_diff>
--- a/Apresentação TCC - Vinícius Andrade Lopes.pptx
+++ b/Apresentação TCC - Vinícius Andrade Lopes.pptx
@@ -15,6 +15,8 @@
     <p:sldId id="263" r:id="rId9"/>
     <p:sldId id="265" r:id="rId10"/>
     <p:sldId id="266" r:id="rId11"/>
+    <p:sldId id="267" r:id="rId12"/>
+    <p:sldId id="268" r:id="rId13"/>
   </p:sldIdLst>
   <p:sldSz cx="12192000" cy="6858000"/>
   <p:notesSz cx="6858000" cy="9144000"/>
@@ -451,7 +453,7 @@
           <a:p>
             <a:fld id="{542FF06D-87BF-405F-9790-318F41D0CF65}" type="slidenum">
               <a:rPr lang="pt-BR" smtClean="0"/>
-              <a:t>‹#›</a:t>
+              <a:t>‹nº›</a:t>
             </a:fld>
             <a:endParaRPr lang="pt-BR"/>
           </a:p>
@@ -659,7 +661,7 @@
           <a:p>
             <a:fld id="{542FF06D-87BF-405F-9790-318F41D0CF65}" type="slidenum">
               <a:rPr lang="pt-BR" smtClean="0"/>
-              <a:t>‹#›</a:t>
+              <a:t>‹nº›</a:t>
             </a:fld>
             <a:endParaRPr lang="pt-BR"/>
           </a:p>
@@ -857,7 +859,7 @@
           <a:p>
             <a:fld id="{542FF06D-87BF-405F-9790-318F41D0CF65}" type="slidenum">
               <a:rPr lang="pt-BR" smtClean="0"/>
-              <a:t>‹#›</a:t>
+              <a:t>‹nº›</a:t>
             </a:fld>
             <a:endParaRPr lang="pt-BR"/>
           </a:p>
@@ -1132,7 +1134,7 @@
           <a:p>
             <a:fld id="{542FF06D-87BF-405F-9790-318F41D0CF65}" type="slidenum">
               <a:rPr lang="pt-BR" smtClean="0"/>
-              <a:t>‹#›</a:t>
+              <a:t>‹nº›</a:t>
             </a:fld>
             <a:endParaRPr lang="pt-BR"/>
           </a:p>
@@ -1397,7 +1399,7 @@
           <a:p>
             <a:fld id="{542FF06D-87BF-405F-9790-318F41D0CF65}" type="slidenum">
               <a:rPr lang="pt-BR" smtClean="0"/>
-              <a:t>‹#›</a:t>
+              <a:t>‹nº›</a:t>
             </a:fld>
             <a:endParaRPr lang="pt-BR"/>
           </a:p>
@@ -1809,7 +1811,7 @@
           <a:p>
             <a:fld id="{542FF06D-87BF-405F-9790-318F41D0CF65}" type="slidenum">
               <a:rPr lang="pt-BR" smtClean="0"/>
-              <a:t>‹#›</a:t>
+              <a:t>‹nº›</a:t>
             </a:fld>
             <a:endParaRPr lang="pt-BR"/>
           </a:p>
@@ -1950,7 +1952,7 @@
           <a:p>
             <a:fld id="{542FF06D-87BF-405F-9790-318F41D0CF65}" type="slidenum">
               <a:rPr lang="pt-BR" smtClean="0"/>
-              <a:t>‹#›</a:t>
+              <a:t>‹nº›</a:t>
             </a:fld>
             <a:endParaRPr lang="pt-BR"/>
           </a:p>
@@ -2063,7 +2065,7 @@
           <a:p>
             <a:fld id="{542FF06D-87BF-405F-9790-318F41D0CF65}" type="slidenum">
               <a:rPr lang="pt-BR" smtClean="0"/>
-              <a:t>‹#›</a:t>
+              <a:t>‹nº›</a:t>
             </a:fld>
             <a:endParaRPr lang="pt-BR"/>
           </a:p>
@@ -2374,7 +2376,7 @@
           <a:p>
             <a:fld id="{542FF06D-87BF-405F-9790-318F41D0CF65}" type="slidenum">
               <a:rPr lang="pt-BR" smtClean="0"/>
-              <a:t>‹#›</a:t>
+              <a:t>‹nº›</a:t>
             </a:fld>
             <a:endParaRPr lang="pt-BR"/>
           </a:p>
@@ -2662,7 +2664,7 @@
           <a:p>
             <a:fld id="{542FF06D-87BF-405F-9790-318F41D0CF65}" type="slidenum">
               <a:rPr lang="pt-BR" smtClean="0"/>
-              <a:t>‹#›</a:t>
+              <a:t>‹nº›</a:t>
             </a:fld>
             <a:endParaRPr lang="pt-BR"/>
           </a:p>
@@ -2948,7 +2950,7 @@
           <a:p>
             <a:fld id="{542FF06D-87BF-405F-9790-318F41D0CF65}" type="slidenum">
               <a:rPr lang="pt-BR" smtClean="0"/>
-              <a:t>‹#›</a:t>
+              <a:t>‹nº›</a:t>
             </a:fld>
             <a:endParaRPr lang="pt-BR"/>
           </a:p>
@@ -3445,12 +3447,585 @@
           </a:p>
         </p:txBody>
       </p:sp>
+      <p:pic>
+        <p:nvPicPr>
+          <p:cNvPr id="3" name="Picture 2">
+            <a:extLst>
+              <a:ext uri="{FF2B5EF4-FFF2-40B4-BE49-F238E27FC236}">
+                <a16:creationId xmlns:a16="http://schemas.microsoft.com/office/drawing/2014/main" id="{FC93B50F-C07C-9BE0-12C2-28329FA995D1}"/>
+              </a:ext>
+            </a:extLst>
+          </p:cNvPr>
+          <p:cNvPicPr>
+            <a:picLocks noChangeAspect="1"/>
+          </p:cNvPicPr>
+          <p:nvPr/>
+        </p:nvPicPr>
+        <p:blipFill>
+          <a:blip r:embed="rId2">
+            <a:extLst>
+              <a:ext uri="{28A0092B-C50C-407E-A947-70E740481C1C}">
+                <a14:useLocalDpi xmlns:a14="http://schemas.microsoft.com/office/drawing/2010/main" val="0"/>
+              </a:ext>
+            </a:extLst>
+          </a:blip>
+          <a:stretch>
+            <a:fillRect/>
+          </a:stretch>
+        </p:blipFill>
+        <p:spPr>
+          <a:xfrm>
+            <a:off x="152740" y="2076045"/>
+            <a:ext cx="5828624" cy="719328"/>
+          </a:xfrm>
+          <a:prstGeom prst="rect">
+            <a:avLst/>
+          </a:prstGeom>
+        </p:spPr>
+      </p:pic>
       <p:sp>
         <p:nvSpPr>
-          <p:cNvPr id="4" name="Arrow: Pentagon 3">
-            <a:extLst>
-              <a:ext uri="{FF2B5EF4-FFF2-40B4-BE49-F238E27FC236}">
-                <a16:creationId xmlns:a16="http://schemas.microsoft.com/office/drawing/2014/main" id="{0E1C5205-F74D-8360-EDEE-B204D8633772}"/>
+          <p:cNvPr id="5" name="Espaço Reservado para Conteúdo 2">
+            <a:extLst>
+              <a:ext uri="{FF2B5EF4-FFF2-40B4-BE49-F238E27FC236}">
+                <a16:creationId xmlns:a16="http://schemas.microsoft.com/office/drawing/2014/main" id="{7793F7F0-C787-FDE0-AACB-D4D5E8431D4B}"/>
+              </a:ext>
+            </a:extLst>
+          </p:cNvPr>
+          <p:cNvSpPr txBox="1">
+            <a:spLocks/>
+          </p:cNvSpPr>
+          <p:nvPr/>
+        </p:nvSpPr>
+        <p:spPr>
+          <a:xfrm>
+            <a:off x="152740" y="2795373"/>
+            <a:ext cx="5809520" cy="959185"/>
+          </a:xfrm>
+          <a:prstGeom prst="rect">
+            <a:avLst/>
+          </a:prstGeom>
+        </p:spPr>
+        <p:txBody>
+          <a:bodyPr vert="horz" lIns="91440" tIns="45720" rIns="91440" bIns="45720" rtlCol="0">
+            <a:noAutofit/>
+          </a:bodyPr>
+          <a:lstStyle>
+            <a:defPPr>
+              <a:defRPr lang="pt-BR"/>
+            </a:defPPr>
+            <a:lvl1pPr indent="0">
+              <a:lnSpc>
+                <a:spcPct val="90000"/>
+              </a:lnSpc>
+              <a:spcBef>
+                <a:spcPts val="1000"/>
+              </a:spcBef>
+              <a:buFont typeface="Arial" panose="020B0604020202020204" pitchFamily="34" charset="0"/>
+              <a:buNone/>
+              <a:defRPr sz="1600">
+                <a:solidFill>
+                  <a:schemeClr val="bg2">
+                    <a:lumMod val="25000"/>
+                  </a:schemeClr>
+                </a:solidFill>
+                <a:cs typeface="Arial" panose="020B0604020202020204" pitchFamily="34" charset="0"/>
+              </a:defRPr>
+            </a:lvl1pPr>
+            <a:lvl2pPr marL="685800" indent="-228600">
+              <a:lnSpc>
+                <a:spcPct val="90000"/>
+              </a:lnSpc>
+              <a:spcBef>
+                <a:spcPts val="500"/>
+              </a:spcBef>
+              <a:buFont typeface="Arial" panose="020B0604020202020204" pitchFamily="34" charset="0"/>
+              <a:buChar char="•"/>
+              <a:defRPr sz="2400"/>
+            </a:lvl2pPr>
+            <a:lvl3pPr marL="1143000" indent="-228600">
+              <a:lnSpc>
+                <a:spcPct val="90000"/>
+              </a:lnSpc>
+              <a:spcBef>
+                <a:spcPts val="500"/>
+              </a:spcBef>
+              <a:buFont typeface="Arial" panose="020B0604020202020204" pitchFamily="34" charset="0"/>
+              <a:buChar char="•"/>
+              <a:defRPr sz="2000"/>
+            </a:lvl3pPr>
+            <a:lvl4pPr marL="1600200" indent="-228600">
+              <a:lnSpc>
+                <a:spcPct val="90000"/>
+              </a:lnSpc>
+              <a:spcBef>
+                <a:spcPts val="500"/>
+              </a:spcBef>
+              <a:buFont typeface="Arial" panose="020B0604020202020204" pitchFamily="34" charset="0"/>
+              <a:buChar char="•"/>
+            </a:lvl4pPr>
+            <a:lvl5pPr marL="2057400" indent="-228600">
+              <a:lnSpc>
+                <a:spcPct val="90000"/>
+              </a:lnSpc>
+              <a:spcBef>
+                <a:spcPts val="500"/>
+              </a:spcBef>
+              <a:buFont typeface="Arial" panose="020B0604020202020204" pitchFamily="34" charset="0"/>
+              <a:buChar char="•"/>
+            </a:lvl5pPr>
+            <a:lvl6pPr marL="2514600" indent="-228600">
+              <a:lnSpc>
+                <a:spcPct val="90000"/>
+              </a:lnSpc>
+              <a:spcBef>
+                <a:spcPts val="500"/>
+              </a:spcBef>
+              <a:buFont typeface="Arial" panose="020B0604020202020204" pitchFamily="34" charset="0"/>
+              <a:buChar char="•"/>
+            </a:lvl6pPr>
+            <a:lvl7pPr marL="2971800" indent="-228600">
+              <a:lnSpc>
+                <a:spcPct val="90000"/>
+              </a:lnSpc>
+              <a:spcBef>
+                <a:spcPts val="500"/>
+              </a:spcBef>
+              <a:buFont typeface="Arial" panose="020B0604020202020204" pitchFamily="34" charset="0"/>
+              <a:buChar char="•"/>
+            </a:lvl7pPr>
+            <a:lvl8pPr marL="3429000" indent="-228600">
+              <a:lnSpc>
+                <a:spcPct val="90000"/>
+              </a:lnSpc>
+              <a:spcBef>
+                <a:spcPts val="500"/>
+              </a:spcBef>
+              <a:buFont typeface="Arial" panose="020B0604020202020204" pitchFamily="34" charset="0"/>
+              <a:buChar char="•"/>
+            </a:lvl8pPr>
+            <a:lvl9pPr marL="3886200" indent="-228600">
+              <a:lnSpc>
+                <a:spcPct val="90000"/>
+              </a:lnSpc>
+              <a:spcBef>
+                <a:spcPts val="500"/>
+              </a:spcBef>
+              <a:buFont typeface="Arial" panose="020B0604020202020204" pitchFamily="34" charset="0"/>
+              <a:buChar char="•"/>
+            </a:lvl9pPr>
+          </a:lstStyle>
+          <a:p>
+            <a:r>
+              <a:rPr lang="pt-BR" sz="1200" dirty="0"/>
+              <a:t>Output gerado após a aplicação da técnica de similaridade no livro Harry Potter e a Câmara Secreta, com os dados textuais </a:t>
+            </a:r>
+            <a:r>
+              <a:rPr lang="pt-BR" sz="1200" dirty="0" err="1"/>
+              <a:t>pré</a:t>
+            </a:r>
+            <a:r>
+              <a:rPr lang="pt-BR" sz="1200" dirty="0"/>
+              <a:t>-processados.</a:t>
+            </a:r>
+            <a:br>
+              <a:rPr lang="pt-BR" sz="1200" dirty="0"/>
+            </a:br>
+            <a:r>
+              <a:rPr lang="pt-BR" sz="1200" b="1" dirty="0"/>
+              <a:t>Fonte: Resultados originais da pesquisa </a:t>
+            </a:r>
+          </a:p>
+        </p:txBody>
+      </p:sp>
+      <p:pic>
+        <p:nvPicPr>
+          <p:cNvPr id="9" name="Picture 8" descr="A screenshot of a computer code&#10;&#10;Description automatically generated with low confidence">
+            <a:extLst>
+              <a:ext uri="{FF2B5EF4-FFF2-40B4-BE49-F238E27FC236}">
+                <a16:creationId xmlns:a16="http://schemas.microsoft.com/office/drawing/2014/main" id="{4E817F75-8D41-2237-3CA5-C66DBEBBC00A}"/>
+              </a:ext>
+            </a:extLst>
+          </p:cNvPr>
+          <p:cNvPicPr>
+            <a:picLocks noChangeAspect="1"/>
+          </p:cNvPicPr>
+          <p:nvPr/>
+        </p:nvPicPr>
+        <p:blipFill>
+          <a:blip r:embed="rId3">
+            <a:extLst>
+              <a:ext uri="{28A0092B-C50C-407E-A947-70E740481C1C}">
+                <a14:useLocalDpi xmlns:a14="http://schemas.microsoft.com/office/drawing/2010/main" val="0"/>
+              </a:ext>
+            </a:extLst>
+          </a:blip>
+          <a:stretch>
+            <a:fillRect/>
+          </a:stretch>
+        </p:blipFill>
+        <p:spPr>
+          <a:xfrm>
+            <a:off x="6245140" y="2523744"/>
+            <a:ext cx="5832225" cy="1810512"/>
+          </a:xfrm>
+          <a:prstGeom prst="rect">
+            <a:avLst/>
+          </a:prstGeom>
+        </p:spPr>
+      </p:pic>
+      <p:sp>
+        <p:nvSpPr>
+          <p:cNvPr id="10" name="Espaço Reservado para Conteúdo 2">
+            <a:extLst>
+              <a:ext uri="{FF2B5EF4-FFF2-40B4-BE49-F238E27FC236}">
+                <a16:creationId xmlns:a16="http://schemas.microsoft.com/office/drawing/2014/main" id="{A94475B3-8EC4-2979-A424-A7DD85A5625E}"/>
+              </a:ext>
+            </a:extLst>
+          </p:cNvPr>
+          <p:cNvSpPr txBox="1">
+            <a:spLocks/>
+          </p:cNvSpPr>
+          <p:nvPr/>
+        </p:nvSpPr>
+        <p:spPr>
+          <a:xfrm>
+            <a:off x="6245140" y="4334256"/>
+            <a:ext cx="5813224" cy="959185"/>
+          </a:xfrm>
+          <a:prstGeom prst="rect">
+            <a:avLst/>
+          </a:prstGeom>
+        </p:spPr>
+        <p:txBody>
+          <a:bodyPr vert="horz" lIns="91440" tIns="45720" rIns="91440" bIns="45720" rtlCol="0">
+            <a:noAutofit/>
+          </a:bodyPr>
+          <a:lstStyle>
+            <a:defPPr>
+              <a:defRPr lang="pt-BR"/>
+            </a:defPPr>
+            <a:lvl1pPr indent="0">
+              <a:lnSpc>
+                <a:spcPct val="90000"/>
+              </a:lnSpc>
+              <a:spcBef>
+                <a:spcPts val="1000"/>
+              </a:spcBef>
+              <a:buFont typeface="Arial" panose="020B0604020202020204" pitchFamily="34" charset="0"/>
+              <a:buNone/>
+              <a:defRPr sz="1600">
+                <a:solidFill>
+                  <a:schemeClr val="bg2">
+                    <a:lumMod val="25000"/>
+                  </a:schemeClr>
+                </a:solidFill>
+                <a:cs typeface="Arial" panose="020B0604020202020204" pitchFamily="34" charset="0"/>
+              </a:defRPr>
+            </a:lvl1pPr>
+            <a:lvl2pPr marL="685800" indent="-228600">
+              <a:lnSpc>
+                <a:spcPct val="90000"/>
+              </a:lnSpc>
+              <a:spcBef>
+                <a:spcPts val="500"/>
+              </a:spcBef>
+              <a:buFont typeface="Arial" panose="020B0604020202020204" pitchFamily="34" charset="0"/>
+              <a:buChar char="•"/>
+              <a:defRPr sz="2400"/>
+            </a:lvl2pPr>
+            <a:lvl3pPr marL="1143000" indent="-228600">
+              <a:lnSpc>
+                <a:spcPct val="90000"/>
+              </a:lnSpc>
+              <a:spcBef>
+                <a:spcPts val="500"/>
+              </a:spcBef>
+              <a:buFont typeface="Arial" panose="020B0604020202020204" pitchFamily="34" charset="0"/>
+              <a:buChar char="•"/>
+              <a:defRPr sz="2000"/>
+            </a:lvl3pPr>
+            <a:lvl4pPr marL="1600200" indent="-228600">
+              <a:lnSpc>
+                <a:spcPct val="90000"/>
+              </a:lnSpc>
+              <a:spcBef>
+                <a:spcPts val="500"/>
+              </a:spcBef>
+              <a:buFont typeface="Arial" panose="020B0604020202020204" pitchFamily="34" charset="0"/>
+              <a:buChar char="•"/>
+            </a:lvl4pPr>
+            <a:lvl5pPr marL="2057400" indent="-228600">
+              <a:lnSpc>
+                <a:spcPct val="90000"/>
+              </a:lnSpc>
+              <a:spcBef>
+                <a:spcPts val="500"/>
+              </a:spcBef>
+              <a:buFont typeface="Arial" panose="020B0604020202020204" pitchFamily="34" charset="0"/>
+              <a:buChar char="•"/>
+            </a:lvl5pPr>
+            <a:lvl6pPr marL="2514600" indent="-228600">
+              <a:lnSpc>
+                <a:spcPct val="90000"/>
+              </a:lnSpc>
+              <a:spcBef>
+                <a:spcPts val="500"/>
+              </a:spcBef>
+              <a:buFont typeface="Arial" panose="020B0604020202020204" pitchFamily="34" charset="0"/>
+              <a:buChar char="•"/>
+            </a:lvl6pPr>
+            <a:lvl7pPr marL="2971800" indent="-228600">
+              <a:lnSpc>
+                <a:spcPct val="90000"/>
+              </a:lnSpc>
+              <a:spcBef>
+                <a:spcPts val="500"/>
+              </a:spcBef>
+              <a:buFont typeface="Arial" panose="020B0604020202020204" pitchFamily="34" charset="0"/>
+              <a:buChar char="•"/>
+            </a:lvl7pPr>
+            <a:lvl8pPr marL="3429000" indent="-228600">
+              <a:lnSpc>
+                <a:spcPct val="90000"/>
+              </a:lnSpc>
+              <a:spcBef>
+                <a:spcPts val="500"/>
+              </a:spcBef>
+              <a:buFont typeface="Arial" panose="020B0604020202020204" pitchFamily="34" charset="0"/>
+              <a:buChar char="•"/>
+            </a:lvl8pPr>
+            <a:lvl9pPr marL="3886200" indent="-228600">
+              <a:lnSpc>
+                <a:spcPct val="90000"/>
+              </a:lnSpc>
+              <a:spcBef>
+                <a:spcPts val="500"/>
+              </a:spcBef>
+              <a:buFont typeface="Arial" panose="020B0604020202020204" pitchFamily="34" charset="0"/>
+              <a:buChar char="•"/>
+            </a:lvl9pPr>
+          </a:lstStyle>
+          <a:p>
+            <a:r>
+              <a:rPr lang="pt-BR" sz="1200" dirty="0"/>
+              <a:t>Output gerado após a aplicação da técnica de concordância no livro Harry Potter e a Câmara Secreta, com os dados textuais </a:t>
+            </a:r>
+            <a:r>
+              <a:rPr lang="pt-BR" sz="1200" dirty="0" err="1"/>
+              <a:t>pré</a:t>
+            </a:r>
+            <a:r>
+              <a:rPr lang="pt-BR" sz="1200" dirty="0"/>
+              <a:t>-processados.</a:t>
+            </a:r>
+            <a:br>
+              <a:rPr lang="pt-BR" sz="1200" dirty="0"/>
+            </a:br>
+            <a:r>
+              <a:rPr lang="pt-BR" sz="1200" b="1" dirty="0"/>
+              <a:t>Fonte: Resultados originais da pesquisa </a:t>
+            </a:r>
+          </a:p>
+        </p:txBody>
+      </p:sp>
+      <p:pic>
+        <p:nvPicPr>
+          <p:cNvPr id="12" name="Picture 11" descr="A black text on a white background&#10;&#10;Description automatically generated with low confidence">
+            <a:extLst>
+              <a:ext uri="{FF2B5EF4-FFF2-40B4-BE49-F238E27FC236}">
+                <a16:creationId xmlns:a16="http://schemas.microsoft.com/office/drawing/2014/main" id="{309BC8B5-5C0A-1BE9-C1A0-58DCAD8C1B17}"/>
+              </a:ext>
+            </a:extLst>
+          </p:cNvPr>
+          <p:cNvPicPr>
+            <a:picLocks noChangeAspect="1"/>
+          </p:cNvPicPr>
+          <p:nvPr/>
+        </p:nvPicPr>
+        <p:blipFill>
+          <a:blip r:embed="rId4">
+            <a:extLst>
+              <a:ext uri="{28A0092B-C50C-407E-A947-70E740481C1C}">
+                <a14:useLocalDpi xmlns:a14="http://schemas.microsoft.com/office/drawing/2010/main" val="0"/>
+              </a:ext>
+            </a:extLst>
+          </a:blip>
+          <a:stretch>
+            <a:fillRect/>
+          </a:stretch>
+        </p:blipFill>
+        <p:spPr>
+          <a:xfrm>
+            <a:off x="152740" y="4083189"/>
+            <a:ext cx="5828624" cy="1444752"/>
+          </a:xfrm>
+          <a:prstGeom prst="rect">
+            <a:avLst/>
+          </a:prstGeom>
+        </p:spPr>
+      </p:pic>
+      <p:sp>
+        <p:nvSpPr>
+          <p:cNvPr id="13" name="Espaço Reservado para Conteúdo 2">
+            <a:extLst>
+              <a:ext uri="{FF2B5EF4-FFF2-40B4-BE49-F238E27FC236}">
+                <a16:creationId xmlns:a16="http://schemas.microsoft.com/office/drawing/2014/main" id="{4B084FA3-DAFC-B003-E2B8-4409FBF798E8}"/>
+              </a:ext>
+            </a:extLst>
+          </p:cNvPr>
+          <p:cNvSpPr txBox="1">
+            <a:spLocks/>
+          </p:cNvSpPr>
+          <p:nvPr/>
+        </p:nvSpPr>
+        <p:spPr>
+          <a:xfrm>
+            <a:off x="152740" y="5515424"/>
+            <a:ext cx="5809520" cy="959185"/>
+          </a:xfrm>
+          <a:prstGeom prst="rect">
+            <a:avLst/>
+          </a:prstGeom>
+        </p:spPr>
+        <p:txBody>
+          <a:bodyPr vert="horz" lIns="91440" tIns="45720" rIns="91440" bIns="45720" rtlCol="0">
+            <a:noAutofit/>
+          </a:bodyPr>
+          <a:lstStyle>
+            <a:defPPr>
+              <a:defRPr lang="pt-BR"/>
+            </a:defPPr>
+            <a:lvl1pPr indent="0">
+              <a:lnSpc>
+                <a:spcPct val="90000"/>
+              </a:lnSpc>
+              <a:spcBef>
+                <a:spcPts val="1000"/>
+              </a:spcBef>
+              <a:buFont typeface="Arial" panose="020B0604020202020204" pitchFamily="34" charset="0"/>
+              <a:buNone/>
+              <a:defRPr sz="1600">
+                <a:solidFill>
+                  <a:schemeClr val="bg2">
+                    <a:lumMod val="25000"/>
+                  </a:schemeClr>
+                </a:solidFill>
+                <a:cs typeface="Arial" panose="020B0604020202020204" pitchFamily="34" charset="0"/>
+              </a:defRPr>
+            </a:lvl1pPr>
+            <a:lvl2pPr marL="685800" indent="-228600">
+              <a:lnSpc>
+                <a:spcPct val="90000"/>
+              </a:lnSpc>
+              <a:spcBef>
+                <a:spcPts val="500"/>
+              </a:spcBef>
+              <a:buFont typeface="Arial" panose="020B0604020202020204" pitchFamily="34" charset="0"/>
+              <a:buChar char="•"/>
+              <a:defRPr sz="2400"/>
+            </a:lvl2pPr>
+            <a:lvl3pPr marL="1143000" indent="-228600">
+              <a:lnSpc>
+                <a:spcPct val="90000"/>
+              </a:lnSpc>
+              <a:spcBef>
+                <a:spcPts val="500"/>
+              </a:spcBef>
+              <a:buFont typeface="Arial" panose="020B0604020202020204" pitchFamily="34" charset="0"/>
+              <a:buChar char="•"/>
+              <a:defRPr sz="2000"/>
+            </a:lvl3pPr>
+            <a:lvl4pPr marL="1600200" indent="-228600">
+              <a:lnSpc>
+                <a:spcPct val="90000"/>
+              </a:lnSpc>
+              <a:spcBef>
+                <a:spcPts val="500"/>
+              </a:spcBef>
+              <a:buFont typeface="Arial" panose="020B0604020202020204" pitchFamily="34" charset="0"/>
+              <a:buChar char="•"/>
+            </a:lvl4pPr>
+            <a:lvl5pPr marL="2057400" indent="-228600">
+              <a:lnSpc>
+                <a:spcPct val="90000"/>
+              </a:lnSpc>
+              <a:spcBef>
+                <a:spcPts val="500"/>
+              </a:spcBef>
+              <a:buFont typeface="Arial" panose="020B0604020202020204" pitchFamily="34" charset="0"/>
+              <a:buChar char="•"/>
+            </a:lvl5pPr>
+            <a:lvl6pPr marL="2514600" indent="-228600">
+              <a:lnSpc>
+                <a:spcPct val="90000"/>
+              </a:lnSpc>
+              <a:spcBef>
+                <a:spcPts val="500"/>
+              </a:spcBef>
+              <a:buFont typeface="Arial" panose="020B0604020202020204" pitchFamily="34" charset="0"/>
+              <a:buChar char="•"/>
+            </a:lvl6pPr>
+            <a:lvl7pPr marL="2971800" indent="-228600">
+              <a:lnSpc>
+                <a:spcPct val="90000"/>
+              </a:lnSpc>
+              <a:spcBef>
+                <a:spcPts val="500"/>
+              </a:spcBef>
+              <a:buFont typeface="Arial" panose="020B0604020202020204" pitchFamily="34" charset="0"/>
+              <a:buChar char="•"/>
+            </a:lvl7pPr>
+            <a:lvl8pPr marL="3429000" indent="-228600">
+              <a:lnSpc>
+                <a:spcPct val="90000"/>
+              </a:lnSpc>
+              <a:spcBef>
+                <a:spcPts val="500"/>
+              </a:spcBef>
+              <a:buFont typeface="Arial" panose="020B0604020202020204" pitchFamily="34" charset="0"/>
+              <a:buChar char="•"/>
+            </a:lvl8pPr>
+            <a:lvl9pPr marL="3886200" indent="-228600">
+              <a:lnSpc>
+                <a:spcPct val="90000"/>
+              </a:lnSpc>
+              <a:spcBef>
+                <a:spcPts val="500"/>
+              </a:spcBef>
+              <a:buFont typeface="Arial" panose="020B0604020202020204" pitchFamily="34" charset="0"/>
+              <a:buChar char="•"/>
+            </a:lvl9pPr>
+          </a:lstStyle>
+          <a:p>
+            <a:r>
+              <a:rPr lang="pt-BR" sz="1200" dirty="0"/>
+              <a:t>Output gerado após a aplicação da técnica de bigramas no livro Harry Potter e a Câmara Secreta, com os dados textuais </a:t>
+            </a:r>
+            <a:r>
+              <a:rPr lang="pt-BR" sz="1200" dirty="0" err="1"/>
+              <a:t>pré</a:t>
+            </a:r>
+            <a:r>
+              <a:rPr lang="pt-BR" sz="1200" dirty="0"/>
+              <a:t>-processados.</a:t>
+            </a:r>
+            <a:br>
+              <a:rPr lang="pt-BR" sz="1200" dirty="0"/>
+            </a:br>
+            <a:r>
+              <a:rPr lang="pt-BR" sz="1200" b="1" dirty="0"/>
+              <a:t>Fonte: Resultados originais da pesquisa </a:t>
+            </a:r>
+          </a:p>
+        </p:txBody>
+      </p:sp>
+      <p:sp>
+        <p:nvSpPr>
+          <p:cNvPr id="2" name="Arrow: Pentagon 3">
+            <a:extLst>
+              <a:ext uri="{FF2B5EF4-FFF2-40B4-BE49-F238E27FC236}">
+                <a16:creationId xmlns:a16="http://schemas.microsoft.com/office/drawing/2014/main" id="{5EF17347-024D-B3EA-70C3-382C13B1B13C}"/>
               </a:ext>
             </a:extLst>
           </p:cNvPr>
@@ -3460,7 +4035,7 @@
         <p:spPr>
           <a:xfrm>
             <a:off x="-1" y="383391"/>
-            <a:ext cx="5962261" cy="905773"/>
+            <a:ext cx="4975200" cy="630000"/>
           </a:xfrm>
           <a:prstGeom prst="homePlate">
             <a:avLst/>
@@ -3492,7 +4067,7 @@
           <a:p>
             <a:pPr algn="ctr"/>
             <a:r>
-              <a:rPr lang="pt-BR" sz="3700" dirty="0">
+              <a:rPr lang="pt-BR" sz="3200" dirty="0">
                 <a:solidFill>
                   <a:schemeClr val="bg1"/>
                 </a:solidFill>
@@ -3504,10 +4079,10 @@
       </p:sp>
       <p:sp>
         <p:nvSpPr>
-          <p:cNvPr id="6" name="Arrow: Pentagon 5">
-            <a:extLst>
-              <a:ext uri="{FF2B5EF4-FFF2-40B4-BE49-F238E27FC236}">
-                <a16:creationId xmlns:a16="http://schemas.microsoft.com/office/drawing/2014/main" id="{6495FEFB-EF83-9F99-FA59-304B76DA4498}"/>
+          <p:cNvPr id="8" name="Arrow: Pentagon 5">
+            <a:extLst>
+              <a:ext uri="{FF2B5EF4-FFF2-40B4-BE49-F238E27FC236}">
+                <a16:creationId xmlns:a16="http://schemas.microsoft.com/office/drawing/2014/main" id="{FFB6C35C-DE14-FE99-AED0-953BAF08443D}"/>
               </a:ext>
             </a:extLst>
           </p:cNvPr>
@@ -3516,8 +4091,8 @@
         </p:nvSpPr>
         <p:spPr>
           <a:xfrm>
-            <a:off x="-1" y="1170272"/>
-            <a:ext cx="4450704" cy="453255"/>
+            <a:off x="0" y="933967"/>
+            <a:ext cx="3205538" cy="370852"/>
           </a:xfrm>
           <a:prstGeom prst="homePlate">
             <a:avLst/>
@@ -3549,60 +4124,54 @@
           <a:p>
             <a:pPr algn="ctr"/>
             <a:r>
-              <a:rPr lang="pt-BR" sz="2800" dirty="0">
+              <a:rPr lang="pt-BR" sz="2400" dirty="0">
                 <a:solidFill>
                   <a:schemeClr val="bg2">
                     <a:lumMod val="25000"/>
                   </a:schemeClr>
                 </a:solidFill>
               </a:rPr>
-              <a:t>VISUALIZAÇÃO DE DADOS</a:t>
+              <a:t>ANÁLISE DE DADOS</a:t>
             </a:r>
           </a:p>
         </p:txBody>
       </p:sp>
-      <p:pic>
-        <p:nvPicPr>
-          <p:cNvPr id="3" name="Picture 2">
-            <a:extLst>
-              <a:ext uri="{FF2B5EF4-FFF2-40B4-BE49-F238E27FC236}">
-                <a16:creationId xmlns:a16="http://schemas.microsoft.com/office/drawing/2014/main" id="{FC93B50F-C07C-9BE0-12C2-28329FA995D1}"/>
-              </a:ext>
-            </a:extLst>
-          </p:cNvPr>
-          <p:cNvPicPr>
-            <a:picLocks noChangeAspect="1"/>
-          </p:cNvPicPr>
-          <p:nvPr/>
-        </p:nvPicPr>
-        <p:blipFill>
-          <a:blip r:embed="rId2">
-            <a:extLst>
-              <a:ext uri="{28A0092B-C50C-407E-A947-70E740481C1C}">
-                <a14:useLocalDpi xmlns:a14="http://schemas.microsoft.com/office/drawing/2010/main" val="0"/>
-              </a:ext>
-            </a:extLst>
-          </a:blip>
-          <a:stretch>
-            <a:fillRect/>
-          </a:stretch>
-        </p:blipFill>
-        <p:spPr>
-          <a:xfrm>
-            <a:off x="133636" y="2076045"/>
-            <a:ext cx="5441140" cy="719328"/>
-          </a:xfrm>
-          <a:prstGeom prst="rect">
-            <a:avLst/>
-          </a:prstGeom>
-        </p:spPr>
-      </p:pic>
+    </p:spTree>
+    <p:extLst>
+      <p:ext uri="{BB962C8B-B14F-4D97-AF65-F5344CB8AC3E}">
+        <p14:creationId xmlns:p14="http://schemas.microsoft.com/office/powerpoint/2010/main" val="3513648849"/>
+      </p:ext>
+    </p:extLst>
+  </p:cSld>
+  <p:clrMapOvr>
+    <a:masterClrMapping/>
+  </p:clrMapOvr>
+</p:sld>
+</file>
+
+<file path=ppt/slides/slide11.xml><?xml version="1.0" encoding="utf-8"?>
+<p:sld xmlns:a="http://schemas.openxmlformats.org/drawingml/2006/main" xmlns:r="http://schemas.openxmlformats.org/officeDocument/2006/relationships" xmlns:p="http://schemas.openxmlformats.org/presentationml/2006/main">
+  <p:cSld>
+    <p:spTree>
+      <p:nvGrpSpPr>
+        <p:cNvPr id="1" name=""/>
+        <p:cNvGrpSpPr/>
+        <p:nvPr/>
+      </p:nvGrpSpPr>
+      <p:grpSpPr>
+        <a:xfrm>
+          <a:off x="0" y="0"/>
+          <a:ext cx="0" cy="0"/>
+          <a:chOff x="0" y="0"/>
+          <a:chExt cx="0" cy="0"/>
+        </a:xfrm>
+      </p:grpSpPr>
       <p:sp>
         <p:nvSpPr>
-          <p:cNvPr id="5" name="Espaço Reservado para Conteúdo 2">
-            <a:extLst>
-              <a:ext uri="{FF2B5EF4-FFF2-40B4-BE49-F238E27FC236}">
-                <a16:creationId xmlns:a16="http://schemas.microsoft.com/office/drawing/2014/main" id="{7793F7F0-C787-FDE0-AACB-D4D5E8431D4B}"/>
+          <p:cNvPr id="13" name="Espaço Reservado para Conteúdo 2">
+            <a:extLst>
+              <a:ext uri="{FF2B5EF4-FFF2-40B4-BE49-F238E27FC236}">
+                <a16:creationId xmlns:a16="http://schemas.microsoft.com/office/drawing/2014/main" id="{4B084FA3-DAFC-B003-E2B8-4409FBF798E8}"/>
               </a:ext>
             </a:extLst>
           </p:cNvPr>
@@ -3613,8 +4182,8 @@
         </p:nvSpPr>
         <p:spPr>
           <a:xfrm>
-            <a:off x="133636" y="2795373"/>
-            <a:ext cx="5441140" cy="959185"/>
+            <a:off x="2847057" y="3055597"/>
+            <a:ext cx="6230404" cy="613411"/>
           </a:xfrm>
           <a:prstGeom prst="rect">
             <a:avLst/>
@@ -3731,69 +4300,154 @@
           </a:lstStyle>
           <a:p>
             <a:r>
-              <a:rPr lang="pt-BR" dirty="0"/>
-              <a:t>Output gerado após a aplicação da técnica de similaridade no livro Harry Potter e a Câmara Secreta, com os dados textuais </a:t>
-            </a:r>
-            <a:r>
-              <a:rPr lang="pt-BR" dirty="0" err="1"/>
-              <a:t>pré</a:t>
-            </a:r>
-            <a:r>
-              <a:rPr lang="pt-BR" dirty="0"/>
-              <a:t>-processados.</a:t>
+              <a:rPr lang="pt-BR" sz="1200" dirty="0"/>
+              <a:t>Tabela 1. Quantidade de palavras em cada fonte de dados, com a aplicação da etapa de pré-processamento, e percentual de redução na frequência de palavras dos filmes se comparado com os livros.</a:t>
             </a:r>
             <a:br>
-              <a:rPr lang="pt-BR" dirty="0"/>
+              <a:rPr lang="pt-BR" sz="1200" dirty="0"/>
             </a:br>
             <a:r>
-              <a:rPr lang="pt-BR" b="1" dirty="0"/>
+              <a:rPr lang="pt-BR" sz="1200" b="1" dirty="0"/>
               <a:t>Fonte: Resultados originais da pesquisa </a:t>
             </a:r>
+          </a:p>
+          <a:p>
+            <a:endParaRPr lang="pt-BR" sz="1200" dirty="0"/>
           </a:p>
         </p:txBody>
       </p:sp>
-      <p:pic>
-        <p:nvPicPr>
-          <p:cNvPr id="9" name="Picture 8" descr="A screenshot of a computer code&#10;&#10;Description automatically generated with low confidence">
-            <a:extLst>
-              <a:ext uri="{FF2B5EF4-FFF2-40B4-BE49-F238E27FC236}">
-                <a16:creationId xmlns:a16="http://schemas.microsoft.com/office/drawing/2014/main" id="{4E817F75-8D41-2237-3CA5-C66DBEBBC00A}"/>
-              </a:ext>
-            </a:extLst>
-          </p:cNvPr>
-          <p:cNvPicPr>
-            <a:picLocks noChangeAspect="1"/>
-          </p:cNvPicPr>
-          <p:nvPr/>
-        </p:nvPicPr>
-        <p:blipFill>
-          <a:blip r:embed="rId3">
-            <a:extLst>
-              <a:ext uri="{28A0092B-C50C-407E-A947-70E740481C1C}">
-                <a14:useLocalDpi xmlns:a14="http://schemas.microsoft.com/office/drawing/2010/main" val="0"/>
-              </a:ext>
-            </a:extLst>
-          </a:blip>
-          <a:stretch>
-            <a:fillRect/>
-          </a:stretch>
-        </p:blipFill>
-        <p:spPr>
-          <a:xfrm>
-            <a:off x="6433868" y="2523744"/>
-            <a:ext cx="5454770" cy="1810512"/>
-          </a:xfrm>
-          <a:prstGeom prst="rect">
-            <a:avLst/>
-          </a:prstGeom>
-        </p:spPr>
-      </p:pic>
+      <p:graphicFrame>
+        <p:nvGraphicFramePr>
+          <p:cNvPr id="17" name="Objeto 16">
+            <a:extLst>
+              <a:ext uri="{FF2B5EF4-FFF2-40B4-BE49-F238E27FC236}">
+                <a16:creationId xmlns:a16="http://schemas.microsoft.com/office/drawing/2014/main" id="{24BA0D43-DD6B-DBD3-2911-1F4F70D4BAF5}"/>
+              </a:ext>
+            </a:extLst>
+          </p:cNvPr>
+          <p:cNvGraphicFramePr>
+            <a:graphicFrameLocks noChangeAspect="1"/>
+          </p:cNvGraphicFramePr>
+          <p:nvPr>
+            <p:extLst>
+              <p:ext uri="{D42A27DB-BD31-4B8C-83A1-F6EECF244321}">
+                <p14:modId xmlns:p14="http://schemas.microsoft.com/office/powerpoint/2010/main" val="659122155"/>
+              </p:ext>
+            </p:extLst>
+          </p:nvPr>
+        </p:nvGraphicFramePr>
+        <p:xfrm>
+          <a:off x="2847057" y="1563967"/>
+          <a:ext cx="6230405" cy="1683535"/>
+        </p:xfrm>
+        <a:graphic>
+          <a:graphicData uri="http://schemas.openxmlformats.org/presentationml/2006/ole">
+            <mc:AlternateContent xmlns:mc="http://schemas.openxmlformats.org/markup-compatibility/2006">
+              <mc:Choice xmlns:v="urn:schemas-microsoft-com:vml" Requires="v">
+                <p:oleObj name="Documento" r:id="rId2" imgW="5765800" imgH="1612900" progId="Word.Document.12">
+                  <p:embed/>
+                </p:oleObj>
+              </mc:Choice>
+              <mc:Fallback>
+                <p:oleObj name="Documento" r:id="rId2" imgW="5765800" imgH="1612900" progId="Word.Document.12">
+                  <p:embed/>
+                  <p:pic>
+                    <p:nvPicPr>
+                      <p:cNvPr id="0" name=""/>
+                      <p:cNvPicPr/>
+                      <p:nvPr/>
+                    </p:nvPicPr>
+                    <p:blipFill>
+                      <a:blip r:embed="rId3"/>
+                      <a:stretch>
+                        <a:fillRect/>
+                      </a:stretch>
+                    </p:blipFill>
+                    <p:spPr>
+                      <a:xfrm>
+                        <a:off x="2847057" y="1563967"/>
+                        <a:ext cx="6230405" cy="1683535"/>
+                      </a:xfrm>
+                      <a:prstGeom prst="rect">
+                        <a:avLst/>
+                      </a:prstGeom>
+                    </p:spPr>
+                  </p:pic>
+                </p:oleObj>
+              </mc:Fallback>
+            </mc:AlternateContent>
+          </a:graphicData>
+        </a:graphic>
+      </p:graphicFrame>
+      <p:graphicFrame>
+        <p:nvGraphicFramePr>
+          <p:cNvPr id="19" name="Objeto 18">
+            <a:extLst>
+              <a:ext uri="{FF2B5EF4-FFF2-40B4-BE49-F238E27FC236}">
+                <a16:creationId xmlns:a16="http://schemas.microsoft.com/office/drawing/2014/main" id="{02FA5394-FF48-4035-949F-3CF77BCAE9E6}"/>
+              </a:ext>
+            </a:extLst>
+          </p:cNvPr>
+          <p:cNvGraphicFramePr>
+            <a:graphicFrameLocks noChangeAspect="1"/>
+          </p:cNvGraphicFramePr>
+          <p:nvPr>
+            <p:extLst>
+              <p:ext uri="{D42A27DB-BD31-4B8C-83A1-F6EECF244321}">
+                <p14:modId xmlns:p14="http://schemas.microsoft.com/office/powerpoint/2010/main" val="2671002107"/>
+              </p:ext>
+            </p:extLst>
+          </p:nvPr>
+        </p:nvGraphicFramePr>
+        <p:xfrm>
+          <a:off x="2847057" y="4240804"/>
+          <a:ext cx="6230404" cy="1743462"/>
+        </p:xfrm>
+        <a:graphic>
+          <a:graphicData uri="http://schemas.openxmlformats.org/presentationml/2006/ole">
+            <mc:AlternateContent xmlns:mc="http://schemas.openxmlformats.org/markup-compatibility/2006">
+              <mc:Choice xmlns:v="urn:schemas-microsoft-com:vml" Requires="v">
+                <p:oleObj name="Documento" r:id="rId4" imgW="5765800" imgH="1612900" progId="Word.Document.12">
+                  <p:embed/>
+                </p:oleObj>
+              </mc:Choice>
+              <mc:Fallback>
+                <p:oleObj name="Documento" r:id="rId4" imgW="5765800" imgH="1612900" progId="Word.Document.12">
+                  <p:embed/>
+                  <p:pic>
+                    <p:nvPicPr>
+                      <p:cNvPr id="0" name=""/>
+                      <p:cNvPicPr/>
+                      <p:nvPr/>
+                    </p:nvPicPr>
+                    <p:blipFill>
+                      <a:blip r:embed="rId5"/>
+                      <a:stretch>
+                        <a:fillRect/>
+                      </a:stretch>
+                    </p:blipFill>
+                    <p:spPr>
+                      <a:xfrm>
+                        <a:off x="2847057" y="4240804"/>
+                        <a:ext cx="6230404" cy="1743462"/>
+                      </a:xfrm>
+                      <a:prstGeom prst="rect">
+                        <a:avLst/>
+                      </a:prstGeom>
+                    </p:spPr>
+                  </p:pic>
+                </p:oleObj>
+              </mc:Fallback>
+            </mc:AlternateContent>
+          </a:graphicData>
+        </a:graphic>
+      </p:graphicFrame>
       <p:sp>
         <p:nvSpPr>
-          <p:cNvPr id="10" name="Espaço Reservado para Conteúdo 2">
-            <a:extLst>
-              <a:ext uri="{FF2B5EF4-FFF2-40B4-BE49-F238E27FC236}">
-                <a16:creationId xmlns:a16="http://schemas.microsoft.com/office/drawing/2014/main" id="{A94475B3-8EC4-2979-A424-A7DD85A5625E}"/>
+          <p:cNvPr id="21" name="Espaço Reservado para Conteúdo 2">
+            <a:extLst>
+              <a:ext uri="{FF2B5EF4-FFF2-40B4-BE49-F238E27FC236}">
+                <a16:creationId xmlns:a16="http://schemas.microsoft.com/office/drawing/2014/main" id="{6803FC95-161C-CAB4-BA69-7452E48EBEBD}"/>
               </a:ext>
             </a:extLst>
           </p:cNvPr>
@@ -3804,8 +4458,8 @@
         </p:nvSpPr>
         <p:spPr>
           <a:xfrm>
-            <a:off x="6433868" y="4334256"/>
-            <a:ext cx="5454770" cy="959185"/>
+            <a:off x="2762653" y="5787689"/>
+            <a:ext cx="6399212" cy="686920"/>
           </a:xfrm>
           <a:prstGeom prst="rect">
             <a:avLst/>
@@ -3922,63 +4576,165 @@
           </a:lstStyle>
           <a:p>
             <a:r>
-              <a:rPr lang="pt-BR" dirty="0"/>
-              <a:t>Output gerado após a aplicação da técnica de concordância no livro Harry Potter e a Câmara Secreta, com os dados textuais </a:t>
-            </a:r>
-            <a:r>
-              <a:rPr lang="pt-BR" dirty="0" err="1"/>
-              <a:t>pré</a:t>
-            </a:r>
-            <a:r>
-              <a:rPr lang="pt-BR" dirty="0"/>
-              <a:t>-processados.</a:t>
+              <a:rPr lang="pt-BR" sz="1200" dirty="0"/>
+              <a:t>Tabela 2. Quantidade de palavras em cada fonte de dados, sem a aplicação da etapa de pré-processamento, e percentual de redução na frequência de palavras dos filmes se comparado com os livros.</a:t>
             </a:r>
             <a:br>
-              <a:rPr lang="pt-BR" dirty="0"/>
+              <a:rPr lang="pt-BR" sz="1200" dirty="0"/>
             </a:br>
             <a:r>
-              <a:rPr lang="pt-BR" b="1" dirty="0"/>
+              <a:rPr lang="pt-BR" sz="1200" b="1" dirty="0"/>
               <a:t>Fonte: Resultados originais da pesquisa </a:t>
             </a:r>
           </a:p>
         </p:txBody>
       </p:sp>
-      <p:pic>
-        <p:nvPicPr>
-          <p:cNvPr id="12" name="Picture 11" descr="A black text on a white background&#10;&#10;Description automatically generated with low confidence">
-            <a:extLst>
-              <a:ext uri="{FF2B5EF4-FFF2-40B4-BE49-F238E27FC236}">
-                <a16:creationId xmlns:a16="http://schemas.microsoft.com/office/drawing/2014/main" id="{309BC8B5-5C0A-1BE9-C1A0-58DCAD8C1B17}"/>
-              </a:ext>
-            </a:extLst>
-          </p:cNvPr>
-          <p:cNvPicPr>
-            <a:picLocks noChangeAspect="1"/>
-          </p:cNvPicPr>
+      <p:sp>
+        <p:nvSpPr>
+          <p:cNvPr id="23" name="Arrow: Pentagon 3">
+            <a:extLst>
+              <a:ext uri="{FF2B5EF4-FFF2-40B4-BE49-F238E27FC236}">
+                <a16:creationId xmlns:a16="http://schemas.microsoft.com/office/drawing/2014/main" id="{E9F98B70-513D-44F0-6160-546CB2810864}"/>
+              </a:ext>
+            </a:extLst>
+          </p:cNvPr>
+          <p:cNvSpPr/>
           <p:nvPr/>
-        </p:nvPicPr>
-        <p:blipFill>
-          <a:blip r:embed="rId4">
-            <a:extLst>
-              <a:ext uri="{28A0092B-C50C-407E-A947-70E740481C1C}">
-                <a14:useLocalDpi xmlns:a14="http://schemas.microsoft.com/office/drawing/2010/main" val="0"/>
-              </a:ext>
-            </a:extLst>
-          </a:blip>
-          <a:stretch>
-            <a:fillRect/>
-          </a:stretch>
-        </p:blipFill>
+        </p:nvSpPr>
         <p:spPr>
           <a:xfrm>
-            <a:off x="133636" y="4070672"/>
-            <a:ext cx="5441140" cy="1444752"/>
+            <a:off x="-1" y="383391"/>
+            <a:ext cx="4975200" cy="630000"/>
           </a:xfrm>
-          <a:prstGeom prst="rect">
+          <a:prstGeom prst="homePlate">
             <a:avLst/>
           </a:prstGeom>
+          <a:solidFill>
+            <a:schemeClr val="bg2">
+              <a:lumMod val="25000"/>
+              <a:alpha val="85000"/>
+            </a:schemeClr>
+          </a:solidFill>
         </p:spPr>
-      </p:pic>
+        <p:style>
+          <a:lnRef idx="1">
+            <a:schemeClr val="accent3"/>
+          </a:lnRef>
+          <a:fillRef idx="3">
+            <a:schemeClr val="accent3"/>
+          </a:fillRef>
+          <a:effectRef idx="2">
+            <a:schemeClr val="accent3"/>
+          </a:effectRef>
+          <a:fontRef idx="minor">
+            <a:schemeClr val="lt1"/>
+          </a:fontRef>
+        </p:style>
+        <p:txBody>
+          <a:bodyPr rtlCol="0" anchor="ctr"/>
+          <a:lstStyle/>
+          <a:p>
+            <a:pPr algn="ctr"/>
+            <a:r>
+              <a:rPr lang="pt-BR" sz="3200" dirty="0">
+                <a:solidFill>
+                  <a:schemeClr val="bg1"/>
+                </a:solidFill>
+              </a:rPr>
+              <a:t>RESULTADOS E DISCUSSÕES</a:t>
+            </a:r>
+          </a:p>
+        </p:txBody>
+      </p:sp>
+      <p:sp>
+        <p:nvSpPr>
+          <p:cNvPr id="24" name="Arrow: Pentagon 5">
+            <a:extLst>
+              <a:ext uri="{FF2B5EF4-FFF2-40B4-BE49-F238E27FC236}">
+                <a16:creationId xmlns:a16="http://schemas.microsoft.com/office/drawing/2014/main" id="{26CFECA4-16C7-9765-D1C8-BB1FFAC081E7}"/>
+              </a:ext>
+            </a:extLst>
+          </p:cNvPr>
+          <p:cNvSpPr/>
+          <p:nvPr/>
+        </p:nvSpPr>
+        <p:spPr>
+          <a:xfrm>
+            <a:off x="0" y="933967"/>
+            <a:ext cx="3205538" cy="370852"/>
+          </a:xfrm>
+          <a:prstGeom prst="homePlate">
+            <a:avLst/>
+          </a:prstGeom>
+          <a:solidFill>
+            <a:schemeClr val="bg2">
+              <a:lumMod val="75000"/>
+              <a:alpha val="90000"/>
+            </a:schemeClr>
+          </a:solidFill>
+        </p:spPr>
+        <p:style>
+          <a:lnRef idx="1">
+            <a:schemeClr val="accent3"/>
+          </a:lnRef>
+          <a:fillRef idx="3">
+            <a:schemeClr val="accent3"/>
+          </a:fillRef>
+          <a:effectRef idx="2">
+            <a:schemeClr val="accent3"/>
+          </a:effectRef>
+          <a:fontRef idx="minor">
+            <a:schemeClr val="lt1"/>
+          </a:fontRef>
+        </p:style>
+        <p:txBody>
+          <a:bodyPr rtlCol="0" anchor="ctr"/>
+          <a:lstStyle/>
+          <a:p>
+            <a:pPr algn="ctr"/>
+            <a:r>
+              <a:rPr lang="pt-BR" sz="2400" dirty="0">
+                <a:solidFill>
+                  <a:schemeClr val="bg2">
+                    <a:lumMod val="25000"/>
+                  </a:schemeClr>
+                </a:solidFill>
+              </a:rPr>
+              <a:t>LIVROS VS FILMES</a:t>
+            </a:r>
+          </a:p>
+        </p:txBody>
+      </p:sp>
+    </p:spTree>
+    <p:extLst>
+      <p:ext uri="{BB962C8B-B14F-4D97-AF65-F5344CB8AC3E}">
+        <p14:creationId xmlns:p14="http://schemas.microsoft.com/office/powerpoint/2010/main" val="3776773377"/>
+      </p:ext>
+    </p:extLst>
+  </p:cSld>
+  <p:clrMapOvr>
+    <a:masterClrMapping/>
+  </p:clrMapOvr>
+</p:sld>
+</file>
+
+<file path=ppt/slides/slide12.xml><?xml version="1.0" encoding="utf-8"?>
+<p:sld xmlns:a="http://schemas.openxmlformats.org/drawingml/2006/main" xmlns:r="http://schemas.openxmlformats.org/officeDocument/2006/relationships" xmlns:p="http://schemas.openxmlformats.org/presentationml/2006/main">
+  <p:cSld>
+    <p:spTree>
+      <p:nvGrpSpPr>
+        <p:cNvPr id="1" name=""/>
+        <p:cNvGrpSpPr/>
+        <p:nvPr/>
+      </p:nvGrpSpPr>
+      <p:grpSpPr>
+        <a:xfrm>
+          <a:off x="0" y="0"/>
+          <a:ext cx="0" cy="0"/>
+          <a:chOff x="0" y="0"/>
+          <a:chExt cx="0" cy="0"/>
+        </a:xfrm>
+      </p:grpSpPr>
       <p:sp>
         <p:nvSpPr>
           <p:cNvPr id="13" name="Espaço Reservado para Conteúdo 2">
@@ -3995,8 +4751,8 @@
         </p:nvSpPr>
         <p:spPr>
           <a:xfrm>
-            <a:off x="133636" y="5515424"/>
-            <a:ext cx="5441140" cy="959185"/>
+            <a:off x="2674936" y="3233045"/>
+            <a:ext cx="6573834" cy="613411"/>
           </a:xfrm>
           <a:prstGeom prst="rect">
             <a:avLst/>
@@ -4113,31 +4869,434 @@
           </a:lstStyle>
           <a:p>
             <a:r>
-              <a:rPr lang="pt-BR" dirty="0"/>
-              <a:t>Output gerado após a aplicação da técnica de bigramas no livro Harry Potter e a Câmara Secreta, com os dados textuais </a:t>
-            </a:r>
-            <a:r>
-              <a:rPr lang="pt-BR" dirty="0" err="1"/>
-              <a:t>pré</a:t>
-            </a:r>
-            <a:r>
-              <a:rPr lang="pt-BR" dirty="0"/>
-              <a:t>-processados.</a:t>
+              <a:rPr lang="pt-BR" sz="1200" dirty="0"/>
+              <a:t>Tabela 3. Percentual de “</a:t>
+            </a:r>
+            <a:r>
+              <a:rPr lang="pt-BR" sz="1200" dirty="0" err="1"/>
+              <a:t>stopwords</a:t>
+            </a:r>
+            <a:r>
+              <a:rPr lang="pt-BR" sz="1200" dirty="0"/>
+              <a:t>” e caracteres especiais removidos na base de dados relacionadas aos filmes, após a etapa de pré-processamento dos dados.</a:t>
             </a:r>
             <a:br>
-              <a:rPr lang="pt-BR" dirty="0"/>
+              <a:rPr lang="pt-BR" sz="1200" dirty="0"/>
             </a:br>
             <a:r>
-              <a:rPr lang="pt-BR" b="1" dirty="0"/>
+              <a:rPr lang="pt-BR" sz="1200" b="1" dirty="0"/>
               <a:t>Fonte: Resultados originais da pesquisa </a:t>
             </a:r>
+          </a:p>
+          <a:p>
+            <a:endParaRPr lang="pt-BR" sz="1200" dirty="0"/>
           </a:p>
         </p:txBody>
       </p:sp>
+      <p:sp>
+        <p:nvSpPr>
+          <p:cNvPr id="23" name="Arrow: Pentagon 3">
+            <a:extLst>
+              <a:ext uri="{FF2B5EF4-FFF2-40B4-BE49-F238E27FC236}">
+                <a16:creationId xmlns:a16="http://schemas.microsoft.com/office/drawing/2014/main" id="{E9F98B70-513D-44F0-6160-546CB2810864}"/>
+              </a:ext>
+            </a:extLst>
+          </p:cNvPr>
+          <p:cNvSpPr/>
+          <p:nvPr/>
+        </p:nvSpPr>
+        <p:spPr>
+          <a:xfrm>
+            <a:off x="-1" y="383391"/>
+            <a:ext cx="4975200" cy="630000"/>
+          </a:xfrm>
+          <a:prstGeom prst="homePlate">
+            <a:avLst/>
+          </a:prstGeom>
+          <a:solidFill>
+            <a:schemeClr val="bg2">
+              <a:lumMod val="25000"/>
+              <a:alpha val="85000"/>
+            </a:schemeClr>
+          </a:solidFill>
+        </p:spPr>
+        <p:style>
+          <a:lnRef idx="1">
+            <a:schemeClr val="accent3"/>
+          </a:lnRef>
+          <a:fillRef idx="3">
+            <a:schemeClr val="accent3"/>
+          </a:fillRef>
+          <a:effectRef idx="2">
+            <a:schemeClr val="accent3"/>
+          </a:effectRef>
+          <a:fontRef idx="minor">
+            <a:schemeClr val="lt1"/>
+          </a:fontRef>
+        </p:style>
+        <p:txBody>
+          <a:bodyPr rtlCol="0" anchor="ctr"/>
+          <a:lstStyle/>
+          <a:p>
+            <a:pPr algn="ctr"/>
+            <a:r>
+              <a:rPr lang="pt-BR" sz="3200" dirty="0">
+                <a:solidFill>
+                  <a:schemeClr val="bg1"/>
+                </a:solidFill>
+              </a:rPr>
+              <a:t>RESULTADOS E DISCUSSÕES</a:t>
+            </a:r>
+          </a:p>
+        </p:txBody>
+      </p:sp>
+      <p:sp>
+        <p:nvSpPr>
+          <p:cNvPr id="24" name="Arrow: Pentagon 5">
+            <a:extLst>
+              <a:ext uri="{FF2B5EF4-FFF2-40B4-BE49-F238E27FC236}">
+                <a16:creationId xmlns:a16="http://schemas.microsoft.com/office/drawing/2014/main" id="{26CFECA4-16C7-9765-D1C8-BB1FFAC081E7}"/>
+              </a:ext>
+            </a:extLst>
+          </p:cNvPr>
+          <p:cNvSpPr/>
+          <p:nvPr/>
+        </p:nvSpPr>
+        <p:spPr>
+          <a:xfrm>
+            <a:off x="0" y="933967"/>
+            <a:ext cx="3205538" cy="370852"/>
+          </a:xfrm>
+          <a:prstGeom prst="homePlate">
+            <a:avLst/>
+          </a:prstGeom>
+          <a:solidFill>
+            <a:schemeClr val="bg2">
+              <a:lumMod val="75000"/>
+              <a:alpha val="90000"/>
+            </a:schemeClr>
+          </a:solidFill>
+        </p:spPr>
+        <p:style>
+          <a:lnRef idx="1">
+            <a:schemeClr val="accent3"/>
+          </a:lnRef>
+          <a:fillRef idx="3">
+            <a:schemeClr val="accent3"/>
+          </a:fillRef>
+          <a:effectRef idx="2">
+            <a:schemeClr val="accent3"/>
+          </a:effectRef>
+          <a:fontRef idx="minor">
+            <a:schemeClr val="lt1"/>
+          </a:fontRef>
+        </p:style>
+        <p:txBody>
+          <a:bodyPr rtlCol="0" anchor="ctr"/>
+          <a:lstStyle/>
+          <a:p>
+            <a:pPr algn="ctr"/>
+            <a:r>
+              <a:rPr lang="pt-BR" sz="2400" dirty="0">
+                <a:solidFill>
+                  <a:schemeClr val="bg2">
+                    <a:lumMod val="25000"/>
+                  </a:schemeClr>
+                </a:solidFill>
+              </a:rPr>
+              <a:t>LIVROS VS FILMES</a:t>
+            </a:r>
+          </a:p>
+        </p:txBody>
+      </p:sp>
+      <p:sp>
+        <p:nvSpPr>
+          <p:cNvPr id="5" name="Espaço Reservado para Conteúdo 2">
+            <a:extLst>
+              <a:ext uri="{FF2B5EF4-FFF2-40B4-BE49-F238E27FC236}">
+                <a16:creationId xmlns:a16="http://schemas.microsoft.com/office/drawing/2014/main" id="{5B25CF76-5B36-0732-938A-521C11FCBFC1}"/>
+              </a:ext>
+            </a:extLst>
+          </p:cNvPr>
+          <p:cNvSpPr txBox="1">
+            <a:spLocks/>
+          </p:cNvSpPr>
+          <p:nvPr/>
+        </p:nvSpPr>
+        <p:spPr>
+          <a:xfrm>
+            <a:off x="2672945" y="6015310"/>
+            <a:ext cx="6573834" cy="613411"/>
+          </a:xfrm>
+          <a:prstGeom prst="rect">
+            <a:avLst/>
+          </a:prstGeom>
+        </p:spPr>
+        <p:txBody>
+          <a:bodyPr vert="horz" lIns="91440" tIns="45720" rIns="91440" bIns="45720" rtlCol="0">
+            <a:noAutofit/>
+          </a:bodyPr>
+          <a:lstStyle>
+            <a:defPPr>
+              <a:defRPr lang="pt-BR"/>
+            </a:defPPr>
+            <a:lvl1pPr indent="0">
+              <a:lnSpc>
+                <a:spcPct val="90000"/>
+              </a:lnSpc>
+              <a:spcBef>
+                <a:spcPts val="1000"/>
+              </a:spcBef>
+              <a:buFont typeface="Arial" panose="020B0604020202020204" pitchFamily="34" charset="0"/>
+              <a:buNone/>
+              <a:defRPr sz="1600">
+                <a:solidFill>
+                  <a:schemeClr val="bg2">
+                    <a:lumMod val="25000"/>
+                  </a:schemeClr>
+                </a:solidFill>
+                <a:cs typeface="Arial" panose="020B0604020202020204" pitchFamily="34" charset="0"/>
+              </a:defRPr>
+            </a:lvl1pPr>
+            <a:lvl2pPr marL="685800" indent="-228600">
+              <a:lnSpc>
+                <a:spcPct val="90000"/>
+              </a:lnSpc>
+              <a:spcBef>
+                <a:spcPts val="500"/>
+              </a:spcBef>
+              <a:buFont typeface="Arial" panose="020B0604020202020204" pitchFamily="34" charset="0"/>
+              <a:buChar char="•"/>
+              <a:defRPr sz="2400"/>
+            </a:lvl2pPr>
+            <a:lvl3pPr marL="1143000" indent="-228600">
+              <a:lnSpc>
+                <a:spcPct val="90000"/>
+              </a:lnSpc>
+              <a:spcBef>
+                <a:spcPts val="500"/>
+              </a:spcBef>
+              <a:buFont typeface="Arial" panose="020B0604020202020204" pitchFamily="34" charset="0"/>
+              <a:buChar char="•"/>
+              <a:defRPr sz="2000"/>
+            </a:lvl3pPr>
+            <a:lvl4pPr marL="1600200" indent="-228600">
+              <a:lnSpc>
+                <a:spcPct val="90000"/>
+              </a:lnSpc>
+              <a:spcBef>
+                <a:spcPts val="500"/>
+              </a:spcBef>
+              <a:buFont typeface="Arial" panose="020B0604020202020204" pitchFamily="34" charset="0"/>
+              <a:buChar char="•"/>
+            </a:lvl4pPr>
+            <a:lvl5pPr marL="2057400" indent="-228600">
+              <a:lnSpc>
+                <a:spcPct val="90000"/>
+              </a:lnSpc>
+              <a:spcBef>
+                <a:spcPts val="500"/>
+              </a:spcBef>
+              <a:buFont typeface="Arial" panose="020B0604020202020204" pitchFamily="34" charset="0"/>
+              <a:buChar char="•"/>
+            </a:lvl5pPr>
+            <a:lvl6pPr marL="2514600" indent="-228600">
+              <a:lnSpc>
+                <a:spcPct val="90000"/>
+              </a:lnSpc>
+              <a:spcBef>
+                <a:spcPts val="500"/>
+              </a:spcBef>
+              <a:buFont typeface="Arial" panose="020B0604020202020204" pitchFamily="34" charset="0"/>
+              <a:buChar char="•"/>
+            </a:lvl6pPr>
+            <a:lvl7pPr marL="2971800" indent="-228600">
+              <a:lnSpc>
+                <a:spcPct val="90000"/>
+              </a:lnSpc>
+              <a:spcBef>
+                <a:spcPts val="500"/>
+              </a:spcBef>
+              <a:buFont typeface="Arial" panose="020B0604020202020204" pitchFamily="34" charset="0"/>
+              <a:buChar char="•"/>
+            </a:lvl7pPr>
+            <a:lvl8pPr marL="3429000" indent="-228600">
+              <a:lnSpc>
+                <a:spcPct val="90000"/>
+              </a:lnSpc>
+              <a:spcBef>
+                <a:spcPts val="500"/>
+              </a:spcBef>
+              <a:buFont typeface="Arial" panose="020B0604020202020204" pitchFamily="34" charset="0"/>
+              <a:buChar char="•"/>
+            </a:lvl8pPr>
+            <a:lvl9pPr marL="3886200" indent="-228600">
+              <a:lnSpc>
+                <a:spcPct val="90000"/>
+              </a:lnSpc>
+              <a:spcBef>
+                <a:spcPts val="500"/>
+              </a:spcBef>
+              <a:buFont typeface="Arial" panose="020B0604020202020204" pitchFamily="34" charset="0"/>
+              <a:buChar char="•"/>
+            </a:lvl9pPr>
+          </a:lstStyle>
+          <a:p>
+            <a:r>
+              <a:rPr lang="pt-BR" sz="1200" dirty="0"/>
+              <a:t>Tabela 4. Percentual de “</a:t>
+            </a:r>
+            <a:r>
+              <a:rPr lang="pt-BR" sz="1200" dirty="0" err="1"/>
+              <a:t>stopwords</a:t>
+            </a:r>
+            <a:r>
+              <a:rPr lang="pt-BR" sz="1200" dirty="0"/>
+              <a:t>” e caracteres especiais removidos na base de dados relacionadas aos livros, após a etapa de pré-processamento dos dados.</a:t>
+            </a:r>
+            <a:br>
+              <a:rPr lang="pt-BR" sz="1200" dirty="0"/>
+            </a:br>
+            <a:r>
+              <a:rPr lang="pt-BR" sz="1200" b="1" dirty="0"/>
+              <a:t>Fonte: Resultados originais da pesquisa </a:t>
+            </a:r>
+          </a:p>
+          <a:p>
+            <a:endParaRPr lang="pt-BR" sz="1200" dirty="0"/>
+          </a:p>
+        </p:txBody>
+      </p:sp>
+      <p:graphicFrame>
+        <p:nvGraphicFramePr>
+          <p:cNvPr id="7" name="Objeto 6">
+            <a:extLst>
+              <a:ext uri="{FF2B5EF4-FFF2-40B4-BE49-F238E27FC236}">
+                <a16:creationId xmlns:a16="http://schemas.microsoft.com/office/drawing/2014/main" id="{4812CFF6-40A0-5E2F-64C5-9CCF43CAD358}"/>
+              </a:ext>
+            </a:extLst>
+          </p:cNvPr>
+          <p:cNvGraphicFramePr>
+            <a:graphicFrameLocks noChangeAspect="1"/>
+          </p:cNvGraphicFramePr>
+          <p:nvPr>
+            <p:extLst>
+              <p:ext uri="{D42A27DB-BD31-4B8C-83A1-F6EECF244321}">
+                <p14:modId xmlns:p14="http://schemas.microsoft.com/office/powerpoint/2010/main" val="685863674"/>
+              </p:ext>
+            </p:extLst>
+          </p:nvPr>
+        </p:nvGraphicFramePr>
+        <p:xfrm>
+          <a:off x="2674936" y="1363549"/>
+          <a:ext cx="6573834" cy="2042478"/>
+        </p:xfrm>
+        <a:graphic>
+          <a:graphicData uri="http://schemas.openxmlformats.org/presentationml/2006/ole">
+            <mc:AlternateContent xmlns:mc="http://schemas.openxmlformats.org/markup-compatibility/2006">
+              <mc:Choice xmlns:v="urn:schemas-microsoft-com:vml" Requires="v">
+                <p:oleObj name="Documento" r:id="rId2" imgW="5765800" imgH="1790700" progId="Word.Document.12">
+                  <p:embed/>
+                </p:oleObj>
+              </mc:Choice>
+              <mc:Fallback>
+                <p:oleObj name="Documento" r:id="rId2" imgW="5765800" imgH="1790700" progId="Word.Document.12">
+                  <p:embed/>
+                  <p:pic>
+                    <p:nvPicPr>
+                      <p:cNvPr id="0" name=""/>
+                      <p:cNvPicPr/>
+                      <p:nvPr/>
+                    </p:nvPicPr>
+                    <p:blipFill>
+                      <a:blip r:embed="rId3"/>
+                      <a:stretch>
+                        <a:fillRect/>
+                      </a:stretch>
+                    </p:blipFill>
+                    <p:spPr>
+                      <a:xfrm>
+                        <a:off x="2674936" y="1363549"/>
+                        <a:ext cx="6573834" cy="2042478"/>
+                      </a:xfrm>
+                      <a:prstGeom prst="rect">
+                        <a:avLst/>
+                      </a:prstGeom>
+                    </p:spPr>
+                  </p:pic>
+                </p:oleObj>
+              </mc:Fallback>
+            </mc:AlternateContent>
+          </a:graphicData>
+        </a:graphic>
+      </p:graphicFrame>
+      <p:graphicFrame>
+        <p:nvGraphicFramePr>
+          <p:cNvPr id="8" name="Objeto 7">
+            <a:extLst>
+              <a:ext uri="{FF2B5EF4-FFF2-40B4-BE49-F238E27FC236}">
+                <a16:creationId xmlns:a16="http://schemas.microsoft.com/office/drawing/2014/main" id="{76B9410B-F7A8-593F-C338-263FE71C5ACF}"/>
+              </a:ext>
+            </a:extLst>
+          </p:cNvPr>
+          <p:cNvGraphicFramePr>
+            <a:graphicFrameLocks noChangeAspect="1"/>
+          </p:cNvGraphicFramePr>
+          <p:nvPr>
+            <p:extLst>
+              <p:ext uri="{D42A27DB-BD31-4B8C-83A1-F6EECF244321}">
+                <p14:modId xmlns:p14="http://schemas.microsoft.com/office/powerpoint/2010/main" val="4254918467"/>
+              </p:ext>
+            </p:extLst>
+          </p:nvPr>
+        </p:nvGraphicFramePr>
+        <p:xfrm>
+          <a:off x="2672945" y="4156606"/>
+          <a:ext cx="6575825" cy="2042479"/>
+        </p:xfrm>
+        <a:graphic>
+          <a:graphicData uri="http://schemas.openxmlformats.org/presentationml/2006/ole">
+            <mc:AlternateContent xmlns:mc="http://schemas.openxmlformats.org/markup-compatibility/2006">
+              <mc:Choice xmlns:v="urn:schemas-microsoft-com:vml" Requires="v">
+                <p:oleObj name="Documento" r:id="rId4" imgW="5765800" imgH="1790700" progId="Word.Document.12">
+                  <p:embed/>
+                </p:oleObj>
+              </mc:Choice>
+              <mc:Fallback>
+                <p:oleObj name="Documento" r:id="rId4" imgW="5765800" imgH="1790700" progId="Word.Document.12">
+                  <p:embed/>
+                  <p:pic>
+                    <p:nvPicPr>
+                      <p:cNvPr id="0" name=""/>
+                      <p:cNvPicPr/>
+                      <p:nvPr/>
+                    </p:nvPicPr>
+                    <p:blipFill>
+                      <a:blip r:embed="rId5"/>
+                      <a:stretch>
+                        <a:fillRect/>
+                      </a:stretch>
+                    </p:blipFill>
+                    <p:spPr>
+                      <a:xfrm>
+                        <a:off x="2672945" y="4156606"/>
+                        <a:ext cx="6575825" cy="2042479"/>
+                      </a:xfrm>
+                      <a:prstGeom prst="rect">
+                        <a:avLst/>
+                      </a:prstGeom>
+                    </p:spPr>
+                  </p:pic>
+                </p:oleObj>
+              </mc:Fallback>
+            </mc:AlternateContent>
+          </a:graphicData>
+        </a:graphic>
+      </p:graphicFrame>
     </p:spTree>
     <p:extLst>
       <p:ext uri="{BB962C8B-B14F-4D97-AF65-F5344CB8AC3E}">
-        <p14:creationId xmlns:p14="http://schemas.microsoft.com/office/powerpoint/2010/main" val="3513648849"/>
+        <p14:creationId xmlns:p14="http://schemas.microsoft.com/office/powerpoint/2010/main" val="3090478973"/>
       </p:ext>
     </p:extLst>
   </p:cSld>
@@ -4188,13 +5347,13 @@
         </p:spPr>
         <p:txBody>
           <a:bodyPr>
-            <a:normAutofit fontScale="92500" lnSpcReduction="20000"/>
+            <a:normAutofit/>
           </a:bodyPr>
           <a:lstStyle/>
           <a:p>
             <a:pPr algn="just"/>
             <a:r>
-              <a:rPr lang="pt-BR" sz="2400" dirty="0">
+              <a:rPr lang="pt-BR" sz="1600" dirty="0">
                 <a:solidFill>
                   <a:schemeClr val="bg2">
                     <a:lumMod val="25000"/>
@@ -4209,7 +5368,7 @@
             <a:pPr marL="0" indent="0" algn="just">
               <a:buNone/>
             </a:pPr>
-            <a:endParaRPr lang="pt-BR" sz="2400" dirty="0">
+            <a:endParaRPr lang="pt-BR" sz="1600" dirty="0">
               <a:solidFill>
                 <a:schemeClr val="bg2">
                   <a:lumMod val="25000"/>
@@ -4221,7 +5380,7 @@
           <a:p>
             <a:pPr algn="just"/>
             <a:r>
-              <a:rPr lang="pt-BR" sz="2400" dirty="0">
+              <a:rPr lang="pt-BR" sz="1600" dirty="0">
                 <a:solidFill>
                   <a:schemeClr val="bg2">
                     <a:lumMod val="25000"/>
@@ -4238,7 +5397,7 @@
               <a:buAutoNum type="alphaLcPeriod"/>
             </a:pPr>
             <a:r>
-              <a:rPr lang="pt-BR" dirty="0">
+              <a:rPr lang="pt-BR" sz="1600" dirty="0">
                 <a:solidFill>
                   <a:schemeClr val="bg2">
                     <a:lumMod val="25000"/>
@@ -4255,7 +5414,7 @@
               <a:buAutoNum type="alphaLcPeriod"/>
             </a:pPr>
             <a:r>
-              <a:rPr lang="pt-BR" dirty="0">
+              <a:rPr lang="pt-BR" sz="1600" dirty="0">
                 <a:solidFill>
                   <a:schemeClr val="bg2">
                     <a:lumMod val="25000"/>
@@ -4272,7 +5431,7 @@
               <a:buAutoNum type="alphaLcPeriod"/>
             </a:pPr>
             <a:r>
-              <a:rPr lang="pt-BR" dirty="0">
+              <a:rPr lang="pt-BR" sz="1600" dirty="0">
                 <a:solidFill>
                   <a:schemeClr val="bg2">
                     <a:lumMod val="25000"/>
@@ -4289,7 +5448,7 @@
               <a:buAutoNum type="alphaLcPeriod"/>
             </a:pPr>
             <a:r>
-              <a:rPr lang="pt-BR" dirty="0">
+              <a:rPr lang="pt-BR" sz="1600" dirty="0">
                 <a:solidFill>
                   <a:schemeClr val="bg2">
                     <a:lumMod val="25000"/>
@@ -4302,7 +5461,7 @@
           </a:p>
           <a:p>
             <a:pPr lvl="1" algn="just"/>
-            <a:endParaRPr lang="pt-BR" dirty="0">
+            <a:endParaRPr lang="pt-BR" sz="1600" dirty="0">
               <a:solidFill>
                 <a:schemeClr val="bg2">
                   <a:lumMod val="25000"/>
@@ -4314,7 +5473,7 @@
           <a:p>
             <a:pPr algn="just"/>
             <a:r>
-              <a:rPr lang="pt-BR" sz="2400" dirty="0">
+              <a:rPr lang="pt-BR" sz="1600" dirty="0">
                 <a:solidFill>
                   <a:schemeClr val="bg2">
                     <a:lumMod val="25000"/>
@@ -4472,7 +5631,7 @@
         <p:spPr>
           <a:xfrm>
             <a:off x="0" y="359450"/>
-            <a:ext cx="5961600" cy="905773"/>
+            <a:ext cx="4975200" cy="626869"/>
           </a:xfrm>
           <a:prstGeom prst="homePlate">
             <a:avLst/>
@@ -4568,13 +5727,13 @@
         </p:spPr>
         <p:txBody>
           <a:bodyPr>
-            <a:normAutofit lnSpcReduction="10000"/>
+            <a:normAutofit/>
           </a:bodyPr>
           <a:lstStyle/>
           <a:p>
             <a:pPr algn="just"/>
             <a:r>
-              <a:rPr lang="pt-BR" sz="1800" dirty="0">
+              <a:rPr lang="pt-BR" sz="1600" dirty="0">
                 <a:solidFill>
                   <a:schemeClr val="bg2">
                     <a:lumMod val="25000"/>
@@ -4587,7 +5746,7 @@
           <a:p>
             <a:pPr algn="just"/>
             <a:r>
-              <a:rPr lang="pt-BR" sz="1800" dirty="0">
+              <a:rPr lang="pt-BR" sz="1600" dirty="0">
                 <a:solidFill>
                   <a:schemeClr val="bg2">
                     <a:lumMod val="25000"/>
@@ -4600,7 +5759,7 @@
           <a:p>
             <a:pPr marL="666750" lvl="1" algn="just"/>
             <a:r>
-              <a:rPr lang="pt-BR" sz="1800" dirty="0">
+              <a:rPr lang="pt-BR" sz="1600" dirty="0">
                 <a:solidFill>
                   <a:schemeClr val="bg2">
                     <a:lumMod val="25000"/>
@@ -4613,7 +5772,7 @@
           <a:p>
             <a:pPr marL="666750" lvl="1" algn="just"/>
             <a:r>
-              <a:rPr lang="pt-BR" sz="1800" dirty="0">
+              <a:rPr lang="pt-BR" sz="1600" dirty="0">
                 <a:solidFill>
                   <a:schemeClr val="bg2">
                     <a:lumMod val="25000"/>
@@ -4626,7 +5785,7 @@
           <a:p>
             <a:pPr marL="666750" lvl="1" algn="just"/>
             <a:r>
-              <a:rPr lang="pt-BR" sz="1800" dirty="0">
+              <a:rPr lang="pt-BR" sz="1600" dirty="0">
                 <a:solidFill>
                   <a:schemeClr val="bg2">
                     <a:lumMod val="25000"/>
@@ -4639,7 +5798,7 @@
           <a:p>
             <a:pPr marL="666750" lvl="1" algn="just"/>
             <a:r>
-              <a:rPr lang="pt-BR" sz="1800" dirty="0">
+              <a:rPr lang="pt-BR" sz="1600" dirty="0">
                 <a:solidFill>
                   <a:schemeClr val="bg2">
                     <a:lumMod val="25000"/>
@@ -4652,7 +5811,7 @@
           <a:p>
             <a:pPr marL="666750" lvl="1" algn="just"/>
             <a:r>
-              <a:rPr lang="pt-BR" sz="1800" dirty="0">
+              <a:rPr lang="pt-BR" sz="1600" dirty="0">
                 <a:solidFill>
                   <a:schemeClr val="bg2">
                     <a:lumMod val="25000"/>
@@ -4666,7 +5825,7 @@
             <a:pPr marL="457200" lvl="1" indent="0" algn="just">
               <a:buNone/>
             </a:pPr>
-            <a:endParaRPr lang="pt-BR" sz="1800" dirty="0">
+            <a:endParaRPr lang="pt-BR" sz="1600" dirty="0">
               <a:solidFill>
                 <a:schemeClr val="bg2">
                   <a:lumMod val="25000"/>
@@ -4680,7 +5839,7 @@
               <a:buChar char="Ø"/>
             </a:pPr>
             <a:r>
-              <a:rPr lang="pt-BR" sz="1800" b="1" dirty="0">
+              <a:rPr lang="pt-BR" sz="1600" b="1" dirty="0">
                 <a:solidFill>
                   <a:schemeClr val="bg2">
                     <a:lumMod val="25000"/>
@@ -4690,7 +5849,7 @@
               <a:t>O objetivo deste trabalho é utilizar técnicas de processamento de linguagem natural nos “</a:t>
             </a:r>
             <a:r>
-              <a:rPr lang="pt-BR" sz="1800" b="1" dirty="0" err="1">
+              <a:rPr lang="pt-BR" sz="1600" b="1" dirty="0" err="1">
                 <a:solidFill>
                   <a:schemeClr val="bg2">
                     <a:lumMod val="25000"/>
@@ -4700,7 +5859,7 @@
               <a:t>datasets</a:t>
             </a:r>
             <a:r>
-              <a:rPr lang="pt-BR" sz="1800" b="1" dirty="0">
+              <a:rPr lang="pt-BR" sz="1600" b="1" dirty="0">
                 <a:solidFill>
                   <a:schemeClr val="bg2">
                     <a:lumMod val="25000"/>
@@ -4727,7 +5886,7 @@
         <p:spPr>
           <a:xfrm>
             <a:off x="0" y="383391"/>
-            <a:ext cx="5961600" cy="905773"/>
+            <a:ext cx="4975200" cy="630000"/>
           </a:xfrm>
           <a:prstGeom prst="homePlate">
             <a:avLst/>
@@ -4973,13 +6132,13 @@
         </p:nvSpPr>
         <p:spPr>
           <a:xfrm>
-            <a:off x="6531429" y="1679508"/>
-            <a:ext cx="5207583" cy="3676263"/>
+            <a:off x="6531429" y="2006079"/>
+            <a:ext cx="5207583" cy="2810299"/>
           </a:xfrm>
         </p:spPr>
         <p:txBody>
           <a:bodyPr>
-            <a:normAutofit/>
+            <a:noAutofit/>
           </a:bodyPr>
           <a:lstStyle/>
           <a:p>
@@ -4987,7 +6146,7 @@
               <a:buNone/>
             </a:pPr>
             <a:r>
-              <a:rPr lang="pt-BR" sz="1600" dirty="0">
+              <a:rPr lang="pt-BR" sz="1400" dirty="0">
                 <a:solidFill>
                   <a:schemeClr val="bg2">
                     <a:lumMod val="25000"/>
@@ -4999,7 +6158,7 @@
               <a:t>NLTK é uma plataforma que trabalha com as diversas técnicas de processamento estatístico de linguagem natural, facilitando a implementação dessas ferramentas em diversos “softwares”. A plataforma possui recursos léxicos e disponibiliza bibliotecas de processamento de textos para </a:t>
             </a:r>
             <a:r>
-              <a:rPr lang="pt-BR" sz="1600" dirty="0" err="1">
+              <a:rPr lang="pt-BR" sz="1400" dirty="0" err="1">
                 <a:solidFill>
                   <a:schemeClr val="bg2">
                     <a:lumMod val="25000"/>
@@ -5011,7 +6170,7 @@
               <a:t>tokenização</a:t>
             </a:r>
             <a:r>
-              <a:rPr lang="pt-BR" sz="1600" dirty="0">
+              <a:rPr lang="pt-BR" sz="1400" dirty="0">
                 <a:solidFill>
                   <a:schemeClr val="bg2">
                     <a:lumMod val="25000"/>
@@ -5023,7 +6182,7 @@
               <a:t>, classificação, “</a:t>
             </a:r>
             <a:r>
-              <a:rPr lang="pt-BR" sz="1600" dirty="0" err="1">
+              <a:rPr lang="pt-BR" sz="1400" dirty="0" err="1">
                 <a:solidFill>
                   <a:schemeClr val="bg2">
                     <a:lumMod val="25000"/>
@@ -5035,7 +6194,7 @@
               <a:t>stemming</a:t>
             </a:r>
             <a:r>
-              <a:rPr lang="pt-BR" sz="1600" dirty="0">
+              <a:rPr lang="pt-BR" sz="1400" dirty="0">
                 <a:solidFill>
                   <a:schemeClr val="bg2">
                     <a:lumMod val="25000"/>
@@ -5047,7 +6206,7 @@
               <a:t>”, análise de raciocínio semântico, e um fórum ativo de discussão (Bird et al., 2009). Para acessar todos os recursos da biblioteca, foi utilizado a linguagem de programação </a:t>
             </a:r>
             <a:r>
-              <a:rPr lang="pt-BR" sz="1600" dirty="0" err="1">
+              <a:rPr lang="pt-BR" sz="1400" dirty="0" err="1">
                 <a:solidFill>
                   <a:schemeClr val="bg2">
                     <a:lumMod val="25000"/>
@@ -5059,7 +6218,7 @@
               <a:t>python</a:t>
             </a:r>
             <a:r>
-              <a:rPr lang="pt-BR" sz="1600" dirty="0">
+              <a:rPr lang="pt-BR" sz="1400" dirty="0">
                 <a:solidFill>
                   <a:schemeClr val="bg2">
                     <a:lumMod val="25000"/>
@@ -5075,7 +6234,7 @@
             <a:pPr marL="0" indent="0" algn="just">
               <a:buNone/>
             </a:pPr>
-            <a:endParaRPr lang="pt-BR" sz="1600" b="1" dirty="0">
+            <a:endParaRPr lang="pt-BR" sz="1400" b="1" dirty="0">
               <a:solidFill>
                 <a:schemeClr val="bg2">
                   <a:lumMod val="25000"/>
@@ -5090,7 +6249,7 @@
               <a:buNone/>
             </a:pPr>
             <a:r>
-              <a:rPr lang="pt-BR" sz="1600" dirty="0">
+              <a:rPr lang="pt-BR" sz="1400" dirty="0">
                 <a:solidFill>
                   <a:schemeClr val="bg2">
                     <a:lumMod val="25000"/>
@@ -5102,7 +6261,7 @@
               <a:t>O desenvolvimento dos scripts foram realizados utilizando a plataforma Google </a:t>
             </a:r>
             <a:r>
-              <a:rPr lang="pt-BR" sz="1600" dirty="0" err="1">
+              <a:rPr lang="pt-BR" sz="1400" dirty="0" err="1">
                 <a:solidFill>
                   <a:schemeClr val="bg2">
                     <a:lumMod val="25000"/>
@@ -5114,7 +6273,7 @@
               <a:t>Colab</a:t>
             </a:r>
             <a:r>
-              <a:rPr lang="pt-BR" sz="1600" dirty="0">
+              <a:rPr lang="pt-BR" sz="1400" dirty="0">
                 <a:solidFill>
                   <a:schemeClr val="bg2">
                     <a:lumMod val="25000"/>
@@ -5126,7 +6285,7 @@
               <a:t>, onde é possível criar </a:t>
             </a:r>
             <a:r>
-              <a:rPr lang="pt-BR" sz="1600" dirty="0" err="1">
+              <a:rPr lang="pt-BR" sz="1400" dirty="0" err="1">
                 <a:solidFill>
                   <a:schemeClr val="bg2">
                     <a:lumMod val="25000"/>
@@ -5138,7 +6297,7 @@
               <a:t>Jupyter</a:t>
             </a:r>
             <a:r>
-              <a:rPr lang="pt-BR" sz="1600" dirty="0">
+              <a:rPr lang="pt-BR" sz="1400" dirty="0">
                 <a:solidFill>
                   <a:schemeClr val="bg2">
                     <a:lumMod val="25000"/>
@@ -5150,7 +6309,7 @@
               <a:t> Notebooks em </a:t>
             </a:r>
             <a:r>
-              <a:rPr lang="pt-BR" sz="1600" dirty="0" err="1">
+              <a:rPr lang="pt-BR" sz="1400" dirty="0" err="1">
                 <a:solidFill>
                   <a:schemeClr val="bg2">
                     <a:lumMod val="25000"/>
@@ -5162,7 +6321,7 @@
               <a:t>python</a:t>
             </a:r>
             <a:r>
-              <a:rPr lang="pt-BR" sz="1600" dirty="0">
+              <a:rPr lang="pt-BR" sz="1400" dirty="0">
                 <a:solidFill>
                   <a:schemeClr val="bg2">
                     <a:lumMod val="25000"/>
@@ -5191,7 +6350,7 @@
         <p:spPr>
           <a:xfrm>
             <a:off x="-1" y="383391"/>
-            <a:ext cx="5961600" cy="905773"/>
+            <a:ext cx="4975200" cy="630000"/>
           </a:xfrm>
           <a:prstGeom prst="homePlate">
             <a:avLst/>
@@ -5223,7 +6382,7 @@
           <a:p>
             <a:pPr algn="ctr"/>
             <a:r>
-              <a:rPr lang="pt-BR" sz="4000" dirty="0">
+              <a:rPr lang="pt-BR" sz="3200" dirty="0">
                 <a:solidFill>
                   <a:schemeClr val="bg1"/>
                 </a:solidFill>
@@ -5247,8 +6406,8 @@
         </p:nvSpPr>
         <p:spPr>
           <a:xfrm>
-            <a:off x="452988" y="2006079"/>
-            <a:ext cx="5643012" cy="3023119"/>
+            <a:off x="452988" y="2006080"/>
+            <a:ext cx="5643012" cy="1877551"/>
           </a:xfrm>
           <a:prstGeom prst="rect">
             <a:avLst/>
@@ -5283,7 +6442,7 @@
           </a:fontRef>
         </p:style>
         <p:txBody>
-          <a:bodyPr vert="horz" lIns="91440" tIns="45720" rIns="91440" bIns="45720" rtlCol="0" anchor="ctr" anchorCtr="0">
+          <a:bodyPr vert="horz" lIns="91440" tIns="360000" rIns="91440" bIns="45720" rtlCol="0" anchor="ctr" anchorCtr="0">
             <a:noAutofit/>
           </a:bodyPr>
           <a:lstStyle/>
@@ -5299,7 +6458,7 @@
               <a:buChar char="•"/>
             </a:pPr>
             <a:r>
-              <a:rPr lang="pt-BR" sz="1600" dirty="0">
+              <a:rPr lang="pt-BR" sz="1400" dirty="0">
                 <a:solidFill>
                   <a:schemeClr val="bg2">
                     <a:lumMod val="10000"/>
@@ -5311,7 +6470,7 @@
               <a:t>A estratégia de pesquisa utilizada no desenvolvimento deste projeto será exploratória, visando apresentar de forma clara e concisa, didática e prática, a implementação das técnicas de processamento de linguagem natural disponibilizadas pela biblioteca “Natural </a:t>
             </a:r>
             <a:r>
-              <a:rPr lang="pt-BR" sz="1600" dirty="0" err="1">
+              <a:rPr lang="pt-BR" sz="1400" dirty="0" err="1">
                 <a:solidFill>
                   <a:schemeClr val="bg2">
                     <a:lumMod val="10000"/>
@@ -5323,7 +6482,7 @@
               <a:t>Language</a:t>
             </a:r>
             <a:r>
-              <a:rPr lang="pt-BR" sz="1600" dirty="0">
+              <a:rPr lang="pt-BR" sz="1400" dirty="0">
                 <a:solidFill>
                   <a:schemeClr val="bg2">
                     <a:lumMod val="10000"/>
@@ -5346,7 +6505,7 @@
               <a:buFont typeface="Arial" panose="020B0604020202020204" pitchFamily="34" charset="0"/>
               <a:buChar char="•"/>
             </a:pPr>
-            <a:endParaRPr lang="pt-BR" sz="1600" b="1" dirty="0">
+            <a:endParaRPr lang="pt-BR" sz="1400" b="1" dirty="0">
               <a:solidFill>
                 <a:schemeClr val="bg2">
                   <a:lumMod val="10000"/>
@@ -5403,7 +6562,7 @@
         <p:spPr>
           <a:xfrm>
             <a:off x="-1" y="383391"/>
-            <a:ext cx="5962261" cy="905773"/>
+            <a:ext cx="4975200" cy="630000"/>
           </a:xfrm>
           <a:prstGeom prst="homePlate">
             <a:avLst/>
@@ -5435,7 +6594,7 @@
           <a:p>
             <a:pPr algn="ctr"/>
             <a:r>
-              <a:rPr lang="pt-BR" sz="4000" dirty="0">
+              <a:rPr lang="pt-BR" sz="3200" dirty="0">
                 <a:solidFill>
                   <a:schemeClr val="bg1"/>
                 </a:solidFill>
@@ -5459,8 +6618,8 @@
         </p:nvSpPr>
         <p:spPr>
           <a:xfrm>
-            <a:off x="-1" y="1170272"/>
-            <a:ext cx="4450704" cy="453255"/>
+            <a:off x="0" y="933967"/>
+            <a:ext cx="3205538" cy="370852"/>
           </a:xfrm>
           <a:prstGeom prst="homePlate">
             <a:avLst/>
@@ -5492,7 +6651,7 @@
           <a:p>
             <a:pPr algn="ctr"/>
             <a:r>
-              <a:rPr lang="pt-BR" sz="2800" dirty="0">
+              <a:rPr lang="pt-BR" sz="2400" dirty="0">
                 <a:solidFill>
                   <a:schemeClr val="bg2">
                     <a:lumMod val="25000"/>
@@ -5969,7 +7128,7 @@
         </p:spPr>
         <p:txBody>
           <a:bodyPr vert="horz" lIns="91440" tIns="45720" rIns="91440" bIns="45720" rtlCol="0">
-            <a:normAutofit fontScale="92500" lnSpcReduction="20000"/>
+            <a:noAutofit/>
           </a:bodyPr>
           <a:lstStyle>
             <a:lvl1pPr marL="228600" indent="-228600" algn="l" defTabSz="914400" rtl="0" eaLnBrk="1" latinLnBrk="0" hangingPunct="1">
@@ -6650,122 +7809,6 @@
           <a:chExt cx="0" cy="0"/>
         </a:xfrm>
       </p:grpSpPr>
-      <p:sp>
-        <p:nvSpPr>
-          <p:cNvPr id="4" name="Arrow: Pentagon 3">
-            <a:extLst>
-              <a:ext uri="{FF2B5EF4-FFF2-40B4-BE49-F238E27FC236}">
-                <a16:creationId xmlns:a16="http://schemas.microsoft.com/office/drawing/2014/main" id="{0E1C5205-F74D-8360-EDEE-B204D8633772}"/>
-              </a:ext>
-            </a:extLst>
-          </p:cNvPr>
-          <p:cNvSpPr/>
-          <p:nvPr/>
-        </p:nvSpPr>
-        <p:spPr>
-          <a:xfrm>
-            <a:off x="-1" y="383391"/>
-            <a:ext cx="5962261" cy="905773"/>
-          </a:xfrm>
-          <a:prstGeom prst="homePlate">
-            <a:avLst/>
-          </a:prstGeom>
-          <a:solidFill>
-            <a:schemeClr val="bg2">
-              <a:lumMod val="25000"/>
-              <a:alpha val="85000"/>
-            </a:schemeClr>
-          </a:solidFill>
-        </p:spPr>
-        <p:style>
-          <a:lnRef idx="1">
-            <a:schemeClr val="accent3"/>
-          </a:lnRef>
-          <a:fillRef idx="3">
-            <a:schemeClr val="accent3"/>
-          </a:fillRef>
-          <a:effectRef idx="2">
-            <a:schemeClr val="accent3"/>
-          </a:effectRef>
-          <a:fontRef idx="minor">
-            <a:schemeClr val="lt1"/>
-          </a:fontRef>
-        </p:style>
-        <p:txBody>
-          <a:bodyPr rtlCol="0" anchor="ctr"/>
-          <a:lstStyle/>
-          <a:p>
-            <a:pPr algn="ctr"/>
-            <a:r>
-              <a:rPr lang="pt-BR" sz="4000" dirty="0">
-                <a:solidFill>
-                  <a:schemeClr val="bg1"/>
-                </a:solidFill>
-              </a:rPr>
-              <a:t>MATERIAIS E MÉTODOS</a:t>
-            </a:r>
-          </a:p>
-        </p:txBody>
-      </p:sp>
-      <p:sp>
-        <p:nvSpPr>
-          <p:cNvPr id="6" name="Arrow: Pentagon 5">
-            <a:extLst>
-              <a:ext uri="{FF2B5EF4-FFF2-40B4-BE49-F238E27FC236}">
-                <a16:creationId xmlns:a16="http://schemas.microsoft.com/office/drawing/2014/main" id="{6495FEFB-EF83-9F99-FA59-304B76DA4498}"/>
-              </a:ext>
-            </a:extLst>
-          </p:cNvPr>
-          <p:cNvSpPr/>
-          <p:nvPr/>
-        </p:nvSpPr>
-        <p:spPr>
-          <a:xfrm>
-            <a:off x="-1" y="1170272"/>
-            <a:ext cx="4450704" cy="453255"/>
-          </a:xfrm>
-          <a:prstGeom prst="homePlate">
-            <a:avLst/>
-          </a:prstGeom>
-          <a:solidFill>
-            <a:schemeClr val="bg2">
-              <a:lumMod val="75000"/>
-              <a:alpha val="90000"/>
-            </a:schemeClr>
-          </a:solidFill>
-        </p:spPr>
-        <p:style>
-          <a:lnRef idx="1">
-            <a:schemeClr val="accent3"/>
-          </a:lnRef>
-          <a:fillRef idx="3">
-            <a:schemeClr val="accent3"/>
-          </a:fillRef>
-          <a:effectRef idx="2">
-            <a:schemeClr val="accent3"/>
-          </a:effectRef>
-          <a:fontRef idx="minor">
-            <a:schemeClr val="lt1"/>
-          </a:fontRef>
-        </p:style>
-        <p:txBody>
-          <a:bodyPr rtlCol="0" anchor="ctr"/>
-          <a:lstStyle/>
-          <a:p>
-            <a:pPr algn="ctr"/>
-            <a:r>
-              <a:rPr lang="pt-BR" sz="2800" dirty="0">
-                <a:solidFill>
-                  <a:schemeClr val="bg2">
-                    <a:lumMod val="25000"/>
-                  </a:schemeClr>
-                </a:solidFill>
-              </a:rPr>
-              <a:t>PRÉ-PROCESSAMENTO</a:t>
-            </a:r>
-          </a:p>
-        </p:txBody>
-      </p:sp>
       <p:sp>
         <p:nvSpPr>
           <p:cNvPr id="7" name="Rectangle 6">
@@ -7142,7 +8185,7 @@
         </p:nvGrpSpPr>
         <p:grpSpPr>
           <a:xfrm>
-            <a:off x="7962558" y="522336"/>
+            <a:off x="7962558" y="836277"/>
             <a:ext cx="2496622" cy="4477057"/>
             <a:chOff x="7961828" y="1040376"/>
             <a:chExt cx="2496622" cy="4477057"/>
@@ -7795,8 +8838,8 @@
         </p:nvSpPr>
         <p:spPr>
           <a:xfrm>
-            <a:off x="6382848" y="5108808"/>
-            <a:ext cx="5643012" cy="586176"/>
+            <a:off x="7248504" y="5311839"/>
+            <a:ext cx="3924728" cy="586176"/>
           </a:xfrm>
           <a:prstGeom prst="rect">
             <a:avLst/>
@@ -7975,7 +9018,7 @@
               <a:buNone/>
             </a:pPr>
             <a:r>
-              <a:rPr lang="pt-BR" sz="1600" dirty="0">
+              <a:rPr lang="pt-BR" sz="1200" dirty="0">
                 <a:solidFill>
                   <a:schemeClr val="bg2">
                     <a:lumMod val="25000"/>
@@ -7986,7 +9029,7 @@
               <a:t>Estágios de análise do processamento de linguagem natural</a:t>
             </a:r>
             <a:br>
-              <a:rPr lang="pt-BR" sz="1600" dirty="0">
+              <a:rPr lang="pt-BR" sz="1200" dirty="0">
                 <a:solidFill>
                   <a:schemeClr val="bg2">
                     <a:lumMod val="25000"/>
@@ -7996,7 +9039,7 @@
               </a:rPr>
             </a:br>
             <a:r>
-              <a:rPr lang="pt-BR" sz="1600" b="1" dirty="0">
+              <a:rPr lang="pt-BR" sz="1200" b="1" dirty="0">
                 <a:solidFill>
                   <a:schemeClr val="bg2">
                     <a:lumMod val="25000"/>
@@ -8005,6 +9048,122 @@
                 <a:cs typeface="Arial" panose="020B0604020202020204" pitchFamily="34" charset="0"/>
               </a:rPr>
               <a:t>Fonte: Adaptado de Dale et al. (2000) </a:t>
+            </a:r>
+          </a:p>
+        </p:txBody>
+      </p:sp>
+      <p:sp>
+        <p:nvSpPr>
+          <p:cNvPr id="14" name="Arrow: Pentagon 3">
+            <a:extLst>
+              <a:ext uri="{FF2B5EF4-FFF2-40B4-BE49-F238E27FC236}">
+                <a16:creationId xmlns:a16="http://schemas.microsoft.com/office/drawing/2014/main" id="{4364FB1E-8BEC-C93E-7BD2-E59731F76F1A}"/>
+              </a:ext>
+            </a:extLst>
+          </p:cNvPr>
+          <p:cNvSpPr/>
+          <p:nvPr/>
+        </p:nvSpPr>
+        <p:spPr>
+          <a:xfrm>
+            <a:off x="-1" y="383391"/>
+            <a:ext cx="4975200" cy="630000"/>
+          </a:xfrm>
+          <a:prstGeom prst="homePlate">
+            <a:avLst/>
+          </a:prstGeom>
+          <a:solidFill>
+            <a:schemeClr val="bg2">
+              <a:lumMod val="25000"/>
+              <a:alpha val="85000"/>
+            </a:schemeClr>
+          </a:solidFill>
+        </p:spPr>
+        <p:style>
+          <a:lnRef idx="1">
+            <a:schemeClr val="accent3"/>
+          </a:lnRef>
+          <a:fillRef idx="3">
+            <a:schemeClr val="accent3"/>
+          </a:fillRef>
+          <a:effectRef idx="2">
+            <a:schemeClr val="accent3"/>
+          </a:effectRef>
+          <a:fontRef idx="minor">
+            <a:schemeClr val="lt1"/>
+          </a:fontRef>
+        </p:style>
+        <p:txBody>
+          <a:bodyPr rtlCol="0" anchor="ctr"/>
+          <a:lstStyle/>
+          <a:p>
+            <a:pPr algn="ctr"/>
+            <a:r>
+              <a:rPr lang="pt-BR" sz="3200" dirty="0">
+                <a:solidFill>
+                  <a:schemeClr val="bg1"/>
+                </a:solidFill>
+              </a:rPr>
+              <a:t>MATERIAIS E MÉTODOS</a:t>
+            </a:r>
+          </a:p>
+        </p:txBody>
+      </p:sp>
+      <p:sp>
+        <p:nvSpPr>
+          <p:cNvPr id="16" name="Arrow: Pentagon 5">
+            <a:extLst>
+              <a:ext uri="{FF2B5EF4-FFF2-40B4-BE49-F238E27FC236}">
+                <a16:creationId xmlns:a16="http://schemas.microsoft.com/office/drawing/2014/main" id="{F2F56E24-41A4-F052-124B-D9870C1899AC}"/>
+              </a:ext>
+            </a:extLst>
+          </p:cNvPr>
+          <p:cNvSpPr/>
+          <p:nvPr/>
+        </p:nvSpPr>
+        <p:spPr>
+          <a:xfrm>
+            <a:off x="0" y="933967"/>
+            <a:ext cx="3205538" cy="370852"/>
+          </a:xfrm>
+          <a:prstGeom prst="homePlate">
+            <a:avLst/>
+          </a:prstGeom>
+          <a:solidFill>
+            <a:schemeClr val="bg2">
+              <a:lumMod val="75000"/>
+              <a:alpha val="90000"/>
+            </a:schemeClr>
+          </a:solidFill>
+        </p:spPr>
+        <p:style>
+          <a:lnRef idx="1">
+            <a:schemeClr val="accent3"/>
+          </a:lnRef>
+          <a:fillRef idx="3">
+            <a:schemeClr val="accent3"/>
+          </a:fillRef>
+          <a:effectRef idx="2">
+            <a:schemeClr val="accent3"/>
+          </a:effectRef>
+          <a:fontRef idx="minor">
+            <a:schemeClr val="lt1"/>
+          </a:fontRef>
+        </p:style>
+        <p:txBody>
+          <a:bodyPr rtlCol="0" anchor="ctr"/>
+          <a:lstStyle/>
+          <a:p>
+            <a:pPr algn="ctr"/>
+            <a:r>
+              <a:rPr lang="pt-BR" sz="2400" dirty="0">
+                <a:solidFill>
+                  <a:schemeClr val="bg2">
+                    <a:lumMod val="25000"/>
+                  </a:schemeClr>
+                </a:solidFill>
+              </a:rPr>
+              <a:t>PRÉ-PROCESSAMENTO</a:t>
             </a:r>
           </a:p>
         </p:txBody>
@@ -8039,122 +9198,6 @@
           <a:chExt cx="0" cy="0"/>
         </a:xfrm>
       </p:grpSpPr>
-      <p:sp>
-        <p:nvSpPr>
-          <p:cNvPr id="4" name="Arrow: Pentagon 3">
-            <a:extLst>
-              <a:ext uri="{FF2B5EF4-FFF2-40B4-BE49-F238E27FC236}">
-                <a16:creationId xmlns:a16="http://schemas.microsoft.com/office/drawing/2014/main" id="{0E1C5205-F74D-8360-EDEE-B204D8633772}"/>
-              </a:ext>
-            </a:extLst>
-          </p:cNvPr>
-          <p:cNvSpPr/>
-          <p:nvPr/>
-        </p:nvSpPr>
-        <p:spPr>
-          <a:xfrm>
-            <a:off x="-1" y="383391"/>
-            <a:ext cx="5962261" cy="905773"/>
-          </a:xfrm>
-          <a:prstGeom prst="homePlate">
-            <a:avLst/>
-          </a:prstGeom>
-          <a:solidFill>
-            <a:schemeClr val="bg2">
-              <a:lumMod val="25000"/>
-              <a:alpha val="85000"/>
-            </a:schemeClr>
-          </a:solidFill>
-        </p:spPr>
-        <p:style>
-          <a:lnRef idx="1">
-            <a:schemeClr val="accent3"/>
-          </a:lnRef>
-          <a:fillRef idx="3">
-            <a:schemeClr val="accent3"/>
-          </a:fillRef>
-          <a:effectRef idx="2">
-            <a:schemeClr val="accent3"/>
-          </a:effectRef>
-          <a:fontRef idx="minor">
-            <a:schemeClr val="lt1"/>
-          </a:fontRef>
-        </p:style>
-        <p:txBody>
-          <a:bodyPr rtlCol="0" anchor="ctr"/>
-          <a:lstStyle/>
-          <a:p>
-            <a:pPr algn="ctr"/>
-            <a:r>
-              <a:rPr lang="pt-BR" sz="3700" dirty="0">
-                <a:solidFill>
-                  <a:schemeClr val="bg1"/>
-                </a:solidFill>
-              </a:rPr>
-              <a:t>RESULTADOS E DISCUSSÕES</a:t>
-            </a:r>
-          </a:p>
-        </p:txBody>
-      </p:sp>
-      <p:sp>
-        <p:nvSpPr>
-          <p:cNvPr id="6" name="Arrow: Pentagon 5">
-            <a:extLst>
-              <a:ext uri="{FF2B5EF4-FFF2-40B4-BE49-F238E27FC236}">
-                <a16:creationId xmlns:a16="http://schemas.microsoft.com/office/drawing/2014/main" id="{6495FEFB-EF83-9F99-FA59-304B76DA4498}"/>
-              </a:ext>
-            </a:extLst>
-          </p:cNvPr>
-          <p:cNvSpPr/>
-          <p:nvPr/>
-        </p:nvSpPr>
-        <p:spPr>
-          <a:xfrm>
-            <a:off x="-1" y="1170272"/>
-            <a:ext cx="4450704" cy="453255"/>
-          </a:xfrm>
-          <a:prstGeom prst="homePlate">
-            <a:avLst/>
-          </a:prstGeom>
-          <a:solidFill>
-            <a:schemeClr val="bg2">
-              <a:lumMod val="75000"/>
-              <a:alpha val="90000"/>
-            </a:schemeClr>
-          </a:solidFill>
-        </p:spPr>
-        <p:style>
-          <a:lnRef idx="1">
-            <a:schemeClr val="accent3"/>
-          </a:lnRef>
-          <a:fillRef idx="3">
-            <a:schemeClr val="accent3"/>
-          </a:fillRef>
-          <a:effectRef idx="2">
-            <a:schemeClr val="accent3"/>
-          </a:effectRef>
-          <a:fontRef idx="minor">
-            <a:schemeClr val="lt1"/>
-          </a:fontRef>
-        </p:style>
-        <p:txBody>
-          <a:bodyPr rtlCol="0" anchor="ctr"/>
-          <a:lstStyle/>
-          <a:p>
-            <a:pPr algn="ctr"/>
-            <a:r>
-              <a:rPr lang="pt-BR" sz="2800" dirty="0">
-                <a:solidFill>
-                  <a:schemeClr val="bg2">
-                    <a:lumMod val="25000"/>
-                  </a:schemeClr>
-                </a:solidFill>
-              </a:rPr>
-              <a:t>COLETA DOS DADOS</a:t>
-            </a:r>
-          </a:p>
-        </p:txBody>
-      </p:sp>
       <p:sp>
         <p:nvSpPr>
           <p:cNvPr id="7" name="Rectangle 6">
@@ -8317,7 +9360,7 @@
         </p:nvSpPr>
         <p:spPr>
           <a:xfrm>
-            <a:off x="179613" y="5267653"/>
+            <a:off x="220710" y="5338502"/>
             <a:ext cx="5603622" cy="586176"/>
           </a:xfrm>
           <a:prstGeom prst="rect">
@@ -8497,7 +9540,7 @@
               <a:buNone/>
             </a:pPr>
             <a:r>
-              <a:rPr lang="pt-BR" sz="1600" dirty="0">
+              <a:rPr lang="pt-BR" sz="1200" dirty="0">
                 <a:solidFill>
                   <a:schemeClr val="bg2">
                     <a:lumMod val="25000"/>
@@ -8508,7 +9551,7 @@
               <a:t>Leitura de arquivos .</a:t>
             </a:r>
             <a:r>
-              <a:rPr lang="pt-BR" sz="1600" dirty="0" err="1">
+              <a:rPr lang="pt-BR" sz="1200" dirty="0" err="1">
                 <a:solidFill>
                   <a:schemeClr val="bg2">
                     <a:lumMod val="25000"/>
@@ -8519,7 +9562,7 @@
               <a:t>txt</a:t>
             </a:r>
             <a:r>
-              <a:rPr lang="pt-BR" sz="1600" dirty="0">
+              <a:rPr lang="pt-BR" sz="1200" dirty="0">
                 <a:solidFill>
                   <a:schemeClr val="bg2">
                     <a:lumMod val="25000"/>
@@ -8530,7 +9573,7 @@
               <a:t> armazenados no Google Drive</a:t>
             </a:r>
             <a:br>
-              <a:rPr lang="pt-BR" sz="1600" dirty="0">
+              <a:rPr lang="pt-BR" sz="1200" dirty="0">
                 <a:solidFill>
                   <a:schemeClr val="bg2">
                     <a:lumMod val="25000"/>
@@ -8540,7 +9583,7 @@
               </a:rPr>
             </a:br>
             <a:r>
-              <a:rPr lang="pt-BR" sz="1600" b="1" dirty="0">
+              <a:rPr lang="pt-BR" sz="1200" b="1" dirty="0">
                 <a:solidFill>
                   <a:schemeClr val="bg2">
                     <a:lumMod val="25000"/>
@@ -8583,7 +9626,7 @@
         </p:blipFill>
         <p:spPr>
           <a:xfrm>
-            <a:off x="179613" y="2516543"/>
+            <a:off x="220710" y="2587392"/>
             <a:ext cx="5603622" cy="2751110"/>
           </a:xfrm>
         </p:spPr>
@@ -8616,7 +9659,7 @@
         </p:blipFill>
         <p:spPr>
           <a:xfrm>
-            <a:off x="6096000" y="3072619"/>
+            <a:off x="6096000" y="2587392"/>
             <a:ext cx="5981700" cy="1054100"/>
           </a:xfrm>
           <a:prstGeom prst="rect">
@@ -8640,7 +9683,7 @@
         </p:nvSpPr>
         <p:spPr>
           <a:xfrm>
-            <a:off x="6096000" y="4155085"/>
+            <a:off x="6096000" y="3669858"/>
             <a:ext cx="5603622" cy="719897"/>
           </a:xfrm>
           <a:prstGeom prst="rect">
@@ -8758,15 +9801,131 @@
           </a:lstStyle>
           <a:p>
             <a:r>
-              <a:rPr lang="pt-BR" dirty="0"/>
+              <a:rPr lang="pt-BR" sz="1200" dirty="0"/>
               <a:t>“Print” de uma parte do livro Harry Potter e a Pedra Filosofal sem nenhuma aplicação de pré-processamento </a:t>
             </a:r>
             <a:br>
-              <a:rPr lang="pt-BR" dirty="0"/>
+              <a:rPr lang="pt-BR" sz="1200" dirty="0"/>
             </a:br>
             <a:r>
-              <a:rPr lang="pt-BR" b="1" dirty="0"/>
+              <a:rPr lang="pt-BR" sz="1200" b="1" dirty="0"/>
               <a:t>Fonte: Resultados originais da pesquisa </a:t>
+            </a:r>
+          </a:p>
+        </p:txBody>
+      </p:sp>
+      <p:sp>
+        <p:nvSpPr>
+          <p:cNvPr id="2" name="Arrow: Pentagon 3">
+            <a:extLst>
+              <a:ext uri="{FF2B5EF4-FFF2-40B4-BE49-F238E27FC236}">
+                <a16:creationId xmlns:a16="http://schemas.microsoft.com/office/drawing/2014/main" id="{5EE99520-5449-9635-A24B-BA96A7433DD3}"/>
+              </a:ext>
+            </a:extLst>
+          </p:cNvPr>
+          <p:cNvSpPr/>
+          <p:nvPr/>
+        </p:nvSpPr>
+        <p:spPr>
+          <a:xfrm>
+            <a:off x="-1" y="383391"/>
+            <a:ext cx="4975200" cy="630000"/>
+          </a:xfrm>
+          <a:prstGeom prst="homePlate">
+            <a:avLst/>
+          </a:prstGeom>
+          <a:solidFill>
+            <a:schemeClr val="bg2">
+              <a:lumMod val="25000"/>
+              <a:alpha val="85000"/>
+            </a:schemeClr>
+          </a:solidFill>
+        </p:spPr>
+        <p:style>
+          <a:lnRef idx="1">
+            <a:schemeClr val="accent3"/>
+          </a:lnRef>
+          <a:fillRef idx="3">
+            <a:schemeClr val="accent3"/>
+          </a:fillRef>
+          <a:effectRef idx="2">
+            <a:schemeClr val="accent3"/>
+          </a:effectRef>
+          <a:fontRef idx="minor">
+            <a:schemeClr val="lt1"/>
+          </a:fontRef>
+        </p:style>
+        <p:txBody>
+          <a:bodyPr rtlCol="0" anchor="ctr"/>
+          <a:lstStyle/>
+          <a:p>
+            <a:pPr algn="ctr"/>
+            <a:r>
+              <a:rPr lang="pt-BR" sz="3200" dirty="0">
+                <a:solidFill>
+                  <a:schemeClr val="bg1"/>
+                </a:solidFill>
+              </a:rPr>
+              <a:t>RESULTADOS E DISCUSSÕES</a:t>
+            </a:r>
+          </a:p>
+        </p:txBody>
+      </p:sp>
+      <p:sp>
+        <p:nvSpPr>
+          <p:cNvPr id="3" name="Arrow: Pentagon 5">
+            <a:extLst>
+              <a:ext uri="{FF2B5EF4-FFF2-40B4-BE49-F238E27FC236}">
+                <a16:creationId xmlns:a16="http://schemas.microsoft.com/office/drawing/2014/main" id="{D605CB99-1709-8F54-33D7-368BA5040023}"/>
+              </a:ext>
+            </a:extLst>
+          </p:cNvPr>
+          <p:cNvSpPr/>
+          <p:nvPr/>
+        </p:nvSpPr>
+        <p:spPr>
+          <a:xfrm>
+            <a:off x="0" y="933967"/>
+            <a:ext cx="3205538" cy="370852"/>
+          </a:xfrm>
+          <a:prstGeom prst="homePlate">
+            <a:avLst/>
+          </a:prstGeom>
+          <a:solidFill>
+            <a:schemeClr val="bg2">
+              <a:lumMod val="75000"/>
+              <a:alpha val="90000"/>
+            </a:schemeClr>
+          </a:solidFill>
+        </p:spPr>
+        <p:style>
+          <a:lnRef idx="1">
+            <a:schemeClr val="accent3"/>
+          </a:lnRef>
+          <a:fillRef idx="3">
+            <a:schemeClr val="accent3"/>
+          </a:fillRef>
+          <a:effectRef idx="2">
+            <a:schemeClr val="accent3"/>
+          </a:effectRef>
+          <a:fontRef idx="minor">
+            <a:schemeClr val="lt1"/>
+          </a:fontRef>
+        </p:style>
+        <p:txBody>
+          <a:bodyPr rtlCol="0" anchor="ctr"/>
+          <a:lstStyle/>
+          <a:p>
+            <a:pPr algn="ctr"/>
+            <a:r>
+              <a:rPr lang="pt-BR" sz="2400" dirty="0">
+                <a:solidFill>
+                  <a:schemeClr val="bg2">
+                    <a:lumMod val="25000"/>
+                  </a:schemeClr>
+                </a:solidFill>
+              </a:rPr>
+              <a:t>COLETA DE DADOS</a:t>
             </a:r>
           </a:p>
         </p:txBody>
@@ -8801,122 +9960,6 @@
           <a:chExt cx="0" cy="0"/>
         </a:xfrm>
       </p:grpSpPr>
-      <p:sp>
-        <p:nvSpPr>
-          <p:cNvPr id="4" name="Arrow: Pentagon 3">
-            <a:extLst>
-              <a:ext uri="{FF2B5EF4-FFF2-40B4-BE49-F238E27FC236}">
-                <a16:creationId xmlns:a16="http://schemas.microsoft.com/office/drawing/2014/main" id="{0E1C5205-F74D-8360-EDEE-B204D8633772}"/>
-              </a:ext>
-            </a:extLst>
-          </p:cNvPr>
-          <p:cNvSpPr/>
-          <p:nvPr/>
-        </p:nvSpPr>
-        <p:spPr>
-          <a:xfrm>
-            <a:off x="-1" y="383391"/>
-            <a:ext cx="5962261" cy="905773"/>
-          </a:xfrm>
-          <a:prstGeom prst="homePlate">
-            <a:avLst/>
-          </a:prstGeom>
-          <a:solidFill>
-            <a:schemeClr val="bg2">
-              <a:lumMod val="25000"/>
-              <a:alpha val="85000"/>
-            </a:schemeClr>
-          </a:solidFill>
-        </p:spPr>
-        <p:style>
-          <a:lnRef idx="1">
-            <a:schemeClr val="accent3"/>
-          </a:lnRef>
-          <a:fillRef idx="3">
-            <a:schemeClr val="accent3"/>
-          </a:fillRef>
-          <a:effectRef idx="2">
-            <a:schemeClr val="accent3"/>
-          </a:effectRef>
-          <a:fontRef idx="minor">
-            <a:schemeClr val="lt1"/>
-          </a:fontRef>
-        </p:style>
-        <p:txBody>
-          <a:bodyPr rtlCol="0" anchor="ctr"/>
-          <a:lstStyle/>
-          <a:p>
-            <a:pPr algn="ctr"/>
-            <a:r>
-              <a:rPr lang="pt-BR" sz="3700" dirty="0">
-                <a:solidFill>
-                  <a:schemeClr val="bg1"/>
-                </a:solidFill>
-              </a:rPr>
-              <a:t>RESULTADOS E DISCUSSÕES</a:t>
-            </a:r>
-          </a:p>
-        </p:txBody>
-      </p:sp>
-      <p:sp>
-        <p:nvSpPr>
-          <p:cNvPr id="6" name="Arrow: Pentagon 5">
-            <a:extLst>
-              <a:ext uri="{FF2B5EF4-FFF2-40B4-BE49-F238E27FC236}">
-                <a16:creationId xmlns:a16="http://schemas.microsoft.com/office/drawing/2014/main" id="{6495FEFB-EF83-9F99-FA59-304B76DA4498}"/>
-              </a:ext>
-            </a:extLst>
-          </p:cNvPr>
-          <p:cNvSpPr/>
-          <p:nvPr/>
-        </p:nvSpPr>
-        <p:spPr>
-          <a:xfrm>
-            <a:off x="-1" y="1170272"/>
-            <a:ext cx="4450704" cy="453255"/>
-          </a:xfrm>
-          <a:prstGeom prst="homePlate">
-            <a:avLst/>
-          </a:prstGeom>
-          <a:solidFill>
-            <a:schemeClr val="bg2">
-              <a:lumMod val="75000"/>
-              <a:alpha val="90000"/>
-            </a:schemeClr>
-          </a:solidFill>
-        </p:spPr>
-        <p:style>
-          <a:lnRef idx="1">
-            <a:schemeClr val="accent3"/>
-          </a:lnRef>
-          <a:fillRef idx="3">
-            <a:schemeClr val="accent3"/>
-          </a:fillRef>
-          <a:effectRef idx="2">
-            <a:schemeClr val="accent3"/>
-          </a:effectRef>
-          <a:fontRef idx="minor">
-            <a:schemeClr val="lt1"/>
-          </a:fontRef>
-        </p:style>
-        <p:txBody>
-          <a:bodyPr rtlCol="0" anchor="ctr"/>
-          <a:lstStyle/>
-          <a:p>
-            <a:pPr algn="ctr"/>
-            <a:r>
-              <a:rPr lang="pt-BR" sz="2800" dirty="0">
-                <a:solidFill>
-                  <a:schemeClr val="bg2">
-                    <a:lumMod val="25000"/>
-                  </a:schemeClr>
-                </a:solidFill>
-              </a:rPr>
-              <a:t>TRATATIVA DOS DADOS</a:t>
-            </a:r>
-          </a:p>
-        </p:txBody>
-      </p:sp>
       <p:sp>
         <p:nvSpPr>
           <p:cNvPr id="7" name="Rectangle 6">
@@ -9242,14 +10285,14 @@
           </a:lstStyle>
           <a:p>
             <a:r>
-              <a:rPr lang="pt-BR" dirty="0"/>
+              <a:rPr lang="pt-BR" sz="1200" dirty="0"/>
               <a:t>“Print” de uma parte do livro Harry Potter e a Pedra Filosofal com a aplicação do pré-processamento </a:t>
             </a:r>
             <a:br>
-              <a:rPr lang="pt-BR" dirty="0"/>
+              <a:rPr lang="pt-BR" sz="1200" dirty="0"/>
             </a:br>
             <a:r>
-              <a:rPr lang="pt-BR" b="1" dirty="0"/>
+              <a:rPr lang="pt-BR" sz="1200" b="1" dirty="0"/>
               <a:t>Fonte: Resultados originais da pesquisa </a:t>
             </a:r>
           </a:p>
@@ -9461,15 +10504,131 @@
           </a:lstStyle>
           <a:p>
             <a:r>
-              <a:rPr lang="pt-BR" dirty="0"/>
+              <a:rPr lang="pt-BR" sz="1200" dirty="0"/>
               <a:t>Output gerado após o processamento textual do livro Harry Potter e a Pedra Filosofal, limitado a cinco palavras que mais se repete, onde é possível representar a diferença das informações não tratadas e a aplicação do pré-processamento. </a:t>
             </a:r>
             <a:br>
-              <a:rPr lang="pt-BR" dirty="0"/>
+              <a:rPr lang="pt-BR" sz="1200" dirty="0"/>
             </a:br>
             <a:r>
-              <a:rPr lang="pt-BR" b="1" dirty="0"/>
+              <a:rPr lang="pt-BR" sz="1200" b="1" dirty="0"/>
               <a:t>Fonte: Resultados originais da pesquisa </a:t>
+            </a:r>
+          </a:p>
+        </p:txBody>
+      </p:sp>
+      <p:sp>
+        <p:nvSpPr>
+          <p:cNvPr id="2" name="Arrow: Pentagon 3">
+            <a:extLst>
+              <a:ext uri="{FF2B5EF4-FFF2-40B4-BE49-F238E27FC236}">
+                <a16:creationId xmlns:a16="http://schemas.microsoft.com/office/drawing/2014/main" id="{477436CE-616A-D9FE-66B6-97E83AF785E6}"/>
+              </a:ext>
+            </a:extLst>
+          </p:cNvPr>
+          <p:cNvSpPr/>
+          <p:nvPr/>
+        </p:nvSpPr>
+        <p:spPr>
+          <a:xfrm>
+            <a:off x="-1" y="383391"/>
+            <a:ext cx="4975200" cy="630000"/>
+          </a:xfrm>
+          <a:prstGeom prst="homePlate">
+            <a:avLst/>
+          </a:prstGeom>
+          <a:solidFill>
+            <a:schemeClr val="bg2">
+              <a:lumMod val="25000"/>
+              <a:alpha val="85000"/>
+            </a:schemeClr>
+          </a:solidFill>
+        </p:spPr>
+        <p:style>
+          <a:lnRef idx="1">
+            <a:schemeClr val="accent3"/>
+          </a:lnRef>
+          <a:fillRef idx="3">
+            <a:schemeClr val="accent3"/>
+          </a:fillRef>
+          <a:effectRef idx="2">
+            <a:schemeClr val="accent3"/>
+          </a:effectRef>
+          <a:fontRef idx="minor">
+            <a:schemeClr val="lt1"/>
+          </a:fontRef>
+        </p:style>
+        <p:txBody>
+          <a:bodyPr rtlCol="0" anchor="ctr"/>
+          <a:lstStyle/>
+          <a:p>
+            <a:pPr algn="ctr"/>
+            <a:r>
+              <a:rPr lang="pt-BR" sz="3200" dirty="0">
+                <a:solidFill>
+                  <a:schemeClr val="bg1"/>
+                </a:solidFill>
+              </a:rPr>
+              <a:t>RESULTADOS E DISCUSSÕES</a:t>
+            </a:r>
+          </a:p>
+        </p:txBody>
+      </p:sp>
+      <p:sp>
+        <p:nvSpPr>
+          <p:cNvPr id="5" name="Arrow: Pentagon 5">
+            <a:extLst>
+              <a:ext uri="{FF2B5EF4-FFF2-40B4-BE49-F238E27FC236}">
+                <a16:creationId xmlns:a16="http://schemas.microsoft.com/office/drawing/2014/main" id="{F8B71FEA-E49E-14C7-BEB4-AF76A18D4605}"/>
+              </a:ext>
+            </a:extLst>
+          </p:cNvPr>
+          <p:cNvSpPr/>
+          <p:nvPr/>
+        </p:nvSpPr>
+        <p:spPr>
+          <a:xfrm>
+            <a:off x="0" y="933967"/>
+            <a:ext cx="3205538" cy="370852"/>
+          </a:xfrm>
+          <a:prstGeom prst="homePlate">
+            <a:avLst/>
+          </a:prstGeom>
+          <a:solidFill>
+            <a:schemeClr val="bg2">
+              <a:lumMod val="75000"/>
+              <a:alpha val="90000"/>
+            </a:schemeClr>
+          </a:solidFill>
+        </p:spPr>
+        <p:style>
+          <a:lnRef idx="1">
+            <a:schemeClr val="accent3"/>
+          </a:lnRef>
+          <a:fillRef idx="3">
+            <a:schemeClr val="accent3"/>
+          </a:fillRef>
+          <a:effectRef idx="2">
+            <a:schemeClr val="accent3"/>
+          </a:effectRef>
+          <a:fontRef idx="minor">
+            <a:schemeClr val="lt1"/>
+          </a:fontRef>
+        </p:style>
+        <p:txBody>
+          <a:bodyPr rtlCol="0" anchor="ctr"/>
+          <a:lstStyle/>
+          <a:p>
+            <a:pPr algn="ctr"/>
+            <a:r>
+              <a:rPr lang="pt-BR" sz="2400" dirty="0">
+                <a:solidFill>
+                  <a:schemeClr val="bg2">
+                    <a:lumMod val="25000"/>
+                  </a:schemeClr>
+                </a:solidFill>
+              </a:rPr>
+              <a:t>TRATATIVA DE DADOS</a:t>
             </a:r>
           </a:p>
         </p:txBody>
@@ -9504,122 +10663,6 @@
           <a:chExt cx="0" cy="0"/>
         </a:xfrm>
       </p:grpSpPr>
-      <p:sp>
-        <p:nvSpPr>
-          <p:cNvPr id="4" name="Arrow: Pentagon 3">
-            <a:extLst>
-              <a:ext uri="{FF2B5EF4-FFF2-40B4-BE49-F238E27FC236}">
-                <a16:creationId xmlns:a16="http://schemas.microsoft.com/office/drawing/2014/main" id="{0E1C5205-F74D-8360-EDEE-B204D8633772}"/>
-              </a:ext>
-            </a:extLst>
-          </p:cNvPr>
-          <p:cNvSpPr/>
-          <p:nvPr/>
-        </p:nvSpPr>
-        <p:spPr>
-          <a:xfrm>
-            <a:off x="-1" y="383391"/>
-            <a:ext cx="5962261" cy="905773"/>
-          </a:xfrm>
-          <a:prstGeom prst="homePlate">
-            <a:avLst/>
-          </a:prstGeom>
-          <a:solidFill>
-            <a:schemeClr val="bg2">
-              <a:lumMod val="25000"/>
-              <a:alpha val="85000"/>
-            </a:schemeClr>
-          </a:solidFill>
-        </p:spPr>
-        <p:style>
-          <a:lnRef idx="1">
-            <a:schemeClr val="accent3"/>
-          </a:lnRef>
-          <a:fillRef idx="3">
-            <a:schemeClr val="accent3"/>
-          </a:fillRef>
-          <a:effectRef idx="2">
-            <a:schemeClr val="accent3"/>
-          </a:effectRef>
-          <a:fontRef idx="minor">
-            <a:schemeClr val="lt1"/>
-          </a:fontRef>
-        </p:style>
-        <p:txBody>
-          <a:bodyPr rtlCol="0" anchor="ctr"/>
-          <a:lstStyle/>
-          <a:p>
-            <a:pPr algn="ctr"/>
-            <a:r>
-              <a:rPr lang="pt-BR" sz="3700" dirty="0">
-                <a:solidFill>
-                  <a:schemeClr val="bg1"/>
-                </a:solidFill>
-              </a:rPr>
-              <a:t>RESULTADOS E DISCUSSÕES</a:t>
-            </a:r>
-          </a:p>
-        </p:txBody>
-      </p:sp>
-      <p:sp>
-        <p:nvSpPr>
-          <p:cNvPr id="6" name="Arrow: Pentagon 5">
-            <a:extLst>
-              <a:ext uri="{FF2B5EF4-FFF2-40B4-BE49-F238E27FC236}">
-                <a16:creationId xmlns:a16="http://schemas.microsoft.com/office/drawing/2014/main" id="{6495FEFB-EF83-9F99-FA59-304B76DA4498}"/>
-              </a:ext>
-            </a:extLst>
-          </p:cNvPr>
-          <p:cNvSpPr/>
-          <p:nvPr/>
-        </p:nvSpPr>
-        <p:spPr>
-          <a:xfrm>
-            <a:off x="-1" y="1170272"/>
-            <a:ext cx="4450704" cy="453255"/>
-          </a:xfrm>
-          <a:prstGeom prst="homePlate">
-            <a:avLst/>
-          </a:prstGeom>
-          <a:solidFill>
-            <a:schemeClr val="bg2">
-              <a:lumMod val="75000"/>
-              <a:alpha val="90000"/>
-            </a:schemeClr>
-          </a:solidFill>
-        </p:spPr>
-        <p:style>
-          <a:lnRef idx="1">
-            <a:schemeClr val="accent3"/>
-          </a:lnRef>
-          <a:fillRef idx="3">
-            <a:schemeClr val="accent3"/>
-          </a:fillRef>
-          <a:effectRef idx="2">
-            <a:schemeClr val="accent3"/>
-          </a:effectRef>
-          <a:fontRef idx="minor">
-            <a:schemeClr val="lt1"/>
-          </a:fontRef>
-        </p:style>
-        <p:txBody>
-          <a:bodyPr rtlCol="0" anchor="ctr"/>
-          <a:lstStyle/>
-          <a:p>
-            <a:pPr algn="ctr"/>
-            <a:r>
-              <a:rPr lang="pt-BR" sz="2800" dirty="0">
-                <a:solidFill>
-                  <a:schemeClr val="bg2">
-                    <a:lumMod val="25000"/>
-                  </a:schemeClr>
-                </a:solidFill>
-              </a:rPr>
-              <a:t>VISUALIZAÇÃO DE DADOS</a:t>
-            </a:r>
-          </a:p>
-        </p:txBody>
-      </p:sp>
       <p:pic>
         <p:nvPicPr>
           <p:cNvPr id="9" name="Imagem 8" descr="Gráfico, Gráfico de barras&#10;&#10;Descrição gerada automaticamente">
@@ -9708,8 +10751,8 @@
         </p:nvSpPr>
         <p:spPr>
           <a:xfrm>
-            <a:off x="197052" y="2374858"/>
-            <a:ext cx="5660799" cy="310863"/>
+            <a:off x="1262836" y="2374858"/>
+            <a:ext cx="4053025" cy="310863"/>
           </a:xfrm>
           <a:prstGeom prst="rect">
             <a:avLst/>
@@ -9917,8 +10960,8 @@
         </p:nvSpPr>
         <p:spPr>
           <a:xfrm>
-            <a:off x="6334150" y="2377704"/>
-            <a:ext cx="5660799" cy="310863"/>
+            <a:off x="7438492" y="2374858"/>
+            <a:ext cx="4053025" cy="310863"/>
           </a:xfrm>
           <a:prstGeom prst="rect">
             <a:avLst/>
@@ -10165,7 +11208,7 @@
           </a:bodyPr>
           <a:lstStyle/>
           <a:p>
-            <a:pPr>
+            <a:pPr algn="ctr">
               <a:lnSpc>
                 <a:spcPct val="90000"/>
               </a:lnSpc>
@@ -10174,7 +11217,7 @@
               </a:spcBef>
             </a:pPr>
             <a:r>
-              <a:rPr lang="pt-BR" sz="1600" dirty="0" err="1">
+              <a:rPr lang="pt-BR" sz="1400" dirty="0" err="1">
                 <a:solidFill>
                   <a:schemeClr val="bg2">
                     <a:lumMod val="10000"/>
@@ -10186,7 +11229,7 @@
               <a:t>FreqDist</a:t>
             </a:r>
             <a:r>
-              <a:rPr lang="pt-BR" sz="1600" dirty="0">
+              <a:rPr lang="pt-BR" sz="1400" dirty="0">
                 <a:solidFill>
                   <a:schemeClr val="bg2">
                     <a:lumMod val="10000"/>
@@ -10196,6 +11239,122 @@
                 <a:cs typeface="Arial" panose="020B0604020202020204" pitchFamily="34" charset="0"/>
               </a:rPr>
               <a:t>: Mensura a frequência que cada palavra aparece dentro de um contexto.</a:t>
+            </a:r>
+          </a:p>
+        </p:txBody>
+      </p:sp>
+      <p:sp>
+        <p:nvSpPr>
+          <p:cNvPr id="2" name="Arrow: Pentagon 3">
+            <a:extLst>
+              <a:ext uri="{FF2B5EF4-FFF2-40B4-BE49-F238E27FC236}">
+                <a16:creationId xmlns:a16="http://schemas.microsoft.com/office/drawing/2014/main" id="{C4EBEC0F-F874-B8A7-95B1-D8CA536072C8}"/>
+              </a:ext>
+            </a:extLst>
+          </p:cNvPr>
+          <p:cNvSpPr/>
+          <p:nvPr/>
+        </p:nvSpPr>
+        <p:spPr>
+          <a:xfrm>
+            <a:off x="-1" y="383391"/>
+            <a:ext cx="4975200" cy="630000"/>
+          </a:xfrm>
+          <a:prstGeom prst="homePlate">
+            <a:avLst/>
+          </a:prstGeom>
+          <a:solidFill>
+            <a:schemeClr val="bg2">
+              <a:lumMod val="25000"/>
+              <a:alpha val="85000"/>
+            </a:schemeClr>
+          </a:solidFill>
+        </p:spPr>
+        <p:style>
+          <a:lnRef idx="1">
+            <a:schemeClr val="accent3"/>
+          </a:lnRef>
+          <a:fillRef idx="3">
+            <a:schemeClr val="accent3"/>
+          </a:fillRef>
+          <a:effectRef idx="2">
+            <a:schemeClr val="accent3"/>
+          </a:effectRef>
+          <a:fontRef idx="minor">
+            <a:schemeClr val="lt1"/>
+          </a:fontRef>
+        </p:style>
+        <p:txBody>
+          <a:bodyPr rtlCol="0" anchor="ctr"/>
+          <a:lstStyle/>
+          <a:p>
+            <a:pPr algn="ctr"/>
+            <a:r>
+              <a:rPr lang="pt-BR" sz="3200" dirty="0">
+                <a:solidFill>
+                  <a:schemeClr val="bg1"/>
+                </a:solidFill>
+              </a:rPr>
+              <a:t>RESULTADOS E DISCUSSÕES</a:t>
+            </a:r>
+          </a:p>
+        </p:txBody>
+      </p:sp>
+      <p:sp>
+        <p:nvSpPr>
+          <p:cNvPr id="3" name="Arrow: Pentagon 5">
+            <a:extLst>
+              <a:ext uri="{FF2B5EF4-FFF2-40B4-BE49-F238E27FC236}">
+                <a16:creationId xmlns:a16="http://schemas.microsoft.com/office/drawing/2014/main" id="{7A7CC052-5685-5F75-9C9F-D732484B1FFC}"/>
+              </a:ext>
+            </a:extLst>
+          </p:cNvPr>
+          <p:cNvSpPr/>
+          <p:nvPr/>
+        </p:nvSpPr>
+        <p:spPr>
+          <a:xfrm>
+            <a:off x="0" y="933967"/>
+            <a:ext cx="3205538" cy="370852"/>
+          </a:xfrm>
+          <a:prstGeom prst="homePlate">
+            <a:avLst/>
+          </a:prstGeom>
+          <a:solidFill>
+            <a:schemeClr val="bg2">
+              <a:lumMod val="75000"/>
+              <a:alpha val="90000"/>
+            </a:schemeClr>
+          </a:solidFill>
+        </p:spPr>
+        <p:style>
+          <a:lnRef idx="1">
+            <a:schemeClr val="accent3"/>
+          </a:lnRef>
+          <a:fillRef idx="3">
+            <a:schemeClr val="accent3"/>
+          </a:fillRef>
+          <a:effectRef idx="2">
+            <a:schemeClr val="accent3"/>
+          </a:effectRef>
+          <a:fontRef idx="minor">
+            <a:schemeClr val="lt1"/>
+          </a:fontRef>
+        </p:style>
+        <p:txBody>
+          <a:bodyPr rtlCol="0" anchor="ctr"/>
+          <a:lstStyle/>
+          <a:p>
+            <a:pPr algn="ctr"/>
+            <a:r>
+              <a:rPr lang="pt-BR" sz="2000" dirty="0">
+                <a:solidFill>
+                  <a:schemeClr val="bg2">
+                    <a:lumMod val="25000"/>
+                  </a:schemeClr>
+                </a:solidFill>
+              </a:rPr>
+              <a:t>VISUALIZAÇÃO DE DADOS</a:t>
             </a:r>
           </a:p>
         </p:txBody>

</xml_diff>